<commit_message>
fixed stall_for_mem_core.sv, documentation and modified testbench
</commit_message>
<xml_diff>
--- a/rtl/core/multi_cycle/stall_for_mem_core.pptx
+++ b/rtl/core/multi_cycle/stall_for_mem_core.pptx
@@ -7,6 +7,8 @@
   <p:sldIdLst>
     <p:sldId id="256" r:id="rId2"/>
     <p:sldId id="257" r:id="rId3"/>
+    <p:sldId id="258" r:id="rId4"/>
+    <p:sldId id="259" r:id="rId5"/>
   </p:sldIdLst>
   <p:sldSz cx="12192000" cy="6858000"/>
   <p:notesSz cx="6858000" cy="9144000"/>
@@ -105,7 +107,142 @@
       </a:defRPr>
     </a:lvl9pPr>
   </p:defaultTextStyle>
+  <p:extLst>
+    <p:ext uri="{EFAFB233-063F-42B5-8137-9DF3F51BA10A}">
+      <p15:sldGuideLst xmlns:p15="http://schemas.microsoft.com/office/powerpoint/2012/main"/>
+    </p:ext>
+  </p:extLst>
 </p:presentation>
+</file>
+
+<file path=ppt/changesInfos/changesInfo1.xml><?xml version="1.0" encoding="utf-8"?>
+<pc:chgInfo xmlns:a="http://schemas.openxmlformats.org/drawingml/2006/main" xmlns:r="http://schemas.openxmlformats.org/officeDocument/2006/relationships" xmlns:ac="http://schemas.microsoft.com/office/drawing/2013/main/command" xmlns:pc="http://schemas.microsoft.com/office/powerpoint/2013/main/command">
+  <pc:docChgLst>
+    <pc:chgData name="Mrinav Saxena" userId="1ae1cb636c956b49" providerId="LiveId" clId="{A2F8FEEC-D108-417D-905D-D0AC14A1ADFB}"/>
+    <pc:docChg chg="undo custSel addSld modSld">
+      <pc:chgData name="Mrinav Saxena" userId="1ae1cb636c956b49" providerId="LiveId" clId="{A2F8FEEC-D108-417D-905D-D0AC14A1ADFB}" dt="2025-09-08T11:57:40.991" v="2349" actId="20577"/>
+      <pc:docMkLst>
+        <pc:docMk/>
+      </pc:docMkLst>
+      <pc:sldChg chg="modSp new mod">
+        <pc:chgData name="Mrinav Saxena" userId="1ae1cb636c956b49" providerId="LiveId" clId="{A2F8FEEC-D108-417D-905D-D0AC14A1ADFB}" dt="2025-09-08T11:39:45.376" v="883" actId="20577"/>
+        <pc:sldMkLst>
+          <pc:docMk/>
+          <pc:sldMk cId="2839866548" sldId="258"/>
+        </pc:sldMkLst>
+        <pc:spChg chg="mod">
+          <ac:chgData name="Mrinav Saxena" userId="1ae1cb636c956b49" providerId="LiveId" clId="{A2F8FEEC-D108-417D-905D-D0AC14A1ADFB}" dt="2025-09-08T11:38:24.644" v="751" actId="20577"/>
+          <ac:spMkLst>
+            <pc:docMk/>
+            <pc:sldMk cId="2839866548" sldId="258"/>
+            <ac:spMk id="2" creationId="{A690C55E-482B-833A-779F-0E0229DA26F7}"/>
+          </ac:spMkLst>
+        </pc:spChg>
+        <pc:spChg chg="mod">
+          <ac:chgData name="Mrinav Saxena" userId="1ae1cb636c956b49" providerId="LiveId" clId="{A2F8FEEC-D108-417D-905D-D0AC14A1ADFB}" dt="2025-09-08T11:39:45.376" v="883" actId="20577"/>
+          <ac:spMkLst>
+            <pc:docMk/>
+            <pc:sldMk cId="2839866548" sldId="258"/>
+            <ac:spMk id="3" creationId="{31AE0A64-38D0-C10B-F903-BA4C3D5F2C6C}"/>
+          </ac:spMkLst>
+        </pc:spChg>
+      </pc:sldChg>
+      <pc:sldChg chg="modSp new mod">
+        <pc:chgData name="Mrinav Saxena" userId="1ae1cb636c956b49" providerId="LiveId" clId="{A2F8FEEC-D108-417D-905D-D0AC14A1ADFB}" dt="2025-09-08T11:57:40.991" v="2349" actId="20577"/>
+        <pc:sldMkLst>
+          <pc:docMk/>
+          <pc:sldMk cId="215785741" sldId="259"/>
+        </pc:sldMkLst>
+        <pc:spChg chg="mod">
+          <ac:chgData name="Mrinav Saxena" userId="1ae1cb636c956b49" providerId="LiveId" clId="{A2F8FEEC-D108-417D-905D-D0AC14A1ADFB}" dt="2025-09-08T11:49:35.628" v="1950" actId="20577"/>
+          <ac:spMkLst>
+            <pc:docMk/>
+            <pc:sldMk cId="215785741" sldId="259"/>
+            <ac:spMk id="2" creationId="{62B91B0D-EF90-6B2E-9F0A-E458FCEABBA7}"/>
+          </ac:spMkLst>
+        </pc:spChg>
+        <pc:spChg chg="mod">
+          <ac:chgData name="Mrinav Saxena" userId="1ae1cb636c956b49" providerId="LiveId" clId="{A2F8FEEC-D108-417D-905D-D0AC14A1ADFB}" dt="2025-09-08T11:57:40.991" v="2349" actId="20577"/>
+          <ac:spMkLst>
+            <pc:docMk/>
+            <pc:sldMk cId="215785741" sldId="259"/>
+            <ac:spMk id="3" creationId="{5DB4897D-2446-91E3-A8B3-40CEA1FD958D}"/>
+          </ac:spMkLst>
+        </pc:spChg>
+      </pc:sldChg>
+    </pc:docChg>
+  </pc:docChgLst>
+  <pc:docChgLst>
+    <pc:chgData name="Mrinav Saxena" userId="1ae1cb636c956b49" providerId="LiveId" clId="{3D40DB4B-8E00-40BA-9204-277439F83DB8}"/>
+    <pc:docChg chg="undo custSel modSld">
+      <pc:chgData name="Mrinav Saxena" userId="1ae1cb636c956b49" providerId="LiveId" clId="{3D40DB4B-8E00-40BA-9204-277439F83DB8}" dt="2025-09-08T16:41:22.204" v="271" actId="20577"/>
+      <pc:docMkLst>
+        <pc:docMk/>
+      </pc:docMkLst>
+      <pc:sldChg chg="modSp mod">
+        <pc:chgData name="Mrinav Saxena" userId="1ae1cb636c956b49" providerId="LiveId" clId="{3D40DB4B-8E00-40BA-9204-277439F83DB8}" dt="2025-09-08T16:34:41.498" v="185" actId="20577"/>
+        <pc:sldMkLst>
+          <pc:docMk/>
+          <pc:sldMk cId="1647670355" sldId="257"/>
+        </pc:sldMkLst>
+        <pc:spChg chg="mod">
+          <ac:chgData name="Mrinav Saxena" userId="1ae1cb636c956b49" providerId="LiveId" clId="{3D40DB4B-8E00-40BA-9204-277439F83DB8}" dt="2025-09-08T16:34:41.498" v="185" actId="20577"/>
+          <ac:spMkLst>
+            <pc:docMk/>
+            <pc:sldMk cId="1647670355" sldId="257"/>
+            <ac:spMk id="3" creationId="{8C966C7B-B9C0-9809-64F3-803671903961}"/>
+          </ac:spMkLst>
+        </pc:spChg>
+      </pc:sldChg>
+      <pc:sldChg chg="modSp mod">
+        <pc:chgData name="Mrinav Saxena" userId="1ae1cb636c956b49" providerId="LiveId" clId="{3D40DB4B-8E00-40BA-9204-277439F83DB8}" dt="2025-09-08T16:37:45.785" v="219" actId="20577"/>
+        <pc:sldMkLst>
+          <pc:docMk/>
+          <pc:sldMk cId="2839866548" sldId="258"/>
+        </pc:sldMkLst>
+        <pc:spChg chg="mod">
+          <ac:chgData name="Mrinav Saxena" userId="1ae1cb636c956b49" providerId="LiveId" clId="{3D40DB4B-8E00-40BA-9204-277439F83DB8}" dt="2025-09-08T16:37:45.785" v="219" actId="20577"/>
+          <ac:spMkLst>
+            <pc:docMk/>
+            <pc:sldMk cId="2839866548" sldId="258"/>
+            <ac:spMk id="3" creationId="{31AE0A64-38D0-C10B-F903-BA4C3D5F2C6C}"/>
+          </ac:spMkLst>
+        </pc:spChg>
+      </pc:sldChg>
+      <pc:sldChg chg="addSp delSp modSp mod modClrScheme chgLayout">
+        <pc:chgData name="Mrinav Saxena" userId="1ae1cb636c956b49" providerId="LiveId" clId="{3D40DB4B-8E00-40BA-9204-277439F83DB8}" dt="2025-09-08T16:41:22.204" v="271" actId="20577"/>
+        <pc:sldMkLst>
+          <pc:docMk/>
+          <pc:sldMk cId="215785741" sldId="259"/>
+        </pc:sldMkLst>
+        <pc:spChg chg="mod ord">
+          <ac:chgData name="Mrinav Saxena" userId="1ae1cb636c956b49" providerId="LiveId" clId="{3D40DB4B-8E00-40BA-9204-277439F83DB8}" dt="2025-09-08T15:05:27.829" v="21" actId="700"/>
+          <ac:spMkLst>
+            <pc:docMk/>
+            <pc:sldMk cId="215785741" sldId="259"/>
+            <ac:spMk id="2" creationId="{62B91B0D-EF90-6B2E-9F0A-E458FCEABBA7}"/>
+          </ac:spMkLst>
+        </pc:spChg>
+        <pc:spChg chg="mod ord">
+          <ac:chgData name="Mrinav Saxena" userId="1ae1cb636c956b49" providerId="LiveId" clId="{3D40DB4B-8E00-40BA-9204-277439F83DB8}" dt="2025-09-08T16:41:22.204" v="271" actId="20577"/>
+          <ac:spMkLst>
+            <pc:docMk/>
+            <pc:sldMk cId="215785741" sldId="259"/>
+            <ac:spMk id="3" creationId="{5DB4897D-2446-91E3-A8B3-40CEA1FD958D}"/>
+          </ac:spMkLst>
+        </pc:spChg>
+        <pc:spChg chg="add del mod ord">
+          <ac:chgData name="Mrinav Saxena" userId="1ae1cb636c956b49" providerId="LiveId" clId="{3D40DB4B-8E00-40BA-9204-277439F83DB8}" dt="2025-09-08T15:05:27.829" v="21" actId="700"/>
+          <ac:spMkLst>
+            <pc:docMk/>
+            <pc:sldMk cId="215785741" sldId="259"/>
+            <ac:spMk id="4" creationId="{E1F37A46-AF11-18C7-F0B1-4484E242EF77}"/>
+          </ac:spMkLst>
+        </pc:spChg>
+      </pc:sldChg>
+    </pc:docChg>
+  </pc:docChgLst>
+</pc:chgInfo>
 </file>
 
 <file path=ppt/slideLayouts/slideLayout1.xml><?xml version="1.0" encoding="utf-8"?>
@@ -1517,7 +1654,7 @@
           <a:p>
             <a:fld id="{5411EB86-952F-4D59-A107-BE7F3DE73819}" type="datetimeFigureOut">
               <a:rPr lang="en-IN" smtClean="0"/>
-              <a:t>06-09-2025</a:t>
+              <a:t>08-09-2025</a:t>
             </a:fld>
             <a:endParaRPr lang="en-IN"/>
           </a:p>
@@ -2976,7 +3113,7 @@
           <a:p>
             <a:fld id="{5411EB86-952F-4D59-A107-BE7F3DE73819}" type="datetimeFigureOut">
               <a:rPr lang="en-IN" smtClean="0"/>
-              <a:t>06-09-2025</a:t>
+              <a:t>08-09-2025</a:t>
             </a:fld>
             <a:endParaRPr lang="en-IN"/>
           </a:p>
@@ -4429,7 +4566,7 @@
           <a:p>
             <a:fld id="{5411EB86-952F-4D59-A107-BE7F3DE73819}" type="datetimeFigureOut">
               <a:rPr lang="en-IN" smtClean="0"/>
-              <a:t>06-09-2025</a:t>
+              <a:t>08-09-2025</a:t>
             </a:fld>
             <a:endParaRPr lang="en-IN"/>
           </a:p>
@@ -5884,7 +6021,7 @@
           <a:p>
             <a:fld id="{5411EB86-952F-4D59-A107-BE7F3DE73819}" type="datetimeFigureOut">
               <a:rPr lang="en-IN" smtClean="0"/>
-              <a:t>06-09-2025</a:t>
+              <a:t>08-09-2025</a:t>
             </a:fld>
             <a:endParaRPr lang="en-IN"/>
           </a:p>
@@ -7392,7 +7529,7 @@
           <a:p>
             <a:fld id="{5411EB86-952F-4D59-A107-BE7F3DE73819}" type="datetimeFigureOut">
               <a:rPr lang="en-IN" smtClean="0"/>
-              <a:t>06-09-2025</a:t>
+              <a:t>08-09-2025</a:t>
             </a:fld>
             <a:endParaRPr lang="en-IN"/>
           </a:p>
@@ -8913,7 +9050,7 @@
           <a:p>
             <a:fld id="{5411EB86-952F-4D59-A107-BE7F3DE73819}" type="datetimeFigureOut">
               <a:rPr lang="en-IN" smtClean="0"/>
-              <a:t>06-09-2025</a:t>
+              <a:t>08-09-2025</a:t>
             </a:fld>
             <a:endParaRPr lang="en-IN"/>
           </a:p>
@@ -10578,7 +10715,7 @@
           <a:p>
             <a:fld id="{5411EB86-952F-4D59-A107-BE7F3DE73819}" type="datetimeFigureOut">
               <a:rPr lang="en-IN" smtClean="0"/>
-              <a:t>06-09-2025</a:t>
+              <a:t>08-09-2025</a:t>
             </a:fld>
             <a:endParaRPr lang="en-IN"/>
           </a:p>
@@ -11976,7 +12113,7 @@
           <a:p>
             <a:fld id="{5411EB86-952F-4D59-A107-BE7F3DE73819}" type="datetimeFigureOut">
               <a:rPr lang="en-IN" smtClean="0"/>
-              <a:t>06-09-2025</a:t>
+              <a:t>08-09-2025</a:t>
             </a:fld>
             <a:endParaRPr lang="en-IN"/>
           </a:p>
@@ -12076,7 +12213,7 @@
           <a:p>
             <a:fld id="{5411EB86-952F-4D59-A107-BE7F3DE73819}" type="datetimeFigureOut">
               <a:rPr lang="en-IN" smtClean="0"/>
-              <a:t>06-09-2025</a:t>
+              <a:t>08-09-2025</a:t>
             </a:fld>
             <a:endParaRPr lang="en-IN"/>
           </a:p>
@@ -13602,7 +13739,7 @@
           <a:p>
             <a:fld id="{5411EB86-952F-4D59-A107-BE7F3DE73819}" type="datetimeFigureOut">
               <a:rPr lang="en-IN" smtClean="0"/>
-              <a:t>06-09-2025</a:t>
+              <a:t>08-09-2025</a:t>
             </a:fld>
             <a:endParaRPr lang="en-IN"/>
           </a:p>
@@ -15138,7 +15275,7 @@
           <a:p>
             <a:fld id="{5411EB86-952F-4D59-A107-BE7F3DE73819}" type="datetimeFigureOut">
               <a:rPr lang="en-IN" smtClean="0"/>
-              <a:t>06-09-2025</a:t>
+              <a:t>08-09-2025</a:t>
             </a:fld>
             <a:endParaRPr lang="en-IN"/>
           </a:p>
@@ -15361,7 +15498,7 @@
           <a:p>
             <a:fld id="{5411EB86-952F-4D59-A107-BE7F3DE73819}" type="datetimeFigureOut">
               <a:rPr lang="en-IN" smtClean="0"/>
-              <a:t>06-09-2025</a:t>
+              <a:t>08-09-2025</a:t>
             </a:fld>
             <a:endParaRPr lang="en-IN"/>
           </a:p>
@@ -15944,7 +16081,7 @@
         <p:spPr/>
         <p:txBody>
           <a:bodyPr>
-            <a:normAutofit fontScale="92500"/>
+            <a:normAutofit/>
           </a:bodyPr>
           <a:lstStyle/>
           <a:p>
@@ -15989,7 +16126,7 @@
             </a:pPr>
             <a:r>
               <a:rPr lang="en-US" dirty="0"/>
-              <a:t>The processor needs an FSM with the following states –</a:t>
+              <a:t>The processor needs an FSM with the following states -</a:t>
             </a:r>
           </a:p>
           <a:p>
@@ -16019,31 +16156,9 @@
               <a:buAutoNum type="arabicPeriod"/>
             </a:pPr>
             <a:r>
-              <a:rPr lang="en-US" dirty="0" err="1"/>
-              <a:t>ReqReadData</a:t>
-            </a:r>
-            <a:endParaRPr lang="en-US" dirty="0"/>
-          </a:p>
-          <a:p>
-            <a:pPr marL="800100" lvl="1" indent="-342900">
-              <a:buFont typeface="+mj-lt"/>
-              <a:buAutoNum type="arabicPeriod"/>
-            </a:pPr>
-            <a:r>
               <a:rPr lang="en-US" dirty="0"/>
               <a:t>Wait4ReadData</a:t>
             </a:r>
-          </a:p>
-          <a:p>
-            <a:pPr marL="800100" lvl="1" indent="-342900">
-              <a:buFont typeface="+mj-lt"/>
-              <a:buAutoNum type="arabicPeriod"/>
-            </a:pPr>
-            <a:r>
-              <a:rPr lang="en-US" dirty="0" err="1"/>
-              <a:t>ReqDataWrite</a:t>
-            </a:r>
-            <a:endParaRPr lang="en-US" dirty="0"/>
           </a:p>
           <a:p>
             <a:pPr marL="800100" lvl="1" indent="-342900">
@@ -16061,6 +16176,630 @@
     <p:extLst>
       <p:ext uri="{BB962C8B-B14F-4D97-AF65-F5344CB8AC3E}">
         <p14:creationId xmlns:p14="http://schemas.microsoft.com/office/powerpoint/2010/main" val="1647670355"/>
+      </p:ext>
+    </p:extLst>
+  </p:cSld>
+  <p:clrMapOvr>
+    <a:masterClrMapping/>
+  </p:clrMapOvr>
+</p:sld>
+</file>
+
+<file path=ppt/slides/slide3.xml><?xml version="1.0" encoding="utf-8"?>
+<p:sld xmlns:a="http://schemas.openxmlformats.org/drawingml/2006/main" xmlns:r="http://schemas.openxmlformats.org/officeDocument/2006/relationships" xmlns:p="http://schemas.openxmlformats.org/presentationml/2006/main">
+  <p:cSld>
+    <p:spTree>
+      <p:nvGrpSpPr>
+        <p:cNvPr id="1" name=""/>
+        <p:cNvGrpSpPr/>
+        <p:nvPr/>
+      </p:nvGrpSpPr>
+      <p:grpSpPr>
+        <a:xfrm>
+          <a:off x="0" y="0"/>
+          <a:ext cx="0" cy="0"/>
+          <a:chOff x="0" y="0"/>
+          <a:chExt cx="0" cy="0"/>
+        </a:xfrm>
+      </p:grpSpPr>
+      <p:sp>
+        <p:nvSpPr>
+          <p:cNvPr id="2" name="Title 1">
+            <a:extLst>
+              <a:ext uri="{FF2B5EF4-FFF2-40B4-BE49-F238E27FC236}">
+                <a16:creationId xmlns:a16="http://schemas.microsoft.com/office/drawing/2014/main" id="{A690C55E-482B-833A-779F-0E0229DA26F7}"/>
+              </a:ext>
+            </a:extLst>
+          </p:cNvPr>
+          <p:cNvSpPr>
+            <a:spLocks noGrp="1"/>
+          </p:cNvSpPr>
+          <p:nvPr>
+            <p:ph type="title"/>
+          </p:nvPr>
+        </p:nvSpPr>
+        <p:spPr/>
+        <p:txBody>
+          <a:bodyPr/>
+          <a:lstStyle/>
+          <a:p>
+            <a:r>
+              <a:rPr lang="en-US" dirty="0"/>
+              <a:t>FSM Flow For All Instructions</a:t>
+            </a:r>
+            <a:endParaRPr lang="en-IN" dirty="0"/>
+          </a:p>
+        </p:txBody>
+      </p:sp>
+      <p:sp>
+        <p:nvSpPr>
+          <p:cNvPr id="3" name="Content Placeholder 2">
+            <a:extLst>
+              <a:ext uri="{FF2B5EF4-FFF2-40B4-BE49-F238E27FC236}">
+                <a16:creationId xmlns:a16="http://schemas.microsoft.com/office/drawing/2014/main" id="{31AE0A64-38D0-C10B-F903-BA4C3D5F2C6C}"/>
+              </a:ext>
+            </a:extLst>
+          </p:cNvPr>
+          <p:cNvSpPr>
+            <a:spLocks noGrp="1"/>
+          </p:cNvSpPr>
+          <p:nvPr>
+            <p:ph idx="1"/>
+          </p:nvPr>
+        </p:nvSpPr>
+        <p:spPr/>
+        <p:txBody>
+          <a:bodyPr>
+            <a:normAutofit/>
+          </a:bodyPr>
+          <a:lstStyle/>
+          <a:p>
+            <a:pPr marL="342900" indent="-342900">
+              <a:buFont typeface="+mj-lt"/>
+              <a:buAutoNum type="arabicPeriod"/>
+            </a:pPr>
+            <a:r>
+              <a:rPr lang="en-IN" dirty="0"/>
+              <a:t>ALU/ALUI, </a:t>
+            </a:r>
+            <a:r>
+              <a:rPr lang="en-IN" dirty="0">
+                <a:sym typeface="Wingdings" panose="05000000000000000000" pitchFamily="2" charset="2"/>
+              </a:rPr>
+              <a:t>LUI, AUIPC, BXX, JAL, JALR</a:t>
+            </a:r>
+            <a:r>
+              <a:rPr lang="en-IN" dirty="0"/>
+              <a:t> – </a:t>
+            </a:r>
+          </a:p>
+          <a:p>
+            <a:pPr marL="800100" lvl="1" indent="-342900">
+              <a:buFont typeface="+mj-lt"/>
+              <a:buAutoNum type="arabicPeriod"/>
+            </a:pPr>
+            <a:r>
+              <a:rPr lang="en-IN" dirty="0" err="1"/>
+              <a:t>ReqInstr</a:t>
+            </a:r>
+            <a:r>
+              <a:rPr lang="en-IN" dirty="0"/>
+              <a:t> </a:t>
+            </a:r>
+            <a:r>
+              <a:rPr lang="en-IN" dirty="0">
+                <a:sym typeface="Wingdings" panose="05000000000000000000" pitchFamily="2" charset="2"/>
+              </a:rPr>
+              <a:t> Wait4Instr (after 1 cycle)</a:t>
+            </a:r>
+            <a:endParaRPr lang="en-IN" dirty="0"/>
+          </a:p>
+          <a:p>
+            <a:pPr marL="800100" lvl="1" indent="-342900">
+              <a:buFont typeface="+mj-lt"/>
+              <a:buAutoNum type="arabicPeriod"/>
+            </a:pPr>
+            <a:r>
+              <a:rPr lang="en-IN" dirty="0"/>
+              <a:t>Wait4Instr </a:t>
+            </a:r>
+            <a:r>
+              <a:rPr lang="en-IN" dirty="0">
+                <a:sym typeface="Wingdings" panose="05000000000000000000" pitchFamily="2" charset="2"/>
+              </a:rPr>
+              <a:t> </a:t>
+            </a:r>
+            <a:r>
+              <a:rPr lang="en-IN" dirty="0" err="1">
+                <a:sym typeface="Wingdings" panose="05000000000000000000" pitchFamily="2" charset="2"/>
+              </a:rPr>
+              <a:t>ReqInstr</a:t>
+            </a:r>
+            <a:r>
+              <a:rPr lang="en-IN" dirty="0">
+                <a:sym typeface="Wingdings" panose="05000000000000000000" pitchFamily="2" charset="2"/>
+              </a:rPr>
+              <a:t> (after </a:t>
+            </a:r>
+            <a:r>
+              <a:rPr lang="en-IN" dirty="0" err="1">
+                <a:sym typeface="Wingdings" panose="05000000000000000000" pitchFamily="2" charset="2"/>
+              </a:rPr>
+              <a:t>instr_ready_i</a:t>
+            </a:r>
+            <a:r>
+              <a:rPr lang="en-IN" dirty="0">
+                <a:sym typeface="Wingdings" panose="05000000000000000000" pitchFamily="2" charset="2"/>
+              </a:rPr>
+              <a:t> is 1)</a:t>
+            </a:r>
+          </a:p>
+          <a:p>
+            <a:pPr marL="342900" indent="-342900">
+              <a:buFont typeface="+mj-lt"/>
+              <a:buAutoNum type="arabicPeriod"/>
+            </a:pPr>
+            <a:r>
+              <a:rPr lang="en-IN" dirty="0">
+                <a:sym typeface="Wingdings" panose="05000000000000000000" pitchFamily="2" charset="2"/>
+              </a:rPr>
+              <a:t>SB, SH, SW</a:t>
+            </a:r>
+          </a:p>
+          <a:p>
+            <a:pPr marL="800100" lvl="1" indent="-342900">
+              <a:buFont typeface="+mj-lt"/>
+              <a:buAutoNum type="arabicPeriod"/>
+            </a:pPr>
+            <a:r>
+              <a:rPr lang="en-IN" dirty="0" err="1">
+                <a:sym typeface="Wingdings" panose="05000000000000000000" pitchFamily="2" charset="2"/>
+              </a:rPr>
+              <a:t>ReqInstr</a:t>
+            </a:r>
+            <a:r>
+              <a:rPr lang="en-IN" dirty="0">
+                <a:sym typeface="Wingdings" panose="05000000000000000000" pitchFamily="2" charset="2"/>
+              </a:rPr>
+              <a:t>  Wait4Instr (after 1 cycle)</a:t>
+            </a:r>
+          </a:p>
+          <a:p>
+            <a:pPr marL="800100" lvl="1" indent="-342900">
+              <a:buFont typeface="+mj-lt"/>
+              <a:buAutoNum type="arabicPeriod"/>
+            </a:pPr>
+            <a:r>
+              <a:rPr lang="en-IN" dirty="0">
+                <a:sym typeface="Wingdings" panose="05000000000000000000" pitchFamily="2" charset="2"/>
+              </a:rPr>
+              <a:t>Wait4Instr  Wait4DataWrite (after </a:t>
+            </a:r>
+            <a:r>
+              <a:rPr lang="en-IN" dirty="0" err="1">
+                <a:sym typeface="Wingdings" panose="05000000000000000000" pitchFamily="2" charset="2"/>
+              </a:rPr>
+              <a:t>instr_ready_i</a:t>
+            </a:r>
+            <a:r>
+              <a:rPr lang="en-IN" dirty="0">
+                <a:sym typeface="Wingdings" panose="05000000000000000000" pitchFamily="2" charset="2"/>
+              </a:rPr>
+              <a:t> is 1) </a:t>
+            </a:r>
+          </a:p>
+          <a:p>
+            <a:pPr marL="800100" lvl="1" indent="-342900">
+              <a:buFont typeface="+mj-lt"/>
+              <a:buAutoNum type="arabicPeriod"/>
+            </a:pPr>
+            <a:r>
+              <a:rPr lang="en-IN" dirty="0">
+                <a:sym typeface="Wingdings" panose="05000000000000000000" pitchFamily="2" charset="2"/>
+              </a:rPr>
+              <a:t>Wait4DataWrite  </a:t>
+            </a:r>
+            <a:r>
+              <a:rPr lang="en-IN" dirty="0" err="1">
+                <a:sym typeface="Wingdings" panose="05000000000000000000" pitchFamily="2" charset="2"/>
+              </a:rPr>
+              <a:t>ReqInstr</a:t>
+            </a:r>
+            <a:r>
+              <a:rPr lang="en-IN" dirty="0">
+                <a:sym typeface="Wingdings" panose="05000000000000000000" pitchFamily="2" charset="2"/>
+              </a:rPr>
+              <a:t> (after </a:t>
+            </a:r>
+            <a:r>
+              <a:rPr lang="en-IN" dirty="0" err="1">
+                <a:sym typeface="Wingdings" panose="05000000000000000000" pitchFamily="2" charset="2"/>
+              </a:rPr>
+              <a:t>dmem_ready</a:t>
+            </a:r>
+            <a:r>
+              <a:rPr lang="en-IN" dirty="0">
+                <a:sym typeface="Wingdings" panose="05000000000000000000" pitchFamily="2" charset="2"/>
+              </a:rPr>
+              <a:t> is 1)</a:t>
+            </a:r>
+          </a:p>
+          <a:p>
+            <a:pPr marL="342900" indent="-342900">
+              <a:buFont typeface="+mj-lt"/>
+              <a:buAutoNum type="arabicPeriod"/>
+            </a:pPr>
+            <a:r>
+              <a:rPr lang="en-IN" dirty="0">
+                <a:sym typeface="Wingdings" panose="05000000000000000000" pitchFamily="2" charset="2"/>
+              </a:rPr>
+              <a:t>LB, LH, LW, LBU, LHU</a:t>
+            </a:r>
+          </a:p>
+          <a:p>
+            <a:pPr marL="800100" lvl="1" indent="-342900">
+              <a:buFont typeface="+mj-lt"/>
+              <a:buAutoNum type="arabicPeriod"/>
+            </a:pPr>
+            <a:r>
+              <a:rPr lang="en-IN" dirty="0" err="1">
+                <a:sym typeface="Wingdings" panose="05000000000000000000" pitchFamily="2" charset="2"/>
+              </a:rPr>
+              <a:t>ReqInstr</a:t>
+            </a:r>
+            <a:r>
+              <a:rPr lang="en-IN" dirty="0">
+                <a:sym typeface="Wingdings" panose="05000000000000000000" pitchFamily="2" charset="2"/>
+              </a:rPr>
+              <a:t>  Wait4Instr (after 1 cycle)</a:t>
+            </a:r>
+          </a:p>
+          <a:p>
+            <a:pPr marL="800100" lvl="1" indent="-342900">
+              <a:buFont typeface="+mj-lt"/>
+              <a:buAutoNum type="arabicPeriod"/>
+            </a:pPr>
+            <a:r>
+              <a:rPr lang="en-IN" dirty="0">
+                <a:sym typeface="Wingdings" panose="05000000000000000000" pitchFamily="2" charset="2"/>
+              </a:rPr>
+              <a:t>Wait4Instr  Wait4ReadData (after </a:t>
+            </a:r>
+            <a:r>
+              <a:rPr lang="en-IN" dirty="0" err="1">
+                <a:sym typeface="Wingdings" panose="05000000000000000000" pitchFamily="2" charset="2"/>
+              </a:rPr>
+              <a:t>instr_ready_i</a:t>
+            </a:r>
+            <a:r>
+              <a:rPr lang="en-IN" dirty="0">
+                <a:sym typeface="Wingdings" panose="05000000000000000000" pitchFamily="2" charset="2"/>
+              </a:rPr>
+              <a:t> is 1) </a:t>
+            </a:r>
+          </a:p>
+          <a:p>
+            <a:pPr marL="800100" lvl="1" indent="-342900">
+              <a:buFont typeface="+mj-lt"/>
+              <a:buAutoNum type="arabicPeriod"/>
+            </a:pPr>
+            <a:r>
+              <a:rPr lang="en-IN" dirty="0">
+                <a:sym typeface="Wingdings" panose="05000000000000000000" pitchFamily="2" charset="2"/>
+              </a:rPr>
+              <a:t>Wait4ReadData  </a:t>
+            </a:r>
+            <a:r>
+              <a:rPr lang="en-IN" dirty="0" err="1">
+                <a:sym typeface="Wingdings" panose="05000000000000000000" pitchFamily="2" charset="2"/>
+              </a:rPr>
+              <a:t>ReqInstr</a:t>
+            </a:r>
+            <a:r>
+              <a:rPr lang="en-IN" dirty="0">
+                <a:sym typeface="Wingdings" panose="05000000000000000000" pitchFamily="2" charset="2"/>
+              </a:rPr>
+              <a:t> (after </a:t>
+            </a:r>
+            <a:r>
+              <a:rPr lang="en-IN" dirty="0" err="1">
+                <a:sym typeface="Wingdings" panose="05000000000000000000" pitchFamily="2" charset="2"/>
+              </a:rPr>
+              <a:t>dmem_ready</a:t>
+            </a:r>
+            <a:r>
+              <a:rPr lang="en-IN" dirty="0">
+                <a:sym typeface="Wingdings" panose="05000000000000000000" pitchFamily="2" charset="2"/>
+              </a:rPr>
+              <a:t> is 1)</a:t>
+            </a:r>
+          </a:p>
+        </p:txBody>
+      </p:sp>
+    </p:spTree>
+    <p:extLst>
+      <p:ext uri="{BB962C8B-B14F-4D97-AF65-F5344CB8AC3E}">
+        <p14:creationId xmlns:p14="http://schemas.microsoft.com/office/powerpoint/2010/main" val="2839866548"/>
+      </p:ext>
+    </p:extLst>
+  </p:cSld>
+  <p:clrMapOvr>
+    <a:masterClrMapping/>
+  </p:clrMapOvr>
+</p:sld>
+</file>
+
+<file path=ppt/slides/slide4.xml><?xml version="1.0" encoding="utf-8"?>
+<p:sld xmlns:a="http://schemas.openxmlformats.org/drawingml/2006/main" xmlns:r="http://schemas.openxmlformats.org/officeDocument/2006/relationships" xmlns:p="http://schemas.openxmlformats.org/presentationml/2006/main">
+  <p:cSld>
+    <p:spTree>
+      <p:nvGrpSpPr>
+        <p:cNvPr id="1" name=""/>
+        <p:cNvGrpSpPr/>
+        <p:nvPr/>
+      </p:nvGrpSpPr>
+      <p:grpSpPr>
+        <a:xfrm>
+          <a:off x="0" y="0"/>
+          <a:ext cx="0" cy="0"/>
+          <a:chOff x="0" y="0"/>
+          <a:chExt cx="0" cy="0"/>
+        </a:xfrm>
+      </p:grpSpPr>
+      <p:sp>
+        <p:nvSpPr>
+          <p:cNvPr id="2" name="Title 1">
+            <a:extLst>
+              <a:ext uri="{FF2B5EF4-FFF2-40B4-BE49-F238E27FC236}">
+                <a16:creationId xmlns:a16="http://schemas.microsoft.com/office/drawing/2014/main" id="{62B91B0D-EF90-6B2E-9F0A-E458FCEABBA7}"/>
+              </a:ext>
+            </a:extLst>
+          </p:cNvPr>
+          <p:cNvSpPr>
+            <a:spLocks noGrp="1"/>
+          </p:cNvSpPr>
+          <p:nvPr>
+            <p:ph type="title"/>
+          </p:nvPr>
+        </p:nvSpPr>
+        <p:spPr/>
+        <p:txBody>
+          <a:bodyPr>
+            <a:normAutofit/>
+          </a:bodyPr>
+          <a:lstStyle/>
+          <a:p>
+            <a:r>
+              <a:rPr lang="en-US" dirty="0"/>
+              <a:t>Auxiliary Signals + Modification of existing ones</a:t>
+            </a:r>
+            <a:endParaRPr lang="en-IN" dirty="0"/>
+          </a:p>
+        </p:txBody>
+      </p:sp>
+      <p:sp>
+        <p:nvSpPr>
+          <p:cNvPr id="3" name="Content Placeholder 2">
+            <a:extLst>
+              <a:ext uri="{FF2B5EF4-FFF2-40B4-BE49-F238E27FC236}">
+                <a16:creationId xmlns:a16="http://schemas.microsoft.com/office/drawing/2014/main" id="{5DB4897D-2446-91E3-A8B3-40CEA1FD958D}"/>
+              </a:ext>
+            </a:extLst>
+          </p:cNvPr>
+          <p:cNvSpPr>
+            <a:spLocks noGrp="1"/>
+          </p:cNvSpPr>
+          <p:nvPr>
+            <p:ph idx="1"/>
+          </p:nvPr>
+        </p:nvSpPr>
+        <p:spPr>
+          <a:xfrm>
+            <a:off x="5118447" y="205483"/>
+            <a:ext cx="6281873" cy="6359704"/>
+          </a:xfrm>
+        </p:spPr>
+        <p:txBody>
+          <a:bodyPr>
+            <a:normAutofit fontScale="85000" lnSpcReduction="10000"/>
+          </a:bodyPr>
+          <a:lstStyle/>
+          <a:p>
+            <a:pPr marL="342900" indent="-342900">
+              <a:buFont typeface="+mj-lt"/>
+              <a:buAutoNum type="arabicPeriod"/>
+            </a:pPr>
+            <a:r>
+              <a:rPr lang="en-US" b="1" dirty="0" err="1"/>
+              <a:t>instruction_complete</a:t>
+            </a:r>
+            <a:r>
+              <a:rPr lang="en-US" dirty="0"/>
+              <a:t> – pulses high during last cycle of Wait4Instr, Wait4DataWrite or Wait4ReadData, depending upon instruction type. This should move the FSM into the </a:t>
+            </a:r>
+            <a:r>
+              <a:rPr lang="en-US" dirty="0" err="1"/>
+              <a:t>ReqInstr</a:t>
+            </a:r>
+            <a:r>
+              <a:rPr lang="en-US" dirty="0"/>
+              <a:t> state.</a:t>
+            </a:r>
+          </a:p>
+          <a:p>
+            <a:pPr marL="342900" indent="-342900">
+              <a:buFont typeface="+mj-lt"/>
+              <a:buAutoNum type="arabicPeriod"/>
+            </a:pPr>
+            <a:r>
+              <a:rPr lang="en-US" b="1" dirty="0" err="1"/>
+              <a:t>read_instr_o</a:t>
+            </a:r>
+            <a:r>
+              <a:rPr lang="en-US" dirty="0"/>
+              <a:t> – pulses high in the </a:t>
+            </a:r>
+            <a:r>
+              <a:rPr lang="en-US" dirty="0" err="1"/>
+              <a:t>ReqInstr</a:t>
+            </a:r>
+            <a:r>
+              <a:rPr lang="en-US" dirty="0"/>
+              <a:t> state.</a:t>
+            </a:r>
+          </a:p>
+          <a:p>
+            <a:pPr marL="342900" indent="-342900">
+              <a:buFont typeface="+mj-lt"/>
+              <a:buAutoNum type="arabicPeriod"/>
+            </a:pPr>
+            <a:r>
+              <a:rPr lang="en-US" b="1" dirty="0" err="1"/>
+              <a:t>regfile_</a:t>
+            </a:r>
+            <a:r>
+              <a:rPr lang="en-US" b="1" err="1"/>
+              <a:t>wen</a:t>
+            </a:r>
+            <a:r>
+              <a:rPr lang="en-US" b="1"/>
+              <a:t>_r </a:t>
+            </a:r>
+            <a:r>
+              <a:rPr lang="en-US" dirty="0"/>
+              <a:t>– pulses high during last cycle of Wait4Instr or Wait4ReadData, depending upon instruction type. </a:t>
+            </a:r>
+          </a:p>
+          <a:p>
+            <a:pPr marL="342900" indent="-342900">
+              <a:buFont typeface="+mj-lt"/>
+              <a:buAutoNum type="arabicPeriod"/>
+            </a:pPr>
+            <a:r>
+              <a:rPr lang="en-US" b="1" dirty="0" err="1"/>
+              <a:t>dmem_write_o</a:t>
+            </a:r>
+            <a:r>
+              <a:rPr lang="en-US" b="1" dirty="0"/>
+              <a:t> </a:t>
+            </a:r>
+            <a:r>
+              <a:rPr lang="en-US" dirty="0"/>
+              <a:t>– pulses high during last cycle of Wait4Instr for SB, SH and SW. </a:t>
+            </a:r>
+          </a:p>
+          <a:p>
+            <a:pPr marL="342900" indent="-342900">
+              <a:buFont typeface="+mj-lt"/>
+              <a:buAutoNum type="arabicPeriod"/>
+            </a:pPr>
+            <a:r>
+              <a:rPr lang="en-US" b="1" dirty="0" err="1"/>
+              <a:t>dmem_read_o</a:t>
+            </a:r>
+            <a:r>
+              <a:rPr lang="en-US" b="1" dirty="0"/>
+              <a:t> </a:t>
+            </a:r>
+            <a:r>
+              <a:rPr lang="en-US" dirty="0"/>
+              <a:t>– pulses high during last cycle of Wait4Instr for LB, LH, LW, LBU and LHU.</a:t>
+            </a:r>
+          </a:p>
+          <a:p>
+            <a:pPr marL="342900" indent="-342900">
+              <a:buFont typeface="+mj-lt"/>
+              <a:buAutoNum type="arabicPeriod"/>
+            </a:pPr>
+            <a:endParaRPr lang="en-IN" dirty="0"/>
+          </a:p>
+          <a:p>
+            <a:pPr marL="0" indent="0">
+              <a:buNone/>
+            </a:pPr>
+            <a:r>
+              <a:rPr lang="en-IN" dirty="0"/>
+              <a:t>Other control signals are driven </a:t>
+            </a:r>
+            <a:r>
+              <a:rPr lang="en-IN" dirty="0" err="1"/>
+              <a:t>combinationally</a:t>
+            </a:r>
+            <a:r>
+              <a:rPr lang="en-IN" dirty="0"/>
+              <a:t>, with the assumption of 0 delay (or satisfactory path delay).</a:t>
+            </a:r>
+          </a:p>
+          <a:p>
+            <a:pPr marL="0" indent="0">
+              <a:buNone/>
+            </a:pPr>
+            <a:endParaRPr lang="en-IN" dirty="0"/>
+          </a:p>
+          <a:p>
+            <a:pPr marL="0" indent="0">
+              <a:buNone/>
+            </a:pPr>
+            <a:r>
+              <a:rPr lang="en-IN" dirty="0"/>
+              <a:t>For instance – when the instruction is loaded (</a:t>
+            </a:r>
+            <a:r>
+              <a:rPr lang="en-IN" dirty="0" err="1"/>
+              <a:t>instr_ready_i</a:t>
+            </a:r>
+            <a:r>
+              <a:rPr lang="en-IN" dirty="0"/>
+              <a:t> == 1), the actual </a:t>
+            </a:r>
+            <a:r>
+              <a:rPr lang="en-IN" dirty="0" err="1"/>
+              <a:t>dmem_write</a:t>
+            </a:r>
+            <a:r>
+              <a:rPr lang="en-IN" dirty="0"/>
+              <a:t>/read output from </a:t>
+            </a:r>
+            <a:r>
+              <a:rPr lang="en-US" b="1" dirty="0" err="1"/>
+              <a:t>dmem_input_and_ctrl_logic</a:t>
+            </a:r>
+            <a:r>
+              <a:rPr lang="en-IN" dirty="0"/>
+              <a:t> will remain high until the memory access is fully processed. The </a:t>
+            </a:r>
+            <a:r>
+              <a:rPr lang="en-IN" dirty="0" err="1"/>
+              <a:t>dmem_write</a:t>
+            </a:r>
+            <a:r>
+              <a:rPr lang="en-IN" dirty="0"/>
+              <a:t>/</a:t>
+            </a:r>
+            <a:r>
+              <a:rPr lang="en-IN" dirty="0" err="1"/>
+              <a:t>read_o</a:t>
+            </a:r>
+            <a:r>
+              <a:rPr lang="en-IN" dirty="0"/>
+              <a:t> signals on the other hand, would only be asserted during the cycle when </a:t>
+            </a:r>
+            <a:r>
+              <a:rPr lang="en-IN" dirty="0" err="1"/>
+              <a:t>instr_ready_i</a:t>
+            </a:r>
+            <a:r>
+              <a:rPr lang="en-IN" dirty="0"/>
+              <a:t> is up.</a:t>
+            </a:r>
+            <a:endParaRPr lang="en-US" dirty="0"/>
+          </a:p>
+        </p:txBody>
+      </p:sp>
+    </p:spTree>
+    <p:extLst>
+      <p:ext uri="{BB962C8B-B14F-4D97-AF65-F5344CB8AC3E}">
+        <p14:creationId xmlns:p14="http://schemas.microsoft.com/office/powerpoint/2010/main" val="215785741"/>
       </p:ext>
     </p:extLst>
   </p:cSld>

</xml_diff>

<commit_message>
updated stall_for_mem_core documentation, charting out potential improvements
</commit_message>
<xml_diff>
--- a/rtl/core/multi_cycle/stall_for_mem_core.pptx
+++ b/rtl/core/multi_cycle/stall_for_mem_core.pptx
@@ -113,136 +113,6 @@
     </p:ext>
   </p:extLst>
 </p:presentation>
-</file>
-
-<file path=ppt/changesInfos/changesInfo1.xml><?xml version="1.0" encoding="utf-8"?>
-<pc:chgInfo xmlns:a="http://schemas.openxmlformats.org/drawingml/2006/main" xmlns:r="http://schemas.openxmlformats.org/officeDocument/2006/relationships" xmlns:ac="http://schemas.microsoft.com/office/drawing/2013/main/command" xmlns:pc="http://schemas.microsoft.com/office/powerpoint/2013/main/command">
-  <pc:docChgLst>
-    <pc:chgData name="Mrinav Saxena" userId="1ae1cb636c956b49" providerId="LiveId" clId="{A2F8FEEC-D108-417D-905D-D0AC14A1ADFB}"/>
-    <pc:docChg chg="undo custSel addSld modSld">
-      <pc:chgData name="Mrinav Saxena" userId="1ae1cb636c956b49" providerId="LiveId" clId="{A2F8FEEC-D108-417D-905D-D0AC14A1ADFB}" dt="2025-09-08T11:57:40.991" v="2349" actId="20577"/>
-      <pc:docMkLst>
-        <pc:docMk/>
-      </pc:docMkLst>
-      <pc:sldChg chg="modSp new mod">
-        <pc:chgData name="Mrinav Saxena" userId="1ae1cb636c956b49" providerId="LiveId" clId="{A2F8FEEC-D108-417D-905D-D0AC14A1ADFB}" dt="2025-09-08T11:39:45.376" v="883" actId="20577"/>
-        <pc:sldMkLst>
-          <pc:docMk/>
-          <pc:sldMk cId="2839866548" sldId="258"/>
-        </pc:sldMkLst>
-        <pc:spChg chg="mod">
-          <ac:chgData name="Mrinav Saxena" userId="1ae1cb636c956b49" providerId="LiveId" clId="{A2F8FEEC-D108-417D-905D-D0AC14A1ADFB}" dt="2025-09-08T11:38:24.644" v="751" actId="20577"/>
-          <ac:spMkLst>
-            <pc:docMk/>
-            <pc:sldMk cId="2839866548" sldId="258"/>
-            <ac:spMk id="2" creationId="{A690C55E-482B-833A-779F-0E0229DA26F7}"/>
-          </ac:spMkLst>
-        </pc:spChg>
-        <pc:spChg chg="mod">
-          <ac:chgData name="Mrinav Saxena" userId="1ae1cb636c956b49" providerId="LiveId" clId="{A2F8FEEC-D108-417D-905D-D0AC14A1ADFB}" dt="2025-09-08T11:39:45.376" v="883" actId="20577"/>
-          <ac:spMkLst>
-            <pc:docMk/>
-            <pc:sldMk cId="2839866548" sldId="258"/>
-            <ac:spMk id="3" creationId="{31AE0A64-38D0-C10B-F903-BA4C3D5F2C6C}"/>
-          </ac:spMkLst>
-        </pc:spChg>
-      </pc:sldChg>
-      <pc:sldChg chg="modSp new mod">
-        <pc:chgData name="Mrinav Saxena" userId="1ae1cb636c956b49" providerId="LiveId" clId="{A2F8FEEC-D108-417D-905D-D0AC14A1ADFB}" dt="2025-09-08T11:57:40.991" v="2349" actId="20577"/>
-        <pc:sldMkLst>
-          <pc:docMk/>
-          <pc:sldMk cId="215785741" sldId="259"/>
-        </pc:sldMkLst>
-        <pc:spChg chg="mod">
-          <ac:chgData name="Mrinav Saxena" userId="1ae1cb636c956b49" providerId="LiveId" clId="{A2F8FEEC-D108-417D-905D-D0AC14A1ADFB}" dt="2025-09-08T11:49:35.628" v="1950" actId="20577"/>
-          <ac:spMkLst>
-            <pc:docMk/>
-            <pc:sldMk cId="215785741" sldId="259"/>
-            <ac:spMk id="2" creationId="{62B91B0D-EF90-6B2E-9F0A-E458FCEABBA7}"/>
-          </ac:spMkLst>
-        </pc:spChg>
-        <pc:spChg chg="mod">
-          <ac:chgData name="Mrinav Saxena" userId="1ae1cb636c956b49" providerId="LiveId" clId="{A2F8FEEC-D108-417D-905D-D0AC14A1ADFB}" dt="2025-09-08T11:57:40.991" v="2349" actId="20577"/>
-          <ac:spMkLst>
-            <pc:docMk/>
-            <pc:sldMk cId="215785741" sldId="259"/>
-            <ac:spMk id="3" creationId="{5DB4897D-2446-91E3-A8B3-40CEA1FD958D}"/>
-          </ac:spMkLst>
-        </pc:spChg>
-      </pc:sldChg>
-    </pc:docChg>
-  </pc:docChgLst>
-  <pc:docChgLst>
-    <pc:chgData name="Mrinav Saxena" userId="1ae1cb636c956b49" providerId="LiveId" clId="{3D40DB4B-8E00-40BA-9204-277439F83DB8}"/>
-    <pc:docChg chg="undo custSel modSld">
-      <pc:chgData name="Mrinav Saxena" userId="1ae1cb636c956b49" providerId="LiveId" clId="{3D40DB4B-8E00-40BA-9204-277439F83DB8}" dt="2025-09-08T16:41:22.204" v="271" actId="20577"/>
-      <pc:docMkLst>
-        <pc:docMk/>
-      </pc:docMkLst>
-      <pc:sldChg chg="modSp mod">
-        <pc:chgData name="Mrinav Saxena" userId="1ae1cb636c956b49" providerId="LiveId" clId="{3D40DB4B-8E00-40BA-9204-277439F83DB8}" dt="2025-09-08T16:34:41.498" v="185" actId="20577"/>
-        <pc:sldMkLst>
-          <pc:docMk/>
-          <pc:sldMk cId="1647670355" sldId="257"/>
-        </pc:sldMkLst>
-        <pc:spChg chg="mod">
-          <ac:chgData name="Mrinav Saxena" userId="1ae1cb636c956b49" providerId="LiveId" clId="{3D40DB4B-8E00-40BA-9204-277439F83DB8}" dt="2025-09-08T16:34:41.498" v="185" actId="20577"/>
-          <ac:spMkLst>
-            <pc:docMk/>
-            <pc:sldMk cId="1647670355" sldId="257"/>
-            <ac:spMk id="3" creationId="{8C966C7B-B9C0-9809-64F3-803671903961}"/>
-          </ac:spMkLst>
-        </pc:spChg>
-      </pc:sldChg>
-      <pc:sldChg chg="modSp mod">
-        <pc:chgData name="Mrinav Saxena" userId="1ae1cb636c956b49" providerId="LiveId" clId="{3D40DB4B-8E00-40BA-9204-277439F83DB8}" dt="2025-09-08T16:37:45.785" v="219" actId="20577"/>
-        <pc:sldMkLst>
-          <pc:docMk/>
-          <pc:sldMk cId="2839866548" sldId="258"/>
-        </pc:sldMkLst>
-        <pc:spChg chg="mod">
-          <ac:chgData name="Mrinav Saxena" userId="1ae1cb636c956b49" providerId="LiveId" clId="{3D40DB4B-8E00-40BA-9204-277439F83DB8}" dt="2025-09-08T16:37:45.785" v="219" actId="20577"/>
-          <ac:spMkLst>
-            <pc:docMk/>
-            <pc:sldMk cId="2839866548" sldId="258"/>
-            <ac:spMk id="3" creationId="{31AE0A64-38D0-C10B-F903-BA4C3D5F2C6C}"/>
-          </ac:spMkLst>
-        </pc:spChg>
-      </pc:sldChg>
-      <pc:sldChg chg="addSp delSp modSp mod modClrScheme chgLayout">
-        <pc:chgData name="Mrinav Saxena" userId="1ae1cb636c956b49" providerId="LiveId" clId="{3D40DB4B-8E00-40BA-9204-277439F83DB8}" dt="2025-09-08T16:41:22.204" v="271" actId="20577"/>
-        <pc:sldMkLst>
-          <pc:docMk/>
-          <pc:sldMk cId="215785741" sldId="259"/>
-        </pc:sldMkLst>
-        <pc:spChg chg="mod ord">
-          <ac:chgData name="Mrinav Saxena" userId="1ae1cb636c956b49" providerId="LiveId" clId="{3D40DB4B-8E00-40BA-9204-277439F83DB8}" dt="2025-09-08T15:05:27.829" v="21" actId="700"/>
-          <ac:spMkLst>
-            <pc:docMk/>
-            <pc:sldMk cId="215785741" sldId="259"/>
-            <ac:spMk id="2" creationId="{62B91B0D-EF90-6B2E-9F0A-E458FCEABBA7}"/>
-          </ac:spMkLst>
-        </pc:spChg>
-        <pc:spChg chg="mod ord">
-          <ac:chgData name="Mrinav Saxena" userId="1ae1cb636c956b49" providerId="LiveId" clId="{3D40DB4B-8E00-40BA-9204-277439F83DB8}" dt="2025-09-08T16:41:22.204" v="271" actId="20577"/>
-          <ac:spMkLst>
-            <pc:docMk/>
-            <pc:sldMk cId="215785741" sldId="259"/>
-            <ac:spMk id="3" creationId="{5DB4897D-2446-91E3-A8B3-40CEA1FD958D}"/>
-          </ac:spMkLst>
-        </pc:spChg>
-        <pc:spChg chg="add del mod ord">
-          <ac:chgData name="Mrinav Saxena" userId="1ae1cb636c956b49" providerId="LiveId" clId="{3D40DB4B-8E00-40BA-9204-277439F83DB8}" dt="2025-09-08T15:05:27.829" v="21" actId="700"/>
-          <ac:spMkLst>
-            <pc:docMk/>
-            <pc:sldMk cId="215785741" sldId="259"/>
-            <ac:spMk id="4" creationId="{E1F37A46-AF11-18C7-F0B1-4484E242EF77}"/>
-          </ac:spMkLst>
-        </pc:spChg>
-      </pc:sldChg>
-    </pc:docChg>
-  </pc:docChgLst>
-</pc:chgInfo>
 </file>
 
 <file path=ppt/slideLayouts/slideLayout1.xml><?xml version="1.0" encoding="utf-8"?>
@@ -1654,7 +1524,7 @@
           <a:p>
             <a:fld id="{5411EB86-952F-4D59-A107-BE7F3DE73819}" type="datetimeFigureOut">
               <a:rPr lang="en-IN" smtClean="0"/>
-              <a:t>08-09-2025</a:t>
+              <a:t>10-09-2025</a:t>
             </a:fld>
             <a:endParaRPr lang="en-IN"/>
           </a:p>
@@ -3113,7 +2983,7 @@
           <a:p>
             <a:fld id="{5411EB86-952F-4D59-A107-BE7F3DE73819}" type="datetimeFigureOut">
               <a:rPr lang="en-IN" smtClean="0"/>
-              <a:t>08-09-2025</a:t>
+              <a:t>10-09-2025</a:t>
             </a:fld>
             <a:endParaRPr lang="en-IN"/>
           </a:p>
@@ -4566,7 +4436,7 @@
           <a:p>
             <a:fld id="{5411EB86-952F-4D59-A107-BE7F3DE73819}" type="datetimeFigureOut">
               <a:rPr lang="en-IN" smtClean="0"/>
-              <a:t>08-09-2025</a:t>
+              <a:t>10-09-2025</a:t>
             </a:fld>
             <a:endParaRPr lang="en-IN"/>
           </a:p>
@@ -6021,7 +5891,7 @@
           <a:p>
             <a:fld id="{5411EB86-952F-4D59-A107-BE7F3DE73819}" type="datetimeFigureOut">
               <a:rPr lang="en-IN" smtClean="0"/>
-              <a:t>08-09-2025</a:t>
+              <a:t>10-09-2025</a:t>
             </a:fld>
             <a:endParaRPr lang="en-IN"/>
           </a:p>
@@ -7529,7 +7399,7 @@
           <a:p>
             <a:fld id="{5411EB86-952F-4D59-A107-BE7F3DE73819}" type="datetimeFigureOut">
               <a:rPr lang="en-IN" smtClean="0"/>
-              <a:t>08-09-2025</a:t>
+              <a:t>10-09-2025</a:t>
             </a:fld>
             <a:endParaRPr lang="en-IN"/>
           </a:p>
@@ -9050,7 +8920,7 @@
           <a:p>
             <a:fld id="{5411EB86-952F-4D59-A107-BE7F3DE73819}" type="datetimeFigureOut">
               <a:rPr lang="en-IN" smtClean="0"/>
-              <a:t>08-09-2025</a:t>
+              <a:t>10-09-2025</a:t>
             </a:fld>
             <a:endParaRPr lang="en-IN"/>
           </a:p>
@@ -10715,7 +10585,7 @@
           <a:p>
             <a:fld id="{5411EB86-952F-4D59-A107-BE7F3DE73819}" type="datetimeFigureOut">
               <a:rPr lang="en-IN" smtClean="0"/>
-              <a:t>08-09-2025</a:t>
+              <a:t>10-09-2025</a:t>
             </a:fld>
             <a:endParaRPr lang="en-IN"/>
           </a:p>
@@ -12113,7 +11983,7 @@
           <a:p>
             <a:fld id="{5411EB86-952F-4D59-A107-BE7F3DE73819}" type="datetimeFigureOut">
               <a:rPr lang="en-IN" smtClean="0"/>
-              <a:t>08-09-2025</a:t>
+              <a:t>10-09-2025</a:t>
             </a:fld>
             <a:endParaRPr lang="en-IN"/>
           </a:p>
@@ -12213,7 +12083,7 @@
           <a:p>
             <a:fld id="{5411EB86-952F-4D59-A107-BE7F3DE73819}" type="datetimeFigureOut">
               <a:rPr lang="en-IN" smtClean="0"/>
-              <a:t>08-09-2025</a:t>
+              <a:t>10-09-2025</a:t>
             </a:fld>
             <a:endParaRPr lang="en-IN"/>
           </a:p>
@@ -13739,7 +13609,7 @@
           <a:p>
             <a:fld id="{5411EB86-952F-4D59-A107-BE7F3DE73819}" type="datetimeFigureOut">
               <a:rPr lang="en-IN" smtClean="0"/>
-              <a:t>08-09-2025</a:t>
+              <a:t>10-09-2025</a:t>
             </a:fld>
             <a:endParaRPr lang="en-IN"/>
           </a:p>
@@ -15275,7 +15145,7 @@
           <a:p>
             <a:fld id="{5411EB86-952F-4D59-A107-BE7F3DE73819}" type="datetimeFigureOut">
               <a:rPr lang="en-IN" smtClean="0"/>
-              <a:t>08-09-2025</a:t>
+              <a:t>10-09-2025</a:t>
             </a:fld>
             <a:endParaRPr lang="en-IN"/>
           </a:p>
@@ -15498,7 +15368,7 @@
           <a:p>
             <a:fld id="{5411EB86-952F-4D59-A107-BE7F3DE73819}" type="datetimeFigureOut">
               <a:rPr lang="en-IN" smtClean="0"/>
-              <a:t>08-09-2025</a:t>
+              <a:t>10-09-2025</a:t>
             </a:fld>
             <a:endParaRPr lang="en-IN"/>
           </a:p>
@@ -16615,7 +16485,7 @@
             </a:r>
             <a:r>
               <a:rPr lang="en-US" dirty="0"/>
-              <a:t> – pulses high during last cycle of Wait4Instr, Wait4DataWrite or Wait4ReadData, depending upon instruction type. This should move the FSM into the </a:t>
+              <a:t> – pulses high during last cycle of Wait4Instr, Wait4DataWrite or Waitmove4ReadData, depending upon instruction type. This should the FSM into the </a:t>
             </a:r>
             <a:r>
               <a:rPr lang="en-US" dirty="0" err="1"/>
@@ -16655,15 +16525,11 @@
             </a:pPr>
             <a:r>
               <a:rPr lang="en-US" b="1" dirty="0" err="1"/>
-              <a:t>regfile_</a:t>
+              <a:t>regfile_wen_r</a:t>
             </a:r>
             <a:r>
-              <a:rPr lang="en-US" b="1" err="1"/>
-              <a:t>wen</a:t>
-            </a:r>
-            <a:r>
-              <a:rPr lang="en-US" b="1"/>
-              <a:t>_r </a:t>
+              <a:rPr lang="en-US" b="1" dirty="0"/>
+              <a:t> </a:t>
             </a:r>
             <a:r>
               <a:rPr lang="en-US" dirty="0"/>

</xml_diff>

<commit_message>
updated stall_for_mem_core documentation, working on pipelined core
</commit_message>
<xml_diff>
--- a/rtl/core/multi_cycle/stall_for_mem_core.pptx
+++ b/rtl/core/multi_cycle/stall_for_mem_core.pptx
@@ -9,6 +9,11 @@
     <p:sldId id="257" r:id="rId3"/>
     <p:sldId id="258" r:id="rId4"/>
     <p:sldId id="259" r:id="rId5"/>
+    <p:sldId id="260" r:id="rId6"/>
+    <p:sldId id="261" r:id="rId7"/>
+    <p:sldId id="262" r:id="rId8"/>
+    <p:sldId id="263" r:id="rId9"/>
+    <p:sldId id="264" r:id="rId10"/>
   </p:sldIdLst>
   <p:sldSz cx="12192000" cy="6858000"/>
   <p:notesSz cx="6858000" cy="9144000"/>
@@ -113,6 +118,212 @@
     </p:ext>
   </p:extLst>
 </p:presentation>
+</file>
+
+<file path=ppt/changesInfos/changesInfo1.xml><?xml version="1.0" encoding="utf-8"?>
+<pc:chgInfo xmlns:a="http://schemas.openxmlformats.org/drawingml/2006/main" xmlns:r="http://schemas.openxmlformats.org/officeDocument/2006/relationships" xmlns:ac="http://schemas.microsoft.com/office/drawing/2013/main/command" xmlns:pc="http://schemas.microsoft.com/office/powerpoint/2013/main/command">
+  <pc:docChgLst>
+    <pc:chgData name="Mrinav Saxena" userId="1ae1cb636c956b49" providerId="LiveId" clId="{3D40DB4B-8E00-40BA-9204-277439F83DB8}"/>
+    <pc:docChg chg="undo custSel addSld delSld modSld sldOrd">
+      <pc:chgData name="Mrinav Saxena" userId="1ae1cb636c956b49" providerId="LiveId" clId="{3D40DB4B-8E00-40BA-9204-277439F83DB8}" dt="2025-09-12T16:17:07.118" v="4768" actId="47"/>
+      <pc:docMkLst>
+        <pc:docMk/>
+      </pc:docMkLst>
+      <pc:sldChg chg="modSp new mod">
+        <pc:chgData name="Mrinav Saxena" userId="1ae1cb636c956b49" providerId="LiveId" clId="{3D40DB4B-8E00-40BA-9204-277439F83DB8}" dt="2025-09-12T10:24:00.545" v="2356" actId="20577"/>
+        <pc:sldMkLst>
+          <pc:docMk/>
+          <pc:sldMk cId="3249548730" sldId="260"/>
+        </pc:sldMkLst>
+        <pc:spChg chg="mod">
+          <ac:chgData name="Mrinav Saxena" userId="1ae1cb636c956b49" providerId="LiveId" clId="{3D40DB4B-8E00-40BA-9204-277439F83DB8}" dt="2025-09-10T16:11:52.441" v="1601" actId="27636"/>
+          <ac:spMkLst>
+            <pc:docMk/>
+            <pc:sldMk cId="3249548730" sldId="260"/>
+            <ac:spMk id="2" creationId="{BD27B2C6-F3EC-335B-20BC-7F7F94F85561}"/>
+          </ac:spMkLst>
+        </pc:spChg>
+        <pc:spChg chg="mod">
+          <ac:chgData name="Mrinav Saxena" userId="1ae1cb636c956b49" providerId="LiveId" clId="{3D40DB4B-8E00-40BA-9204-277439F83DB8}" dt="2025-09-12T10:24:00.545" v="2356" actId="20577"/>
+          <ac:spMkLst>
+            <pc:docMk/>
+            <pc:sldMk cId="3249548730" sldId="260"/>
+            <ac:spMk id="3" creationId="{8E40F20E-E245-A486-4A6D-98D6781CE4D8}"/>
+          </ac:spMkLst>
+        </pc:spChg>
+      </pc:sldChg>
+      <pc:sldChg chg="addSp delSp modSp new mod modClrScheme chgLayout">
+        <pc:chgData name="Mrinav Saxena" userId="1ae1cb636c956b49" providerId="LiveId" clId="{3D40DB4B-8E00-40BA-9204-277439F83DB8}" dt="2025-09-11T15:44:24.530" v="1754" actId="20577"/>
+        <pc:sldMkLst>
+          <pc:docMk/>
+          <pc:sldMk cId="510357335" sldId="261"/>
+        </pc:sldMkLst>
+        <pc:spChg chg="del mod ord">
+          <ac:chgData name="Mrinav Saxena" userId="1ae1cb636c956b49" providerId="LiveId" clId="{3D40DB4B-8E00-40BA-9204-277439F83DB8}" dt="2025-09-11T15:44:16.197" v="1720" actId="700"/>
+          <ac:spMkLst>
+            <pc:docMk/>
+            <pc:sldMk cId="510357335" sldId="261"/>
+            <ac:spMk id="2" creationId="{BE0042AB-11D1-76F7-E735-C7F2FB40435E}"/>
+          </ac:spMkLst>
+        </pc:spChg>
+        <pc:spChg chg="del mod ord">
+          <ac:chgData name="Mrinav Saxena" userId="1ae1cb636c956b49" providerId="LiveId" clId="{3D40DB4B-8E00-40BA-9204-277439F83DB8}" dt="2025-09-11T15:44:16.197" v="1720" actId="700"/>
+          <ac:spMkLst>
+            <pc:docMk/>
+            <pc:sldMk cId="510357335" sldId="261"/>
+            <ac:spMk id="3" creationId="{C1CAB73C-7920-1A66-4477-7F033EE28F5E}"/>
+          </ac:spMkLst>
+        </pc:spChg>
+        <pc:spChg chg="add mod ord">
+          <ac:chgData name="Mrinav Saxena" userId="1ae1cb636c956b49" providerId="LiveId" clId="{3D40DB4B-8E00-40BA-9204-277439F83DB8}" dt="2025-09-11T15:44:24.530" v="1754" actId="20577"/>
+          <ac:spMkLst>
+            <pc:docMk/>
+            <pc:sldMk cId="510357335" sldId="261"/>
+            <ac:spMk id="4" creationId="{9FDDDC87-1B28-9630-698C-F2DC6395F9C0}"/>
+          </ac:spMkLst>
+        </pc:spChg>
+        <pc:spChg chg="add mod ord">
+          <ac:chgData name="Mrinav Saxena" userId="1ae1cb636c956b49" providerId="LiveId" clId="{3D40DB4B-8E00-40BA-9204-277439F83DB8}" dt="2025-09-11T15:44:16.197" v="1720" actId="700"/>
+          <ac:spMkLst>
+            <pc:docMk/>
+            <pc:sldMk cId="510357335" sldId="261"/>
+            <ac:spMk id="5" creationId="{1FC80C77-1544-F286-A847-35F5D2D599A4}"/>
+          </ac:spMkLst>
+        </pc:spChg>
+      </pc:sldChg>
+      <pc:sldChg chg="modSp new del mod">
+        <pc:chgData name="Mrinav Saxena" userId="1ae1cb636c956b49" providerId="LiveId" clId="{3D40DB4B-8E00-40BA-9204-277439F83DB8}" dt="2025-09-10T17:22:42.984" v="1718" actId="47"/>
+        <pc:sldMkLst>
+          <pc:docMk/>
+          <pc:sldMk cId="2850493075" sldId="261"/>
+        </pc:sldMkLst>
+      </pc:sldChg>
+      <pc:sldChg chg="modSp new del mod">
+        <pc:chgData name="Mrinav Saxena" userId="1ae1cb636c956b49" providerId="LiveId" clId="{3D40DB4B-8E00-40BA-9204-277439F83DB8}" dt="2025-09-10T15:56:09.655" v="636" actId="2696"/>
+        <pc:sldMkLst>
+          <pc:docMk/>
+          <pc:sldMk cId="4151331031" sldId="261"/>
+        </pc:sldMkLst>
+      </pc:sldChg>
+      <pc:sldChg chg="addSp delSp modSp new mod ord modClrScheme chgLayout">
+        <pc:chgData name="Mrinav Saxena" userId="1ae1cb636c956b49" providerId="LiveId" clId="{3D40DB4B-8E00-40BA-9204-277439F83DB8}" dt="2025-09-12T13:27:16.378" v="3489" actId="20577"/>
+        <pc:sldMkLst>
+          <pc:docMk/>
+          <pc:sldMk cId="1305054546" sldId="262"/>
+        </pc:sldMkLst>
+        <pc:spChg chg="del mod ord">
+          <ac:chgData name="Mrinav Saxena" userId="1ae1cb636c956b49" providerId="LiveId" clId="{3D40DB4B-8E00-40BA-9204-277439F83DB8}" dt="2025-09-11T15:44:30.921" v="1756" actId="700"/>
+          <ac:spMkLst>
+            <pc:docMk/>
+            <pc:sldMk cId="1305054546" sldId="262"/>
+            <ac:spMk id="2" creationId="{DE485ABF-B5D7-FA57-9C9B-44B550AD68BA}"/>
+          </ac:spMkLst>
+        </pc:spChg>
+        <pc:spChg chg="del mod ord">
+          <ac:chgData name="Mrinav Saxena" userId="1ae1cb636c956b49" providerId="LiveId" clId="{3D40DB4B-8E00-40BA-9204-277439F83DB8}" dt="2025-09-11T15:44:30.921" v="1756" actId="700"/>
+          <ac:spMkLst>
+            <pc:docMk/>
+            <pc:sldMk cId="1305054546" sldId="262"/>
+            <ac:spMk id="3" creationId="{BFD79450-C93E-DD47-C54B-9CD56F70C229}"/>
+          </ac:spMkLst>
+        </pc:spChg>
+        <pc:spChg chg="add mod ord">
+          <ac:chgData name="Mrinav Saxena" userId="1ae1cb636c956b49" providerId="LiveId" clId="{3D40DB4B-8E00-40BA-9204-277439F83DB8}" dt="2025-09-12T10:21:00.736" v="2151" actId="20577"/>
+          <ac:spMkLst>
+            <pc:docMk/>
+            <pc:sldMk cId="1305054546" sldId="262"/>
+            <ac:spMk id="4" creationId="{D4713605-59E1-BB2F-0B98-04BCF86388B9}"/>
+          </ac:spMkLst>
+        </pc:spChg>
+        <pc:spChg chg="add mod ord">
+          <ac:chgData name="Mrinav Saxena" userId="1ae1cb636c956b49" providerId="LiveId" clId="{3D40DB4B-8E00-40BA-9204-277439F83DB8}" dt="2025-09-12T13:27:16.378" v="3489" actId="20577"/>
+          <ac:spMkLst>
+            <pc:docMk/>
+            <pc:sldMk cId="1305054546" sldId="262"/>
+            <ac:spMk id="5" creationId="{A29AF127-DF75-F174-9902-1DE86F49A667}"/>
+          </ac:spMkLst>
+        </pc:spChg>
+      </pc:sldChg>
+      <pc:sldChg chg="addSp delSp modSp new mod ord">
+        <pc:chgData name="Mrinav Saxena" userId="1ae1cb636c956b49" providerId="LiveId" clId="{3D40DB4B-8E00-40BA-9204-277439F83DB8}" dt="2025-09-12T13:39:57.187" v="4044"/>
+        <pc:sldMkLst>
+          <pc:docMk/>
+          <pc:sldMk cId="1202657133" sldId="263"/>
+        </pc:sldMkLst>
+        <pc:spChg chg="mod">
+          <ac:chgData name="Mrinav Saxena" userId="1ae1cb636c956b49" providerId="LiveId" clId="{3D40DB4B-8E00-40BA-9204-277439F83DB8}" dt="2025-09-12T13:27:25.645" v="3506" actId="20577"/>
+          <ac:spMkLst>
+            <pc:docMk/>
+            <pc:sldMk cId="1202657133" sldId="263"/>
+            <ac:spMk id="2" creationId="{018A396C-AE39-630F-E825-0C7060CDE593}"/>
+          </ac:spMkLst>
+        </pc:spChg>
+        <pc:spChg chg="del mod">
+          <ac:chgData name="Mrinav Saxena" userId="1ae1cb636c956b49" providerId="LiveId" clId="{3D40DB4B-8E00-40BA-9204-277439F83DB8}" dt="2025-09-12T13:21:28.836" v="3403"/>
+          <ac:spMkLst>
+            <pc:docMk/>
+            <pc:sldMk cId="1202657133" sldId="263"/>
+            <ac:spMk id="3" creationId="{C28E898B-3973-DE31-6D2E-A5D2A8131484}"/>
+          </ac:spMkLst>
+        </pc:spChg>
+        <pc:graphicFrameChg chg="add mod modGraphic">
+          <ac:chgData name="Mrinav Saxena" userId="1ae1cb636c956b49" providerId="LiveId" clId="{3D40DB4B-8E00-40BA-9204-277439F83DB8}" dt="2025-09-12T13:39:57.187" v="4044"/>
+          <ac:graphicFrameMkLst>
+            <pc:docMk/>
+            <pc:sldMk cId="1202657133" sldId="263"/>
+            <ac:graphicFrameMk id="4" creationId="{915EC60D-AA6F-5CF0-FF9C-ABB7CCBEB8DA}"/>
+          </ac:graphicFrameMkLst>
+        </pc:graphicFrameChg>
+      </pc:sldChg>
+      <pc:sldChg chg="modSp new mod">
+        <pc:chgData name="Mrinav Saxena" userId="1ae1cb636c956b49" providerId="LiveId" clId="{3D40DB4B-8E00-40BA-9204-277439F83DB8}" dt="2025-09-12T13:57:57.898" v="4317" actId="20577"/>
+        <pc:sldMkLst>
+          <pc:docMk/>
+          <pc:sldMk cId="3870776936" sldId="264"/>
+        </pc:sldMkLst>
+        <pc:spChg chg="mod">
+          <ac:chgData name="Mrinav Saxena" userId="1ae1cb636c956b49" providerId="LiveId" clId="{3D40DB4B-8E00-40BA-9204-277439F83DB8}" dt="2025-09-12T13:29:27.435" v="3628" actId="20577"/>
+          <ac:spMkLst>
+            <pc:docMk/>
+            <pc:sldMk cId="3870776936" sldId="264"/>
+            <ac:spMk id="2" creationId="{F101F18A-163F-9584-BE91-C99B6C7D5A36}"/>
+          </ac:spMkLst>
+        </pc:spChg>
+        <pc:spChg chg="mod">
+          <ac:chgData name="Mrinav Saxena" userId="1ae1cb636c956b49" providerId="LiveId" clId="{3D40DB4B-8E00-40BA-9204-277439F83DB8}" dt="2025-09-12T13:57:57.898" v="4317" actId="20577"/>
+          <ac:spMkLst>
+            <pc:docMk/>
+            <pc:sldMk cId="3870776936" sldId="264"/>
+            <ac:spMk id="3" creationId="{948BA2FE-505D-C974-A64C-441CB0213840}"/>
+          </ac:spMkLst>
+        </pc:spChg>
+      </pc:sldChg>
+      <pc:sldChg chg="modSp new del mod">
+        <pc:chgData name="Mrinav Saxena" userId="1ae1cb636c956b49" providerId="LiveId" clId="{3D40DB4B-8E00-40BA-9204-277439F83DB8}" dt="2025-09-12T16:17:07.118" v="4768" actId="47"/>
+        <pc:sldMkLst>
+          <pc:docMk/>
+          <pc:sldMk cId="1805593589" sldId="265"/>
+        </pc:sldMkLst>
+        <pc:spChg chg="mod">
+          <ac:chgData name="Mrinav Saxena" userId="1ae1cb636c956b49" providerId="LiveId" clId="{3D40DB4B-8E00-40BA-9204-277439F83DB8}" dt="2025-09-12T13:58:06.701" v="4337" actId="20577"/>
+          <ac:spMkLst>
+            <pc:docMk/>
+            <pc:sldMk cId="1805593589" sldId="265"/>
+            <ac:spMk id="2" creationId="{418A7A37-4802-7686-92AF-FFA8D5527EB4}"/>
+          </ac:spMkLst>
+        </pc:spChg>
+        <pc:spChg chg="mod">
+          <ac:chgData name="Mrinav Saxena" userId="1ae1cb636c956b49" providerId="LiveId" clId="{3D40DB4B-8E00-40BA-9204-277439F83DB8}" dt="2025-09-12T14:01:53.960" v="4767" actId="20577"/>
+          <ac:spMkLst>
+            <pc:docMk/>
+            <pc:sldMk cId="1805593589" sldId="265"/>
+            <ac:spMk id="3" creationId="{C0D3FCA1-C3DB-4504-7EE6-6A308927D8F7}"/>
+          </ac:spMkLst>
+        </pc:spChg>
+      </pc:sldChg>
+    </pc:docChg>
+  </pc:docChgLst>
+</pc:chgInfo>
 </file>
 
 <file path=ppt/slideLayouts/slideLayout1.xml><?xml version="1.0" encoding="utf-8"?>
@@ -16675,6 +16886,2770 @@
 </p:sld>
 </file>
 
+<file path=ppt/slides/slide5.xml><?xml version="1.0" encoding="utf-8"?>
+<p:sld xmlns:a="http://schemas.openxmlformats.org/drawingml/2006/main" xmlns:r="http://schemas.openxmlformats.org/officeDocument/2006/relationships" xmlns:p="http://schemas.openxmlformats.org/presentationml/2006/main">
+  <p:cSld>
+    <p:spTree>
+      <p:nvGrpSpPr>
+        <p:cNvPr id="1" name=""/>
+        <p:cNvGrpSpPr/>
+        <p:nvPr/>
+      </p:nvGrpSpPr>
+      <p:grpSpPr>
+        <a:xfrm>
+          <a:off x="0" y="0"/>
+          <a:ext cx="0" cy="0"/>
+          <a:chOff x="0" y="0"/>
+          <a:chExt cx="0" cy="0"/>
+        </a:xfrm>
+      </p:grpSpPr>
+      <p:sp>
+        <p:nvSpPr>
+          <p:cNvPr id="2" name="Title 1">
+            <a:extLst>
+              <a:ext uri="{FF2B5EF4-FFF2-40B4-BE49-F238E27FC236}">
+                <a16:creationId xmlns:a16="http://schemas.microsoft.com/office/drawing/2014/main" id="{BD27B2C6-F3EC-335B-20BC-7F7F94F85561}"/>
+              </a:ext>
+            </a:extLst>
+          </p:cNvPr>
+          <p:cNvSpPr>
+            <a:spLocks noGrp="1"/>
+          </p:cNvSpPr>
+          <p:nvPr>
+            <p:ph type="title"/>
+          </p:nvPr>
+        </p:nvSpPr>
+        <p:spPr/>
+        <p:txBody>
+          <a:bodyPr>
+            <a:normAutofit fontScale="90000"/>
+          </a:bodyPr>
+          <a:lstStyle/>
+          <a:p>
+            <a:r>
+              <a:rPr lang="en-US" dirty="0"/>
+              <a:t>Stats</a:t>
+            </a:r>
+            <a:br>
+              <a:rPr lang="en-US" dirty="0"/>
+            </a:br>
+            <a:r>
+              <a:rPr lang="en-US" dirty="0"/>
+              <a:t>+</a:t>
+            </a:r>
+            <a:br>
+              <a:rPr lang="en-US" dirty="0"/>
+            </a:br>
+            <a:r>
+              <a:rPr lang="en-US" dirty="0"/>
+              <a:t>Possible Improvements</a:t>
+            </a:r>
+            <a:endParaRPr lang="en-IN" dirty="0"/>
+          </a:p>
+        </p:txBody>
+      </p:sp>
+      <p:sp>
+        <p:nvSpPr>
+          <p:cNvPr id="3" name="Content Placeholder 2">
+            <a:extLst>
+              <a:ext uri="{FF2B5EF4-FFF2-40B4-BE49-F238E27FC236}">
+                <a16:creationId xmlns:a16="http://schemas.microsoft.com/office/drawing/2014/main" id="{8E40F20E-E245-A486-4A6D-98D6781CE4D8}"/>
+              </a:ext>
+            </a:extLst>
+          </p:cNvPr>
+          <p:cNvSpPr>
+            <a:spLocks noGrp="1"/>
+          </p:cNvSpPr>
+          <p:nvPr>
+            <p:ph idx="1"/>
+          </p:nvPr>
+        </p:nvSpPr>
+        <p:spPr/>
+        <p:txBody>
+          <a:bodyPr/>
+          <a:lstStyle/>
+          <a:p>
+            <a:r>
+              <a:rPr lang="en-US" dirty="0"/>
+              <a:t>For </a:t>
+            </a:r>
+            <a:r>
+              <a:rPr lang="en-US" dirty="0" err="1"/>
+              <a:t>linked_list.c</a:t>
+            </a:r>
+            <a:r>
+              <a:rPr lang="en-US" dirty="0"/>
+              <a:t>, </a:t>
+            </a:r>
+            <a:r>
+              <a:rPr lang="en-US" dirty="0" err="1"/>
+              <a:t>single_cycle_core</a:t>
+            </a:r>
+            <a:r>
+              <a:rPr lang="en-US" dirty="0"/>
+              <a:t> takes ~4.78us to execute, where as </a:t>
+            </a:r>
+            <a:r>
+              <a:rPr lang="en-US" dirty="0" err="1"/>
+              <a:t>stall_for_mem_core</a:t>
+            </a:r>
+            <a:r>
+              <a:rPr lang="en-US" dirty="0"/>
+              <a:t> takes ~30.75us. This (6.43x slowdown) is expected with the slower non-zero latency memory. A few improvements can be made here –</a:t>
+            </a:r>
+          </a:p>
+          <a:p>
+            <a:pPr marL="800100" lvl="1" indent="-342900">
+              <a:buFont typeface="+mj-lt"/>
+              <a:buAutoNum type="arabicPeriod"/>
+            </a:pPr>
+            <a:r>
+              <a:rPr lang="en-US" dirty="0"/>
+              <a:t>The instruction and data memory accesses can be pipelined </a:t>
+            </a:r>
+            <a:r>
+              <a:rPr lang="en-US" dirty="0">
+                <a:sym typeface="Wingdings" panose="05000000000000000000" pitchFamily="2" charset="2"/>
+              </a:rPr>
+              <a:t> core : stall4mem_pip_core</a:t>
+            </a:r>
+            <a:endParaRPr lang="en-US" dirty="0"/>
+          </a:p>
+          <a:p>
+            <a:pPr marL="800100" lvl="1" indent="-342900">
+              <a:buFont typeface="+mj-lt"/>
+              <a:buAutoNum type="arabicPeriod"/>
+            </a:pPr>
+            <a:r>
+              <a:rPr lang="en-US" dirty="0"/>
+              <a:t>(Assuming it’s feasible) Both instruction and data memory can utilize caches which fetch blocks of words. *perhaps with the assumption that this comes at the cost of greater latency </a:t>
+            </a:r>
+            <a:r>
+              <a:rPr lang="en-US" dirty="0">
+                <a:sym typeface="Wingdings" panose="05000000000000000000" pitchFamily="2" charset="2"/>
+              </a:rPr>
+              <a:t> stall4mem_</a:t>
+            </a:r>
+            <a:endParaRPr lang="en-US" dirty="0"/>
+          </a:p>
+        </p:txBody>
+      </p:sp>
+    </p:spTree>
+    <p:extLst>
+      <p:ext uri="{BB962C8B-B14F-4D97-AF65-F5344CB8AC3E}">
+        <p14:creationId xmlns:p14="http://schemas.microsoft.com/office/powerpoint/2010/main" val="3249548730"/>
+      </p:ext>
+    </p:extLst>
+  </p:cSld>
+  <p:clrMapOvr>
+    <a:masterClrMapping/>
+  </p:clrMapOvr>
+</p:sld>
+</file>
+
+<file path=ppt/slides/slide6.xml><?xml version="1.0" encoding="utf-8"?>
+<p:sld xmlns:a="http://schemas.openxmlformats.org/drawingml/2006/main" xmlns:r="http://schemas.openxmlformats.org/officeDocument/2006/relationships" xmlns:p="http://schemas.openxmlformats.org/presentationml/2006/main">
+  <p:cSld>
+    <p:spTree>
+      <p:nvGrpSpPr>
+        <p:cNvPr id="1" name=""/>
+        <p:cNvGrpSpPr/>
+        <p:nvPr/>
+      </p:nvGrpSpPr>
+      <p:grpSpPr>
+        <a:xfrm>
+          <a:off x="0" y="0"/>
+          <a:ext cx="0" cy="0"/>
+          <a:chOff x="0" y="0"/>
+          <a:chExt cx="0" cy="0"/>
+        </a:xfrm>
+      </p:grpSpPr>
+      <p:sp>
+        <p:nvSpPr>
+          <p:cNvPr id="4" name="Title 3">
+            <a:extLst>
+              <a:ext uri="{FF2B5EF4-FFF2-40B4-BE49-F238E27FC236}">
+                <a16:creationId xmlns:a16="http://schemas.microsoft.com/office/drawing/2014/main" id="{9FDDDC87-1B28-9630-698C-F2DC6395F9C0}"/>
+              </a:ext>
+            </a:extLst>
+          </p:cNvPr>
+          <p:cNvSpPr>
+            <a:spLocks noGrp="1"/>
+          </p:cNvSpPr>
+          <p:nvPr>
+            <p:ph type="title"/>
+          </p:nvPr>
+        </p:nvSpPr>
+        <p:spPr/>
+        <p:txBody>
+          <a:bodyPr/>
+          <a:lstStyle/>
+          <a:p>
+            <a:r>
+              <a:rPr lang="en-US" dirty="0"/>
+              <a:t>Stall For Mem</a:t>
+            </a:r>
+            <a:br>
+              <a:rPr lang="en-US" dirty="0"/>
+            </a:br>
+            <a:r>
+              <a:rPr lang="en-US" dirty="0"/>
+              <a:t>Pipelined Core</a:t>
+            </a:r>
+            <a:endParaRPr lang="en-IN" dirty="0"/>
+          </a:p>
+        </p:txBody>
+      </p:sp>
+      <p:sp>
+        <p:nvSpPr>
+          <p:cNvPr id="5" name="Text Placeholder 4">
+            <a:extLst>
+              <a:ext uri="{FF2B5EF4-FFF2-40B4-BE49-F238E27FC236}">
+                <a16:creationId xmlns:a16="http://schemas.microsoft.com/office/drawing/2014/main" id="{1FC80C77-1544-F286-A847-35F5D2D599A4}"/>
+              </a:ext>
+            </a:extLst>
+          </p:cNvPr>
+          <p:cNvSpPr>
+            <a:spLocks noGrp="1"/>
+          </p:cNvSpPr>
+          <p:nvPr>
+            <p:ph type="body" idx="1"/>
+          </p:nvPr>
+        </p:nvSpPr>
+        <p:spPr/>
+        <p:txBody>
+          <a:bodyPr/>
+          <a:lstStyle/>
+          <a:p>
+            <a:endParaRPr lang="en-IN"/>
+          </a:p>
+        </p:txBody>
+      </p:sp>
+    </p:spTree>
+    <p:extLst>
+      <p:ext uri="{BB962C8B-B14F-4D97-AF65-F5344CB8AC3E}">
+        <p14:creationId xmlns:p14="http://schemas.microsoft.com/office/powerpoint/2010/main" val="510357335"/>
+      </p:ext>
+    </p:extLst>
+  </p:cSld>
+  <p:clrMapOvr>
+    <a:masterClrMapping/>
+  </p:clrMapOvr>
+</p:sld>
+</file>
+
+<file path=ppt/slides/slide7.xml><?xml version="1.0" encoding="utf-8"?>
+<p:sld xmlns:a="http://schemas.openxmlformats.org/drawingml/2006/main" xmlns:r="http://schemas.openxmlformats.org/officeDocument/2006/relationships" xmlns:p="http://schemas.openxmlformats.org/presentationml/2006/main">
+  <p:cSld>
+    <p:spTree>
+      <p:nvGrpSpPr>
+        <p:cNvPr id="1" name=""/>
+        <p:cNvGrpSpPr/>
+        <p:nvPr/>
+      </p:nvGrpSpPr>
+      <p:grpSpPr>
+        <a:xfrm>
+          <a:off x="0" y="0"/>
+          <a:ext cx="0" cy="0"/>
+          <a:chOff x="0" y="0"/>
+          <a:chExt cx="0" cy="0"/>
+        </a:xfrm>
+      </p:grpSpPr>
+      <p:sp>
+        <p:nvSpPr>
+          <p:cNvPr id="4" name="Title 3">
+            <a:extLst>
+              <a:ext uri="{FF2B5EF4-FFF2-40B4-BE49-F238E27FC236}">
+                <a16:creationId xmlns:a16="http://schemas.microsoft.com/office/drawing/2014/main" id="{D4713605-59E1-BB2F-0B98-04BCF86388B9}"/>
+              </a:ext>
+            </a:extLst>
+          </p:cNvPr>
+          <p:cNvSpPr>
+            <a:spLocks noGrp="1"/>
+          </p:cNvSpPr>
+          <p:nvPr>
+            <p:ph type="title"/>
+          </p:nvPr>
+        </p:nvSpPr>
+        <p:spPr/>
+        <p:txBody>
+          <a:bodyPr/>
+          <a:lstStyle/>
+          <a:p>
+            <a:r>
+              <a:rPr lang="en-US" dirty="0"/>
+              <a:t>Notes</a:t>
+            </a:r>
+            <a:endParaRPr lang="en-IN" dirty="0"/>
+          </a:p>
+        </p:txBody>
+      </p:sp>
+      <p:sp>
+        <p:nvSpPr>
+          <p:cNvPr id="5" name="Content Placeholder 4">
+            <a:extLst>
+              <a:ext uri="{FF2B5EF4-FFF2-40B4-BE49-F238E27FC236}">
+                <a16:creationId xmlns:a16="http://schemas.microsoft.com/office/drawing/2014/main" id="{A29AF127-DF75-F174-9902-1DE86F49A667}"/>
+              </a:ext>
+            </a:extLst>
+          </p:cNvPr>
+          <p:cNvSpPr>
+            <a:spLocks noGrp="1"/>
+          </p:cNvSpPr>
+          <p:nvPr>
+            <p:ph idx="1"/>
+          </p:nvPr>
+        </p:nvSpPr>
+        <p:spPr/>
+        <p:txBody>
+          <a:bodyPr/>
+          <a:lstStyle/>
+          <a:p>
+            <a:r>
+              <a:rPr lang="en-US" dirty="0"/>
+              <a:t>In the current implementation, since all sub-blocks (except memory) are combinational, memory access latency is the rate-limiting factor.</a:t>
+            </a:r>
+          </a:p>
+          <a:p>
+            <a:r>
+              <a:rPr lang="en-US" dirty="0"/>
+              <a:t>Goal – always be performing some instruction fetch, and / or some data memory access. Process whatever can be processed.</a:t>
+            </a:r>
+          </a:p>
+          <a:p>
+            <a:r>
+              <a:rPr lang="en-US" dirty="0"/>
+              <a:t>Constraints – In order commits to </a:t>
+            </a:r>
+            <a:r>
+              <a:rPr lang="en-US" dirty="0" err="1"/>
+              <a:t>RegFile</a:t>
+            </a:r>
+            <a:r>
+              <a:rPr lang="en-US" dirty="0"/>
+              <a:t> and Data Memory.</a:t>
+            </a:r>
+          </a:p>
+        </p:txBody>
+      </p:sp>
+    </p:spTree>
+    <p:extLst>
+      <p:ext uri="{BB962C8B-B14F-4D97-AF65-F5344CB8AC3E}">
+        <p14:creationId xmlns:p14="http://schemas.microsoft.com/office/powerpoint/2010/main" val="1305054546"/>
+      </p:ext>
+    </p:extLst>
+  </p:cSld>
+  <p:clrMapOvr>
+    <a:masterClrMapping/>
+  </p:clrMapOvr>
+</p:sld>
+</file>
+
+<file path=ppt/slides/slide8.xml><?xml version="1.0" encoding="utf-8"?>
+<p:sld xmlns:a="http://schemas.openxmlformats.org/drawingml/2006/main" xmlns:r="http://schemas.openxmlformats.org/officeDocument/2006/relationships" xmlns:p="http://schemas.openxmlformats.org/presentationml/2006/main">
+  <p:cSld>
+    <p:spTree>
+      <p:nvGrpSpPr>
+        <p:cNvPr id="1" name=""/>
+        <p:cNvGrpSpPr/>
+        <p:nvPr/>
+      </p:nvGrpSpPr>
+      <p:grpSpPr>
+        <a:xfrm>
+          <a:off x="0" y="0"/>
+          <a:ext cx="0" cy="0"/>
+          <a:chOff x="0" y="0"/>
+          <a:chExt cx="0" cy="0"/>
+        </a:xfrm>
+      </p:grpSpPr>
+      <p:sp>
+        <p:nvSpPr>
+          <p:cNvPr id="2" name="Title 1">
+            <a:extLst>
+              <a:ext uri="{FF2B5EF4-FFF2-40B4-BE49-F238E27FC236}">
+                <a16:creationId xmlns:a16="http://schemas.microsoft.com/office/drawing/2014/main" id="{018A396C-AE39-630F-E825-0C7060CDE593}"/>
+              </a:ext>
+            </a:extLst>
+          </p:cNvPr>
+          <p:cNvSpPr>
+            <a:spLocks noGrp="1"/>
+          </p:cNvSpPr>
+          <p:nvPr>
+            <p:ph type="title"/>
+          </p:nvPr>
+        </p:nvSpPr>
+        <p:spPr/>
+        <p:txBody>
+          <a:bodyPr/>
+          <a:lstStyle/>
+          <a:p>
+            <a:r>
+              <a:rPr lang="en-US" dirty="0"/>
+              <a:t>Dependency Table for Instructions</a:t>
+            </a:r>
+            <a:endParaRPr lang="en-IN" dirty="0"/>
+          </a:p>
+        </p:txBody>
+      </p:sp>
+      <p:graphicFrame>
+        <p:nvGraphicFramePr>
+          <p:cNvPr id="4" name="Content Placeholder 3">
+            <a:extLst>
+              <a:ext uri="{FF2B5EF4-FFF2-40B4-BE49-F238E27FC236}">
+                <a16:creationId xmlns:a16="http://schemas.microsoft.com/office/drawing/2014/main" id="{915EC60D-AA6F-5CF0-FF9C-ABB7CCBEB8DA}"/>
+              </a:ext>
+            </a:extLst>
+          </p:cNvPr>
+          <p:cNvGraphicFramePr>
+            <a:graphicFrameLocks noGrp="1"/>
+          </p:cNvGraphicFramePr>
+          <p:nvPr>
+            <p:ph idx="1"/>
+            <p:extLst>
+              <p:ext uri="{D42A27DB-BD31-4B8C-83A1-F6EECF244321}">
+                <p14:modId xmlns:p14="http://schemas.microsoft.com/office/powerpoint/2010/main" val="3047770942"/>
+              </p:ext>
+            </p:extLst>
+          </p:nvPr>
+        </p:nvGraphicFramePr>
+        <p:xfrm>
+          <a:off x="4745257" y="1607419"/>
+          <a:ext cx="6839999" cy="3396988"/>
+        </p:xfrm>
+        <a:graphic>
+          <a:graphicData uri="http://schemas.openxmlformats.org/drawingml/2006/table">
+            <a:tbl>
+              <a:tblPr>
+                <a:tableStyleId>{B301B821-A1FF-4177-AEE7-76D212191A09}</a:tableStyleId>
+              </a:tblPr>
+              <a:tblGrid>
+                <a:gridCol w="1174848">
+                  <a:extLst>
+                    <a:ext uri="{9D8B030D-6E8A-4147-A177-3AD203B41FA5}">
+                      <a16:colId xmlns:a16="http://schemas.microsoft.com/office/drawing/2014/main" val="3861973221"/>
+                    </a:ext>
+                  </a:extLst>
+                </a:gridCol>
+                <a:gridCol w="906025">
+                  <a:extLst>
+                    <a:ext uri="{9D8B030D-6E8A-4147-A177-3AD203B41FA5}">
+                      <a16:colId xmlns:a16="http://schemas.microsoft.com/office/drawing/2014/main" val="687869544"/>
+                    </a:ext>
+                  </a:extLst>
+                </a:gridCol>
+                <a:gridCol w="906025">
+                  <a:extLst>
+                    <a:ext uri="{9D8B030D-6E8A-4147-A177-3AD203B41FA5}">
+                      <a16:colId xmlns:a16="http://schemas.microsoft.com/office/drawing/2014/main" val="735295253"/>
+                    </a:ext>
+                  </a:extLst>
+                </a:gridCol>
+                <a:gridCol w="906025">
+                  <a:extLst>
+                    <a:ext uri="{9D8B030D-6E8A-4147-A177-3AD203B41FA5}">
+                      <a16:colId xmlns:a16="http://schemas.microsoft.com/office/drawing/2014/main" val="4249135448"/>
+                    </a:ext>
+                  </a:extLst>
+                </a:gridCol>
+                <a:gridCol w="1055371">
+                  <a:extLst>
+                    <a:ext uri="{9D8B030D-6E8A-4147-A177-3AD203B41FA5}">
+                      <a16:colId xmlns:a16="http://schemas.microsoft.com/office/drawing/2014/main" val="2558034474"/>
+                    </a:ext>
+                  </a:extLst>
+                </a:gridCol>
+                <a:gridCol w="716857">
+                  <a:extLst>
+                    <a:ext uri="{9D8B030D-6E8A-4147-A177-3AD203B41FA5}">
+                      <a16:colId xmlns:a16="http://schemas.microsoft.com/office/drawing/2014/main" val="1258530854"/>
+                    </a:ext>
+                  </a:extLst>
+                </a:gridCol>
+                <a:gridCol w="1174848">
+                  <a:extLst>
+                    <a:ext uri="{9D8B030D-6E8A-4147-A177-3AD203B41FA5}">
+                      <a16:colId xmlns:a16="http://schemas.microsoft.com/office/drawing/2014/main" val="3458488892"/>
+                    </a:ext>
+                  </a:extLst>
+                </a:gridCol>
+              </a:tblGrid>
+              <a:tr h="344691">
+                <a:tc>
+                  <a:txBody>
+                    <a:bodyPr/>
+                    <a:lstStyle/>
+                    <a:p>
+                      <a:pPr algn="ctr" fontAlgn="b">
+                        <a:buNone/>
+                      </a:pPr>
+                      <a:endParaRPr lang="en-IN" sz="1400" b="1" i="0" u="none" strike="noStrike" dirty="0">
+                        <a:solidFill>
+                          <a:srgbClr val="000000"/>
+                        </a:solidFill>
+                        <a:effectLst/>
+                        <a:latin typeface="Calibri" panose="020F0502020204030204" pitchFamily="34" charset="0"/>
+                      </a:endParaRPr>
+                    </a:p>
+                  </a:txBody>
+                  <a:tcPr marL="6350" marR="6350" marT="6350" marB="0" anchor="ctr">
+                    <a:lnR w="12700" cap="flat" cmpd="sng" algn="ctr">
+                      <a:solidFill>
+                        <a:schemeClr val="tx1"/>
+                      </a:solidFill>
+                      <a:prstDash val="solid"/>
+                      <a:round/>
+                      <a:headEnd type="none" w="med" len="med"/>
+                      <a:tailEnd type="none" w="med" len="med"/>
+                    </a:lnR>
+                  </a:tcPr>
+                </a:tc>
+                <a:tc gridSpan="2">
+                  <a:txBody>
+                    <a:bodyPr/>
+                    <a:lstStyle/>
+                    <a:p>
+                      <a:pPr algn="ctr" fontAlgn="b">
+                        <a:buNone/>
+                      </a:pPr>
+                      <a:r>
+                        <a:rPr lang="en-IN" sz="1400" b="1" u="none" strike="noStrike" dirty="0">
+                          <a:effectLst/>
+                        </a:rPr>
+                        <a:t>operands needed</a:t>
+                      </a:r>
+                      <a:endParaRPr lang="en-IN" sz="1400" b="1" i="0" u="none" strike="noStrike" dirty="0">
+                        <a:solidFill>
+                          <a:srgbClr val="000000"/>
+                        </a:solidFill>
+                        <a:effectLst/>
+                        <a:latin typeface="Calibri" panose="020F0502020204030204" pitchFamily="34" charset="0"/>
+                      </a:endParaRPr>
+                    </a:p>
+                  </a:txBody>
+                  <a:tcPr marL="6350" marR="6350" marT="6350" marB="0" anchor="ctr">
+                    <a:lnL w="12700" cap="flat" cmpd="sng" algn="ctr">
+                      <a:solidFill>
+                        <a:schemeClr val="tx1"/>
+                      </a:solidFill>
+                      <a:prstDash val="solid"/>
+                      <a:round/>
+                      <a:headEnd type="none" w="med" len="med"/>
+                      <a:tailEnd type="none" w="med" len="med"/>
+                    </a:lnL>
+                    <a:lnR w="12700" cap="flat" cmpd="sng" algn="ctr">
+                      <a:solidFill>
+                        <a:schemeClr val="tx1"/>
+                      </a:solidFill>
+                      <a:prstDash val="solid"/>
+                      <a:round/>
+                      <a:headEnd type="none" w="med" len="med"/>
+                      <a:tailEnd type="none" w="med" len="med"/>
+                    </a:lnR>
+                  </a:tcPr>
+                </a:tc>
+                <a:tc hMerge="1">
+                  <a:txBody>
+                    <a:bodyPr/>
+                    <a:lstStyle/>
+                    <a:p>
+                      <a:endParaRPr lang="en-IN"/>
+                    </a:p>
+                  </a:txBody>
+                  <a:tcPr/>
+                </a:tc>
+                <a:tc rowSpan="2">
+                  <a:txBody>
+                    <a:bodyPr/>
+                    <a:lstStyle/>
+                    <a:p>
+                      <a:pPr algn="ctr" fontAlgn="b">
+                        <a:buNone/>
+                      </a:pPr>
+                      <a:r>
+                        <a:rPr lang="en-IN" sz="1400" b="1" u="none" strike="noStrike" dirty="0">
+                          <a:effectLst/>
+                        </a:rPr>
+                        <a:t>produces </a:t>
+                      </a:r>
+                      <a:r>
+                        <a:rPr lang="en-IN" sz="1400" b="1" u="none" strike="noStrike" dirty="0" err="1">
+                          <a:effectLst/>
+                        </a:rPr>
+                        <a:t>rd</a:t>
+                      </a:r>
+                      <a:r>
+                        <a:rPr lang="en-IN" sz="1400" b="1" u="none" strike="noStrike" dirty="0">
+                          <a:effectLst/>
+                        </a:rPr>
+                        <a:t>?</a:t>
+                      </a:r>
+                      <a:endParaRPr lang="en-IN" sz="1400" b="1" i="0" u="none" strike="noStrike" dirty="0">
+                        <a:solidFill>
+                          <a:srgbClr val="000000"/>
+                        </a:solidFill>
+                        <a:effectLst/>
+                        <a:latin typeface="Calibri" panose="020F0502020204030204" pitchFamily="34" charset="0"/>
+                      </a:endParaRPr>
+                    </a:p>
+                  </a:txBody>
+                  <a:tcPr marL="6350" marR="6350" marT="6350" marB="0" anchor="ctr">
+                    <a:lnL w="12700" cap="flat" cmpd="sng" algn="ctr">
+                      <a:solidFill>
+                        <a:schemeClr val="tx1"/>
+                      </a:solidFill>
+                      <a:prstDash val="solid"/>
+                      <a:round/>
+                      <a:headEnd type="none" w="med" len="med"/>
+                      <a:tailEnd type="none" w="med" len="med"/>
+                    </a:lnL>
+                    <a:lnR w="12700" cap="flat" cmpd="sng" algn="ctr">
+                      <a:solidFill>
+                        <a:schemeClr val="tx1"/>
+                      </a:solidFill>
+                      <a:prstDash val="solid"/>
+                      <a:round/>
+                      <a:headEnd type="none" w="med" len="med"/>
+                      <a:tailEnd type="none" w="med" len="med"/>
+                    </a:lnR>
+                  </a:tcPr>
+                </a:tc>
+                <a:tc gridSpan="3">
+                  <a:txBody>
+                    <a:bodyPr/>
+                    <a:lstStyle/>
+                    <a:p>
+                      <a:pPr algn="ctr" fontAlgn="b">
+                        <a:buNone/>
+                      </a:pPr>
+                      <a:r>
+                        <a:rPr lang="en-IN" sz="1400" b="1" u="none" strike="noStrike" dirty="0">
+                          <a:effectLst/>
+                        </a:rPr>
+                        <a:t>instruction complete at</a:t>
+                      </a:r>
+                      <a:endParaRPr lang="en-IN" sz="1400" b="1" i="0" u="none" strike="noStrike" dirty="0">
+                        <a:solidFill>
+                          <a:srgbClr val="000000"/>
+                        </a:solidFill>
+                        <a:effectLst/>
+                        <a:latin typeface="Calibri" panose="020F0502020204030204" pitchFamily="34" charset="0"/>
+                      </a:endParaRPr>
+                    </a:p>
+                  </a:txBody>
+                  <a:tcPr marL="6350" marR="6350" marT="6350" marB="0" anchor="ctr">
+                    <a:lnL w="12700" cap="flat" cmpd="sng" algn="ctr">
+                      <a:solidFill>
+                        <a:schemeClr val="tx1"/>
+                      </a:solidFill>
+                      <a:prstDash val="solid"/>
+                      <a:round/>
+                      <a:headEnd type="none" w="med" len="med"/>
+                      <a:tailEnd type="none" w="med" len="med"/>
+                    </a:lnL>
+                    <a:lnR w="12700" cap="flat" cmpd="sng" algn="ctr">
+                      <a:solidFill>
+                        <a:schemeClr val="tx1"/>
+                      </a:solidFill>
+                      <a:prstDash val="solid"/>
+                      <a:round/>
+                      <a:headEnd type="none" w="med" len="med"/>
+                      <a:tailEnd type="none" w="med" len="med"/>
+                    </a:lnR>
+                  </a:tcPr>
+                </a:tc>
+                <a:tc hMerge="1">
+                  <a:txBody>
+                    <a:bodyPr/>
+                    <a:lstStyle/>
+                    <a:p>
+                      <a:endParaRPr lang="en-IN"/>
+                    </a:p>
+                  </a:txBody>
+                  <a:tcPr/>
+                </a:tc>
+                <a:tc hMerge="1">
+                  <a:txBody>
+                    <a:bodyPr/>
+                    <a:lstStyle/>
+                    <a:p>
+                      <a:endParaRPr lang="en-IN"/>
+                    </a:p>
+                  </a:txBody>
+                  <a:tcPr/>
+                </a:tc>
+                <a:extLst>
+                  <a:ext uri="{0D108BD9-81ED-4DB2-BD59-A6C34878D82A}">
+                    <a16:rowId xmlns:a16="http://schemas.microsoft.com/office/drawing/2014/main" val="298803084"/>
+                  </a:ext>
+                </a:extLst>
+              </a:tr>
+              <a:tr h="639460">
+                <a:tc>
+                  <a:txBody>
+                    <a:bodyPr/>
+                    <a:lstStyle/>
+                    <a:p>
+                      <a:pPr algn="ctr" fontAlgn="b">
+                        <a:buNone/>
+                      </a:pPr>
+                      <a:endParaRPr lang="en-IN" sz="1400" b="1" i="0" u="none" strike="noStrike" dirty="0">
+                        <a:solidFill>
+                          <a:srgbClr val="000000"/>
+                        </a:solidFill>
+                        <a:effectLst/>
+                        <a:latin typeface="Calibri" panose="020F0502020204030204" pitchFamily="34" charset="0"/>
+                      </a:endParaRPr>
+                    </a:p>
+                  </a:txBody>
+                  <a:tcPr marL="6350" marR="6350" marT="6350" marB="0" anchor="ctr">
+                    <a:lnR w="12700" cap="flat" cmpd="sng" algn="ctr">
+                      <a:solidFill>
+                        <a:schemeClr val="tx1"/>
+                      </a:solidFill>
+                      <a:prstDash val="solid"/>
+                      <a:round/>
+                      <a:headEnd type="none" w="med" len="med"/>
+                      <a:tailEnd type="none" w="med" len="med"/>
+                    </a:lnR>
+                  </a:tcPr>
+                </a:tc>
+                <a:tc>
+                  <a:txBody>
+                    <a:bodyPr/>
+                    <a:lstStyle/>
+                    <a:p>
+                      <a:pPr algn="ctr" fontAlgn="b">
+                        <a:buNone/>
+                      </a:pPr>
+                      <a:r>
+                        <a:rPr lang="en-IN" sz="1400" b="1" u="none" strike="noStrike">
+                          <a:effectLst/>
+                        </a:rPr>
+                        <a:t>rs1</a:t>
+                      </a:r>
+                      <a:endParaRPr lang="en-IN" sz="1400" b="1" i="0" u="none" strike="noStrike">
+                        <a:solidFill>
+                          <a:srgbClr val="000000"/>
+                        </a:solidFill>
+                        <a:effectLst/>
+                        <a:latin typeface="Calibri" panose="020F0502020204030204" pitchFamily="34" charset="0"/>
+                      </a:endParaRPr>
+                    </a:p>
+                  </a:txBody>
+                  <a:tcPr marL="6350" marR="6350" marT="6350" marB="0" anchor="ctr">
+                    <a:lnL w="12700" cap="flat" cmpd="sng" algn="ctr">
+                      <a:solidFill>
+                        <a:schemeClr val="tx1"/>
+                      </a:solidFill>
+                      <a:prstDash val="solid"/>
+                      <a:round/>
+                      <a:headEnd type="none" w="med" len="med"/>
+                      <a:tailEnd type="none" w="med" len="med"/>
+                    </a:lnL>
+                  </a:tcPr>
+                </a:tc>
+                <a:tc>
+                  <a:txBody>
+                    <a:bodyPr/>
+                    <a:lstStyle/>
+                    <a:p>
+                      <a:pPr algn="ctr" fontAlgn="b">
+                        <a:buNone/>
+                      </a:pPr>
+                      <a:r>
+                        <a:rPr lang="en-IN" sz="1400" b="1" u="none" strike="noStrike" dirty="0">
+                          <a:effectLst/>
+                        </a:rPr>
+                        <a:t>rs2</a:t>
+                      </a:r>
+                      <a:endParaRPr lang="en-IN" sz="1400" b="1" i="0" u="none" strike="noStrike" dirty="0">
+                        <a:solidFill>
+                          <a:srgbClr val="000000"/>
+                        </a:solidFill>
+                        <a:effectLst/>
+                        <a:latin typeface="Calibri" panose="020F0502020204030204" pitchFamily="34" charset="0"/>
+                      </a:endParaRPr>
+                    </a:p>
+                  </a:txBody>
+                  <a:tcPr marL="6350" marR="6350" marT="6350" marB="0" anchor="ctr">
+                    <a:lnR w="12700" cap="flat" cmpd="sng" algn="ctr">
+                      <a:solidFill>
+                        <a:schemeClr val="tx1"/>
+                      </a:solidFill>
+                      <a:prstDash val="solid"/>
+                      <a:round/>
+                      <a:headEnd type="none" w="med" len="med"/>
+                      <a:tailEnd type="none" w="med" len="med"/>
+                    </a:lnR>
+                  </a:tcPr>
+                </a:tc>
+                <a:tc vMerge="1">
+                  <a:txBody>
+                    <a:bodyPr/>
+                    <a:lstStyle/>
+                    <a:p>
+                      <a:pPr algn="ctr" fontAlgn="b">
+                        <a:buNone/>
+                      </a:pPr>
+                      <a:endParaRPr lang="en-IN" sz="1400" b="1" i="0" u="none" strike="noStrike" dirty="0">
+                        <a:solidFill>
+                          <a:srgbClr val="000000"/>
+                        </a:solidFill>
+                        <a:effectLst/>
+                        <a:latin typeface="Calibri" panose="020F0502020204030204" pitchFamily="34" charset="0"/>
+                      </a:endParaRPr>
+                    </a:p>
+                  </a:txBody>
+                  <a:tcPr marL="6350" marR="6350" marT="6350" marB="0" anchor="ctr">
+                    <a:lnL w="12700" cap="flat" cmpd="sng" algn="ctr">
+                      <a:solidFill>
+                        <a:schemeClr val="tx1"/>
+                      </a:solidFill>
+                      <a:prstDash val="solid"/>
+                      <a:round/>
+                      <a:headEnd type="none" w="med" len="med"/>
+                      <a:tailEnd type="none" w="med" len="med"/>
+                    </a:lnL>
+                    <a:lnR w="12700" cap="flat" cmpd="sng" algn="ctr">
+                      <a:solidFill>
+                        <a:schemeClr val="tx1"/>
+                      </a:solidFill>
+                      <a:prstDash val="solid"/>
+                      <a:round/>
+                      <a:headEnd type="none" w="med" len="med"/>
+                      <a:tailEnd type="none" w="med" len="med"/>
+                    </a:lnR>
+                  </a:tcPr>
+                </a:tc>
+                <a:tc>
+                  <a:txBody>
+                    <a:bodyPr/>
+                    <a:lstStyle/>
+                    <a:p>
+                      <a:pPr algn="ctr" fontAlgn="b">
+                        <a:buNone/>
+                      </a:pPr>
+                      <a:r>
+                        <a:rPr lang="en-IN" sz="1400" b="1" u="none" strike="noStrike" dirty="0">
+                          <a:effectLst/>
+                        </a:rPr>
+                        <a:t>IF+ID+EX</a:t>
+                      </a:r>
+                      <a:endParaRPr lang="en-IN" sz="1400" b="1" i="0" u="none" strike="noStrike" dirty="0">
+                        <a:solidFill>
+                          <a:srgbClr val="000000"/>
+                        </a:solidFill>
+                        <a:effectLst/>
+                        <a:latin typeface="Calibri" panose="020F0502020204030204" pitchFamily="34" charset="0"/>
+                      </a:endParaRPr>
+                    </a:p>
+                  </a:txBody>
+                  <a:tcPr marL="6350" marR="6350" marT="6350" marB="0" anchor="ctr">
+                    <a:lnL w="12700" cap="flat" cmpd="sng" algn="ctr">
+                      <a:solidFill>
+                        <a:schemeClr val="tx1"/>
+                      </a:solidFill>
+                      <a:prstDash val="solid"/>
+                      <a:round/>
+                      <a:headEnd type="none" w="med" len="med"/>
+                      <a:tailEnd type="none" w="med" len="med"/>
+                    </a:lnL>
+                  </a:tcPr>
+                </a:tc>
+                <a:tc>
+                  <a:txBody>
+                    <a:bodyPr/>
+                    <a:lstStyle/>
+                    <a:p>
+                      <a:pPr algn="ctr" fontAlgn="b">
+                        <a:buNone/>
+                      </a:pPr>
+                      <a:r>
+                        <a:rPr lang="en-IN" sz="1400" b="1" u="none" strike="noStrike" dirty="0">
+                          <a:effectLst/>
+                        </a:rPr>
+                        <a:t>mem write</a:t>
+                      </a:r>
+                      <a:endParaRPr lang="en-IN" sz="1400" b="1" i="0" u="none" strike="noStrike" dirty="0">
+                        <a:solidFill>
+                          <a:srgbClr val="000000"/>
+                        </a:solidFill>
+                        <a:effectLst/>
+                        <a:latin typeface="Calibri" panose="020F0502020204030204" pitchFamily="34" charset="0"/>
+                      </a:endParaRPr>
+                    </a:p>
+                  </a:txBody>
+                  <a:tcPr marL="6350" marR="6350" marT="6350" marB="0" anchor="ctr"/>
+                </a:tc>
+                <a:tc>
+                  <a:txBody>
+                    <a:bodyPr/>
+                    <a:lstStyle/>
+                    <a:p>
+                      <a:pPr algn="ctr" fontAlgn="b">
+                        <a:buNone/>
+                      </a:pPr>
+                      <a:r>
+                        <a:rPr lang="en-IN" sz="1400" b="1" u="none" strike="noStrike" dirty="0">
+                          <a:effectLst/>
+                        </a:rPr>
+                        <a:t>mem read + ready</a:t>
+                      </a:r>
+                      <a:endParaRPr lang="en-IN" sz="1400" b="1" i="0" u="none" strike="noStrike" dirty="0">
+                        <a:solidFill>
+                          <a:srgbClr val="000000"/>
+                        </a:solidFill>
+                        <a:effectLst/>
+                        <a:latin typeface="Calibri" panose="020F0502020204030204" pitchFamily="34" charset="0"/>
+                      </a:endParaRPr>
+                    </a:p>
+                  </a:txBody>
+                  <a:tcPr marL="6350" marR="6350" marT="6350" marB="0" anchor="ctr"/>
+                </a:tc>
+                <a:extLst>
+                  <a:ext uri="{0D108BD9-81ED-4DB2-BD59-A6C34878D82A}">
+                    <a16:rowId xmlns:a16="http://schemas.microsoft.com/office/drawing/2014/main" val="3895551096"/>
+                  </a:ext>
+                </a:extLst>
+              </a:tr>
+              <a:tr h="344691">
+                <a:tc>
+                  <a:txBody>
+                    <a:bodyPr/>
+                    <a:lstStyle/>
+                    <a:p>
+                      <a:pPr algn="ctr" fontAlgn="b">
+                        <a:buNone/>
+                      </a:pPr>
+                      <a:r>
+                        <a:rPr lang="en-IN" sz="1400" b="1" u="none" strike="noStrike" dirty="0">
+                          <a:effectLst/>
+                        </a:rPr>
+                        <a:t>R</a:t>
+                      </a:r>
+                      <a:endParaRPr lang="en-IN" sz="1400" b="1" i="0" u="none" strike="noStrike" dirty="0">
+                        <a:solidFill>
+                          <a:srgbClr val="000000"/>
+                        </a:solidFill>
+                        <a:effectLst/>
+                        <a:latin typeface="Calibri" panose="020F0502020204030204" pitchFamily="34" charset="0"/>
+                      </a:endParaRPr>
+                    </a:p>
+                  </a:txBody>
+                  <a:tcPr marL="6350" marR="6350" marT="6350" marB="0" anchor="ctr">
+                    <a:lnR w="12700" cap="flat" cmpd="sng" algn="ctr">
+                      <a:solidFill>
+                        <a:schemeClr val="tx1"/>
+                      </a:solidFill>
+                      <a:prstDash val="solid"/>
+                      <a:round/>
+                      <a:headEnd type="none" w="med" len="med"/>
+                      <a:tailEnd type="none" w="med" len="med"/>
+                    </a:lnR>
+                  </a:tcPr>
+                </a:tc>
+                <a:tc>
+                  <a:txBody>
+                    <a:bodyPr/>
+                    <a:lstStyle/>
+                    <a:p>
+                      <a:pPr algn="ctr" fontAlgn="b">
+                        <a:buNone/>
+                      </a:pPr>
+                      <a:r>
+                        <a:rPr lang="en-IN" sz="1400" u="none" strike="noStrike">
+                          <a:effectLst/>
+                        </a:rPr>
+                        <a:t>yes</a:t>
+                      </a:r>
+                      <a:endParaRPr lang="en-IN" sz="1400" b="0" i="0" u="none" strike="noStrike">
+                        <a:solidFill>
+                          <a:srgbClr val="000000"/>
+                        </a:solidFill>
+                        <a:effectLst/>
+                        <a:latin typeface="Calibri" panose="020F0502020204030204" pitchFamily="34" charset="0"/>
+                      </a:endParaRPr>
+                    </a:p>
+                  </a:txBody>
+                  <a:tcPr marL="6350" marR="6350" marT="6350" marB="0" anchor="ctr">
+                    <a:lnL w="12700" cap="flat" cmpd="sng" algn="ctr">
+                      <a:solidFill>
+                        <a:schemeClr val="tx1"/>
+                      </a:solidFill>
+                      <a:prstDash val="solid"/>
+                      <a:round/>
+                      <a:headEnd type="none" w="med" len="med"/>
+                      <a:tailEnd type="none" w="med" len="med"/>
+                    </a:lnL>
+                  </a:tcPr>
+                </a:tc>
+                <a:tc>
+                  <a:txBody>
+                    <a:bodyPr/>
+                    <a:lstStyle/>
+                    <a:p>
+                      <a:pPr algn="ctr" fontAlgn="b">
+                        <a:buNone/>
+                      </a:pPr>
+                      <a:r>
+                        <a:rPr lang="en-IN" sz="1400" u="none" strike="noStrike" dirty="0">
+                          <a:effectLst/>
+                        </a:rPr>
+                        <a:t>yes</a:t>
+                      </a:r>
+                      <a:endParaRPr lang="en-IN" sz="1400" b="0" i="0" u="none" strike="noStrike" dirty="0">
+                        <a:solidFill>
+                          <a:srgbClr val="000000"/>
+                        </a:solidFill>
+                        <a:effectLst/>
+                        <a:latin typeface="Calibri" panose="020F0502020204030204" pitchFamily="34" charset="0"/>
+                      </a:endParaRPr>
+                    </a:p>
+                  </a:txBody>
+                  <a:tcPr marL="6350" marR="6350" marT="6350" marB="0" anchor="ctr">
+                    <a:lnR w="12700" cap="flat" cmpd="sng" algn="ctr">
+                      <a:solidFill>
+                        <a:schemeClr val="tx1"/>
+                      </a:solidFill>
+                      <a:prstDash val="solid"/>
+                      <a:round/>
+                      <a:headEnd type="none" w="med" len="med"/>
+                      <a:tailEnd type="none" w="med" len="med"/>
+                    </a:lnR>
+                  </a:tcPr>
+                </a:tc>
+                <a:tc>
+                  <a:txBody>
+                    <a:bodyPr/>
+                    <a:lstStyle/>
+                    <a:p>
+                      <a:pPr marL="0" marR="0" lvl="0" indent="0" algn="ctr" defTabSz="914400" rtl="0" eaLnBrk="1" fontAlgn="b" latinLnBrk="0" hangingPunct="1">
+                        <a:lnSpc>
+                          <a:spcPct val="100000"/>
+                        </a:lnSpc>
+                        <a:spcBef>
+                          <a:spcPts val="0"/>
+                        </a:spcBef>
+                        <a:spcAft>
+                          <a:spcPts val="0"/>
+                        </a:spcAft>
+                        <a:buClrTx/>
+                        <a:buSzTx/>
+                        <a:buFontTx/>
+                        <a:buNone/>
+                        <a:tabLst/>
+                        <a:defRPr/>
+                      </a:pPr>
+                      <a:r>
+                        <a:rPr lang="en-IN" sz="1400" u="none" strike="noStrike" dirty="0">
+                          <a:effectLst/>
+                        </a:rPr>
+                        <a:t>yes</a:t>
+                      </a:r>
+                      <a:endParaRPr lang="en-IN" sz="1400" b="0" i="0" u="none" strike="noStrike" dirty="0">
+                        <a:solidFill>
+                          <a:srgbClr val="000000"/>
+                        </a:solidFill>
+                        <a:effectLst/>
+                        <a:latin typeface="Calibri" panose="020F0502020204030204" pitchFamily="34" charset="0"/>
+                      </a:endParaRPr>
+                    </a:p>
+                  </a:txBody>
+                  <a:tcPr marL="6350" marR="6350" marT="6350" marB="0" anchor="ctr">
+                    <a:lnL w="12700" cap="flat" cmpd="sng" algn="ctr">
+                      <a:solidFill>
+                        <a:schemeClr val="tx1"/>
+                      </a:solidFill>
+                      <a:prstDash val="solid"/>
+                      <a:round/>
+                      <a:headEnd type="none" w="med" len="med"/>
+                      <a:tailEnd type="none" w="med" len="med"/>
+                    </a:lnL>
+                    <a:lnR w="12700" cap="flat" cmpd="sng" algn="ctr">
+                      <a:solidFill>
+                        <a:schemeClr val="tx1"/>
+                      </a:solidFill>
+                      <a:prstDash val="solid"/>
+                      <a:round/>
+                      <a:headEnd type="none" w="med" len="med"/>
+                      <a:tailEnd type="none" w="med" len="med"/>
+                    </a:lnR>
+                  </a:tcPr>
+                </a:tc>
+                <a:tc>
+                  <a:txBody>
+                    <a:bodyPr/>
+                    <a:lstStyle/>
+                    <a:p>
+                      <a:pPr algn="ctr" fontAlgn="b">
+                        <a:buNone/>
+                      </a:pPr>
+                      <a:r>
+                        <a:rPr lang="en-IN" sz="1400" u="none" strike="noStrike" dirty="0">
+                          <a:effectLst/>
+                        </a:rPr>
+                        <a:t>yes</a:t>
+                      </a:r>
+                      <a:endParaRPr lang="en-IN" sz="1400" b="0" i="0" u="none" strike="noStrike" dirty="0">
+                        <a:solidFill>
+                          <a:srgbClr val="000000"/>
+                        </a:solidFill>
+                        <a:effectLst/>
+                        <a:latin typeface="Calibri" panose="020F0502020204030204" pitchFamily="34" charset="0"/>
+                      </a:endParaRPr>
+                    </a:p>
+                  </a:txBody>
+                  <a:tcPr marL="6350" marR="6350" marT="6350" marB="0" anchor="ctr">
+                    <a:lnL w="12700" cap="flat" cmpd="sng" algn="ctr">
+                      <a:solidFill>
+                        <a:schemeClr val="tx1"/>
+                      </a:solidFill>
+                      <a:prstDash val="solid"/>
+                      <a:round/>
+                      <a:headEnd type="none" w="med" len="med"/>
+                      <a:tailEnd type="none" w="med" len="med"/>
+                    </a:lnL>
+                  </a:tcPr>
+                </a:tc>
+                <a:tc>
+                  <a:txBody>
+                    <a:bodyPr/>
+                    <a:lstStyle/>
+                    <a:p>
+                      <a:pPr algn="ctr" fontAlgn="b">
+                        <a:buNone/>
+                      </a:pPr>
+                      <a:r>
+                        <a:rPr lang="en-IN" sz="1400" u="none" strike="noStrike">
+                          <a:effectLst/>
+                        </a:rPr>
+                        <a:t>-</a:t>
+                      </a:r>
+                      <a:endParaRPr lang="en-IN" sz="1400" b="0" i="0" u="none" strike="noStrike">
+                        <a:solidFill>
+                          <a:srgbClr val="000000"/>
+                        </a:solidFill>
+                        <a:effectLst/>
+                        <a:latin typeface="Calibri" panose="020F0502020204030204" pitchFamily="34" charset="0"/>
+                      </a:endParaRPr>
+                    </a:p>
+                  </a:txBody>
+                  <a:tcPr marL="6350" marR="6350" marT="6350" marB="0" anchor="ctr"/>
+                </a:tc>
+                <a:tc>
+                  <a:txBody>
+                    <a:bodyPr/>
+                    <a:lstStyle/>
+                    <a:p>
+                      <a:pPr algn="ctr" fontAlgn="b">
+                        <a:buNone/>
+                      </a:pPr>
+                      <a:r>
+                        <a:rPr lang="en-IN" sz="1400" u="none" strike="noStrike">
+                          <a:effectLst/>
+                        </a:rPr>
+                        <a:t>-</a:t>
+                      </a:r>
+                      <a:endParaRPr lang="en-IN" sz="1400" b="0" i="0" u="none" strike="noStrike">
+                        <a:solidFill>
+                          <a:srgbClr val="000000"/>
+                        </a:solidFill>
+                        <a:effectLst/>
+                        <a:latin typeface="Calibri" panose="020F0502020204030204" pitchFamily="34" charset="0"/>
+                      </a:endParaRPr>
+                    </a:p>
+                  </a:txBody>
+                  <a:tcPr marL="6350" marR="6350" marT="6350" marB="0" anchor="ctr"/>
+                </a:tc>
+                <a:extLst>
+                  <a:ext uri="{0D108BD9-81ED-4DB2-BD59-A6C34878D82A}">
+                    <a16:rowId xmlns:a16="http://schemas.microsoft.com/office/drawing/2014/main" val="872394638"/>
+                  </a:ext>
+                </a:extLst>
+              </a:tr>
+              <a:tr h="344691">
+                <a:tc>
+                  <a:txBody>
+                    <a:bodyPr/>
+                    <a:lstStyle/>
+                    <a:p>
+                      <a:pPr algn="ctr" fontAlgn="b">
+                        <a:buNone/>
+                      </a:pPr>
+                      <a:r>
+                        <a:rPr lang="en-IN" sz="1400" b="1" u="none" strike="noStrike" dirty="0">
+                          <a:effectLst/>
+                        </a:rPr>
+                        <a:t>I (non-load)</a:t>
+                      </a:r>
+                      <a:endParaRPr lang="en-IN" sz="1400" b="1" i="0" u="none" strike="noStrike" dirty="0">
+                        <a:solidFill>
+                          <a:srgbClr val="000000"/>
+                        </a:solidFill>
+                        <a:effectLst/>
+                        <a:latin typeface="Calibri" panose="020F0502020204030204" pitchFamily="34" charset="0"/>
+                      </a:endParaRPr>
+                    </a:p>
+                  </a:txBody>
+                  <a:tcPr marL="6350" marR="6350" marT="6350" marB="0" anchor="ctr">
+                    <a:lnR w="12700" cap="flat" cmpd="sng" algn="ctr">
+                      <a:solidFill>
+                        <a:schemeClr val="tx1"/>
+                      </a:solidFill>
+                      <a:prstDash val="solid"/>
+                      <a:round/>
+                      <a:headEnd type="none" w="med" len="med"/>
+                      <a:tailEnd type="none" w="med" len="med"/>
+                    </a:lnR>
+                  </a:tcPr>
+                </a:tc>
+                <a:tc>
+                  <a:txBody>
+                    <a:bodyPr/>
+                    <a:lstStyle/>
+                    <a:p>
+                      <a:pPr algn="ctr" fontAlgn="b">
+                        <a:buNone/>
+                      </a:pPr>
+                      <a:r>
+                        <a:rPr lang="en-IN" sz="1400" u="none" strike="noStrike" dirty="0">
+                          <a:effectLst/>
+                        </a:rPr>
+                        <a:t>yes</a:t>
+                      </a:r>
+                      <a:endParaRPr lang="en-IN" sz="1400" b="0" i="0" u="none" strike="noStrike" dirty="0">
+                        <a:solidFill>
+                          <a:srgbClr val="000000"/>
+                        </a:solidFill>
+                        <a:effectLst/>
+                        <a:latin typeface="Calibri" panose="020F0502020204030204" pitchFamily="34" charset="0"/>
+                      </a:endParaRPr>
+                    </a:p>
+                  </a:txBody>
+                  <a:tcPr marL="6350" marR="6350" marT="6350" marB="0" anchor="ctr">
+                    <a:lnL w="12700" cap="flat" cmpd="sng" algn="ctr">
+                      <a:solidFill>
+                        <a:schemeClr val="tx1"/>
+                      </a:solidFill>
+                      <a:prstDash val="solid"/>
+                      <a:round/>
+                      <a:headEnd type="none" w="med" len="med"/>
+                      <a:tailEnd type="none" w="med" len="med"/>
+                    </a:lnL>
+                  </a:tcPr>
+                </a:tc>
+                <a:tc>
+                  <a:txBody>
+                    <a:bodyPr/>
+                    <a:lstStyle/>
+                    <a:p>
+                      <a:pPr algn="ctr" fontAlgn="b">
+                        <a:buNone/>
+                      </a:pPr>
+                      <a:r>
+                        <a:rPr lang="en-IN" sz="1400" u="none" strike="noStrike" dirty="0">
+                          <a:effectLst/>
+                        </a:rPr>
+                        <a:t>no</a:t>
+                      </a:r>
+                      <a:endParaRPr lang="en-IN" sz="1400" b="0" i="0" u="none" strike="noStrike" dirty="0">
+                        <a:solidFill>
+                          <a:srgbClr val="000000"/>
+                        </a:solidFill>
+                        <a:effectLst/>
+                        <a:latin typeface="Calibri" panose="020F0502020204030204" pitchFamily="34" charset="0"/>
+                      </a:endParaRPr>
+                    </a:p>
+                  </a:txBody>
+                  <a:tcPr marL="6350" marR="6350" marT="6350" marB="0" anchor="ctr">
+                    <a:lnR w="12700" cap="flat" cmpd="sng" algn="ctr">
+                      <a:solidFill>
+                        <a:schemeClr val="tx1"/>
+                      </a:solidFill>
+                      <a:prstDash val="solid"/>
+                      <a:round/>
+                      <a:headEnd type="none" w="med" len="med"/>
+                      <a:tailEnd type="none" w="med" len="med"/>
+                    </a:lnR>
+                  </a:tcPr>
+                </a:tc>
+                <a:tc>
+                  <a:txBody>
+                    <a:bodyPr/>
+                    <a:lstStyle/>
+                    <a:p>
+                      <a:pPr algn="ctr" fontAlgn="b">
+                        <a:buNone/>
+                      </a:pPr>
+                      <a:r>
+                        <a:rPr lang="en-IN" sz="1400" u="none" strike="noStrike" dirty="0">
+                          <a:effectLst/>
+                        </a:rPr>
+                        <a:t>yes</a:t>
+                      </a:r>
+                      <a:endParaRPr lang="en-IN" sz="1400" b="0" i="0" u="none" strike="noStrike" dirty="0">
+                        <a:solidFill>
+                          <a:srgbClr val="000000"/>
+                        </a:solidFill>
+                        <a:effectLst/>
+                        <a:latin typeface="Calibri" panose="020F0502020204030204" pitchFamily="34" charset="0"/>
+                      </a:endParaRPr>
+                    </a:p>
+                  </a:txBody>
+                  <a:tcPr marL="6350" marR="6350" marT="6350" marB="0" anchor="ctr">
+                    <a:lnL w="12700" cap="flat" cmpd="sng" algn="ctr">
+                      <a:solidFill>
+                        <a:schemeClr val="tx1"/>
+                      </a:solidFill>
+                      <a:prstDash val="solid"/>
+                      <a:round/>
+                      <a:headEnd type="none" w="med" len="med"/>
+                      <a:tailEnd type="none" w="med" len="med"/>
+                    </a:lnL>
+                    <a:lnR w="12700" cap="flat" cmpd="sng" algn="ctr">
+                      <a:solidFill>
+                        <a:schemeClr val="tx1"/>
+                      </a:solidFill>
+                      <a:prstDash val="solid"/>
+                      <a:round/>
+                      <a:headEnd type="none" w="med" len="med"/>
+                      <a:tailEnd type="none" w="med" len="med"/>
+                    </a:lnR>
+                  </a:tcPr>
+                </a:tc>
+                <a:tc>
+                  <a:txBody>
+                    <a:bodyPr/>
+                    <a:lstStyle/>
+                    <a:p>
+                      <a:pPr algn="ctr" fontAlgn="b">
+                        <a:buNone/>
+                      </a:pPr>
+                      <a:r>
+                        <a:rPr lang="en-IN" sz="1400" u="none" strike="noStrike" dirty="0">
+                          <a:effectLst/>
+                        </a:rPr>
+                        <a:t>yes</a:t>
+                      </a:r>
+                      <a:endParaRPr lang="en-IN" sz="1400" b="0" i="0" u="none" strike="noStrike" dirty="0">
+                        <a:solidFill>
+                          <a:srgbClr val="000000"/>
+                        </a:solidFill>
+                        <a:effectLst/>
+                        <a:latin typeface="Calibri" panose="020F0502020204030204" pitchFamily="34" charset="0"/>
+                      </a:endParaRPr>
+                    </a:p>
+                  </a:txBody>
+                  <a:tcPr marL="6350" marR="6350" marT="6350" marB="0" anchor="ctr">
+                    <a:lnL w="12700" cap="flat" cmpd="sng" algn="ctr">
+                      <a:solidFill>
+                        <a:schemeClr val="tx1"/>
+                      </a:solidFill>
+                      <a:prstDash val="solid"/>
+                      <a:round/>
+                      <a:headEnd type="none" w="med" len="med"/>
+                      <a:tailEnd type="none" w="med" len="med"/>
+                    </a:lnL>
+                  </a:tcPr>
+                </a:tc>
+                <a:tc>
+                  <a:txBody>
+                    <a:bodyPr/>
+                    <a:lstStyle/>
+                    <a:p>
+                      <a:pPr algn="ctr" fontAlgn="b">
+                        <a:buNone/>
+                      </a:pPr>
+                      <a:r>
+                        <a:rPr lang="en-IN" sz="1400" u="none" strike="noStrike" dirty="0">
+                          <a:effectLst/>
+                        </a:rPr>
+                        <a:t>-</a:t>
+                      </a:r>
+                      <a:endParaRPr lang="en-IN" sz="1400" b="0" i="0" u="none" strike="noStrike" dirty="0">
+                        <a:solidFill>
+                          <a:srgbClr val="000000"/>
+                        </a:solidFill>
+                        <a:effectLst/>
+                        <a:latin typeface="Calibri" panose="020F0502020204030204" pitchFamily="34" charset="0"/>
+                      </a:endParaRPr>
+                    </a:p>
+                  </a:txBody>
+                  <a:tcPr marL="6350" marR="6350" marT="6350" marB="0" anchor="ctr"/>
+                </a:tc>
+                <a:tc>
+                  <a:txBody>
+                    <a:bodyPr/>
+                    <a:lstStyle/>
+                    <a:p>
+                      <a:pPr algn="ctr" fontAlgn="b">
+                        <a:buNone/>
+                      </a:pPr>
+                      <a:r>
+                        <a:rPr lang="en-IN" sz="1400" u="none" strike="noStrike">
+                          <a:effectLst/>
+                        </a:rPr>
+                        <a:t>-</a:t>
+                      </a:r>
+                      <a:endParaRPr lang="en-IN" sz="1400" b="0" i="0" u="none" strike="noStrike">
+                        <a:solidFill>
+                          <a:srgbClr val="000000"/>
+                        </a:solidFill>
+                        <a:effectLst/>
+                        <a:latin typeface="Calibri" panose="020F0502020204030204" pitchFamily="34" charset="0"/>
+                      </a:endParaRPr>
+                    </a:p>
+                  </a:txBody>
+                  <a:tcPr marL="6350" marR="6350" marT="6350" marB="0" anchor="ctr"/>
+                </a:tc>
+                <a:extLst>
+                  <a:ext uri="{0D108BD9-81ED-4DB2-BD59-A6C34878D82A}">
+                    <a16:rowId xmlns:a16="http://schemas.microsoft.com/office/drawing/2014/main" val="641824065"/>
+                  </a:ext>
+                </a:extLst>
+              </a:tr>
+              <a:tr h="344691">
+                <a:tc>
+                  <a:txBody>
+                    <a:bodyPr/>
+                    <a:lstStyle/>
+                    <a:p>
+                      <a:pPr algn="ctr" fontAlgn="b">
+                        <a:buNone/>
+                      </a:pPr>
+                      <a:r>
+                        <a:rPr lang="en-IN" sz="1400" b="1" u="none" strike="noStrike" dirty="0">
+                          <a:effectLst/>
+                        </a:rPr>
+                        <a:t>I (load)</a:t>
+                      </a:r>
+                      <a:endParaRPr lang="en-IN" sz="1400" b="1" i="0" u="none" strike="noStrike" dirty="0">
+                        <a:solidFill>
+                          <a:srgbClr val="000000"/>
+                        </a:solidFill>
+                        <a:effectLst/>
+                        <a:latin typeface="Calibri" panose="020F0502020204030204" pitchFamily="34" charset="0"/>
+                      </a:endParaRPr>
+                    </a:p>
+                  </a:txBody>
+                  <a:tcPr marL="6350" marR="6350" marT="6350" marB="0" anchor="ctr">
+                    <a:lnR w="12700" cap="flat" cmpd="sng" algn="ctr">
+                      <a:solidFill>
+                        <a:schemeClr val="tx1"/>
+                      </a:solidFill>
+                      <a:prstDash val="solid"/>
+                      <a:round/>
+                      <a:headEnd type="none" w="med" len="med"/>
+                      <a:tailEnd type="none" w="med" len="med"/>
+                    </a:lnR>
+                  </a:tcPr>
+                </a:tc>
+                <a:tc>
+                  <a:txBody>
+                    <a:bodyPr/>
+                    <a:lstStyle/>
+                    <a:p>
+                      <a:pPr algn="ctr" fontAlgn="b">
+                        <a:buNone/>
+                      </a:pPr>
+                      <a:r>
+                        <a:rPr lang="en-IN" sz="1400" u="none" strike="noStrike">
+                          <a:effectLst/>
+                        </a:rPr>
+                        <a:t>yes</a:t>
+                      </a:r>
+                      <a:endParaRPr lang="en-IN" sz="1400" b="0" i="0" u="none" strike="noStrike">
+                        <a:solidFill>
+                          <a:srgbClr val="000000"/>
+                        </a:solidFill>
+                        <a:effectLst/>
+                        <a:latin typeface="Calibri" panose="020F0502020204030204" pitchFamily="34" charset="0"/>
+                      </a:endParaRPr>
+                    </a:p>
+                  </a:txBody>
+                  <a:tcPr marL="6350" marR="6350" marT="6350" marB="0" anchor="ctr">
+                    <a:lnL w="12700" cap="flat" cmpd="sng" algn="ctr">
+                      <a:solidFill>
+                        <a:schemeClr val="tx1"/>
+                      </a:solidFill>
+                      <a:prstDash val="solid"/>
+                      <a:round/>
+                      <a:headEnd type="none" w="med" len="med"/>
+                      <a:tailEnd type="none" w="med" len="med"/>
+                    </a:lnL>
+                  </a:tcPr>
+                </a:tc>
+                <a:tc>
+                  <a:txBody>
+                    <a:bodyPr/>
+                    <a:lstStyle/>
+                    <a:p>
+                      <a:pPr algn="ctr" fontAlgn="b">
+                        <a:buNone/>
+                      </a:pPr>
+                      <a:r>
+                        <a:rPr lang="en-IN" sz="1400" u="none" strike="noStrike">
+                          <a:effectLst/>
+                        </a:rPr>
+                        <a:t>no</a:t>
+                      </a:r>
+                      <a:endParaRPr lang="en-IN" sz="1400" b="0" i="0" u="none" strike="noStrike">
+                        <a:solidFill>
+                          <a:srgbClr val="000000"/>
+                        </a:solidFill>
+                        <a:effectLst/>
+                        <a:latin typeface="Calibri" panose="020F0502020204030204" pitchFamily="34" charset="0"/>
+                      </a:endParaRPr>
+                    </a:p>
+                  </a:txBody>
+                  <a:tcPr marL="6350" marR="6350" marT="6350" marB="0" anchor="ctr">
+                    <a:lnR w="12700" cap="flat" cmpd="sng" algn="ctr">
+                      <a:solidFill>
+                        <a:schemeClr val="tx1"/>
+                      </a:solidFill>
+                      <a:prstDash val="solid"/>
+                      <a:round/>
+                      <a:headEnd type="none" w="med" len="med"/>
+                      <a:tailEnd type="none" w="med" len="med"/>
+                    </a:lnR>
+                  </a:tcPr>
+                </a:tc>
+                <a:tc>
+                  <a:txBody>
+                    <a:bodyPr/>
+                    <a:lstStyle/>
+                    <a:p>
+                      <a:pPr algn="ctr" fontAlgn="b">
+                        <a:buNone/>
+                      </a:pPr>
+                      <a:r>
+                        <a:rPr lang="en-IN" sz="1400" u="none" strike="noStrike" dirty="0">
+                          <a:effectLst/>
+                        </a:rPr>
+                        <a:t>yes</a:t>
+                      </a:r>
+                      <a:endParaRPr lang="en-IN" sz="1400" b="0" i="0" u="none" strike="noStrike" dirty="0">
+                        <a:solidFill>
+                          <a:srgbClr val="000000"/>
+                        </a:solidFill>
+                        <a:effectLst/>
+                        <a:latin typeface="Calibri" panose="020F0502020204030204" pitchFamily="34" charset="0"/>
+                      </a:endParaRPr>
+                    </a:p>
+                  </a:txBody>
+                  <a:tcPr marL="6350" marR="6350" marT="6350" marB="0" anchor="ctr">
+                    <a:lnL w="12700" cap="flat" cmpd="sng" algn="ctr">
+                      <a:solidFill>
+                        <a:schemeClr val="tx1"/>
+                      </a:solidFill>
+                      <a:prstDash val="solid"/>
+                      <a:round/>
+                      <a:headEnd type="none" w="med" len="med"/>
+                      <a:tailEnd type="none" w="med" len="med"/>
+                    </a:lnL>
+                    <a:lnR w="12700" cap="flat" cmpd="sng" algn="ctr">
+                      <a:solidFill>
+                        <a:schemeClr val="tx1"/>
+                      </a:solidFill>
+                      <a:prstDash val="solid"/>
+                      <a:round/>
+                      <a:headEnd type="none" w="med" len="med"/>
+                      <a:tailEnd type="none" w="med" len="med"/>
+                    </a:lnR>
+                  </a:tcPr>
+                </a:tc>
+                <a:tc>
+                  <a:txBody>
+                    <a:bodyPr/>
+                    <a:lstStyle/>
+                    <a:p>
+                      <a:pPr algn="ctr" fontAlgn="b">
+                        <a:buNone/>
+                      </a:pPr>
+                      <a:r>
+                        <a:rPr lang="en-IN" sz="1400" u="none" strike="noStrike">
+                          <a:effectLst/>
+                        </a:rPr>
+                        <a:t>no</a:t>
+                      </a:r>
+                      <a:endParaRPr lang="en-IN" sz="1400" b="0" i="0" u="none" strike="noStrike">
+                        <a:solidFill>
+                          <a:srgbClr val="000000"/>
+                        </a:solidFill>
+                        <a:effectLst/>
+                        <a:latin typeface="Calibri" panose="020F0502020204030204" pitchFamily="34" charset="0"/>
+                      </a:endParaRPr>
+                    </a:p>
+                  </a:txBody>
+                  <a:tcPr marL="6350" marR="6350" marT="6350" marB="0" anchor="ctr">
+                    <a:lnL w="12700" cap="flat" cmpd="sng" algn="ctr">
+                      <a:solidFill>
+                        <a:schemeClr val="tx1"/>
+                      </a:solidFill>
+                      <a:prstDash val="solid"/>
+                      <a:round/>
+                      <a:headEnd type="none" w="med" len="med"/>
+                      <a:tailEnd type="none" w="med" len="med"/>
+                    </a:lnL>
+                  </a:tcPr>
+                </a:tc>
+                <a:tc>
+                  <a:txBody>
+                    <a:bodyPr/>
+                    <a:lstStyle/>
+                    <a:p>
+                      <a:pPr algn="ctr" fontAlgn="b">
+                        <a:buNone/>
+                      </a:pPr>
+                      <a:r>
+                        <a:rPr lang="en-IN" sz="1400" u="none" strike="noStrike" dirty="0">
+                          <a:effectLst/>
+                        </a:rPr>
+                        <a:t>-</a:t>
+                      </a:r>
+                      <a:endParaRPr lang="en-IN" sz="1400" b="0" i="0" u="none" strike="noStrike" dirty="0">
+                        <a:solidFill>
+                          <a:srgbClr val="000000"/>
+                        </a:solidFill>
+                        <a:effectLst/>
+                        <a:latin typeface="Calibri" panose="020F0502020204030204" pitchFamily="34" charset="0"/>
+                      </a:endParaRPr>
+                    </a:p>
+                  </a:txBody>
+                  <a:tcPr marL="6350" marR="6350" marT="6350" marB="0" anchor="ctr"/>
+                </a:tc>
+                <a:tc>
+                  <a:txBody>
+                    <a:bodyPr/>
+                    <a:lstStyle/>
+                    <a:p>
+                      <a:pPr algn="ctr" fontAlgn="b">
+                        <a:buNone/>
+                      </a:pPr>
+                      <a:r>
+                        <a:rPr lang="en-IN" sz="1400" u="none" strike="noStrike">
+                          <a:effectLst/>
+                        </a:rPr>
+                        <a:t>yes</a:t>
+                      </a:r>
+                      <a:endParaRPr lang="en-IN" sz="1400" b="0" i="0" u="none" strike="noStrike">
+                        <a:solidFill>
+                          <a:srgbClr val="000000"/>
+                        </a:solidFill>
+                        <a:effectLst/>
+                        <a:latin typeface="Calibri" panose="020F0502020204030204" pitchFamily="34" charset="0"/>
+                      </a:endParaRPr>
+                    </a:p>
+                  </a:txBody>
+                  <a:tcPr marL="6350" marR="6350" marT="6350" marB="0" anchor="ctr"/>
+                </a:tc>
+                <a:extLst>
+                  <a:ext uri="{0D108BD9-81ED-4DB2-BD59-A6C34878D82A}">
+                    <a16:rowId xmlns:a16="http://schemas.microsoft.com/office/drawing/2014/main" val="582236475"/>
+                  </a:ext>
+                </a:extLst>
+              </a:tr>
+              <a:tr h="344691">
+                <a:tc>
+                  <a:txBody>
+                    <a:bodyPr/>
+                    <a:lstStyle/>
+                    <a:p>
+                      <a:pPr algn="ctr" fontAlgn="b">
+                        <a:buNone/>
+                      </a:pPr>
+                      <a:r>
+                        <a:rPr lang="en-IN" sz="1400" b="1" u="none" strike="noStrike" dirty="0">
+                          <a:effectLst/>
+                        </a:rPr>
+                        <a:t>S</a:t>
+                      </a:r>
+                      <a:endParaRPr lang="en-IN" sz="1400" b="1" i="0" u="none" strike="noStrike" dirty="0">
+                        <a:solidFill>
+                          <a:srgbClr val="000000"/>
+                        </a:solidFill>
+                        <a:effectLst/>
+                        <a:latin typeface="Calibri" panose="020F0502020204030204" pitchFamily="34" charset="0"/>
+                      </a:endParaRPr>
+                    </a:p>
+                  </a:txBody>
+                  <a:tcPr marL="6350" marR="6350" marT="6350" marB="0" anchor="ctr">
+                    <a:lnR w="12700" cap="flat" cmpd="sng" algn="ctr">
+                      <a:solidFill>
+                        <a:schemeClr val="tx1"/>
+                      </a:solidFill>
+                      <a:prstDash val="solid"/>
+                      <a:round/>
+                      <a:headEnd type="none" w="med" len="med"/>
+                      <a:tailEnd type="none" w="med" len="med"/>
+                    </a:lnR>
+                  </a:tcPr>
+                </a:tc>
+                <a:tc>
+                  <a:txBody>
+                    <a:bodyPr/>
+                    <a:lstStyle/>
+                    <a:p>
+                      <a:pPr algn="ctr" fontAlgn="b">
+                        <a:buNone/>
+                      </a:pPr>
+                      <a:r>
+                        <a:rPr lang="en-IN" sz="1400" u="none" strike="noStrike">
+                          <a:effectLst/>
+                        </a:rPr>
+                        <a:t>yes</a:t>
+                      </a:r>
+                      <a:endParaRPr lang="en-IN" sz="1400" b="0" i="0" u="none" strike="noStrike">
+                        <a:solidFill>
+                          <a:srgbClr val="000000"/>
+                        </a:solidFill>
+                        <a:effectLst/>
+                        <a:latin typeface="Calibri" panose="020F0502020204030204" pitchFamily="34" charset="0"/>
+                      </a:endParaRPr>
+                    </a:p>
+                  </a:txBody>
+                  <a:tcPr marL="6350" marR="6350" marT="6350" marB="0" anchor="ctr">
+                    <a:lnL w="12700" cap="flat" cmpd="sng" algn="ctr">
+                      <a:solidFill>
+                        <a:schemeClr val="tx1"/>
+                      </a:solidFill>
+                      <a:prstDash val="solid"/>
+                      <a:round/>
+                      <a:headEnd type="none" w="med" len="med"/>
+                      <a:tailEnd type="none" w="med" len="med"/>
+                    </a:lnL>
+                  </a:tcPr>
+                </a:tc>
+                <a:tc>
+                  <a:txBody>
+                    <a:bodyPr/>
+                    <a:lstStyle/>
+                    <a:p>
+                      <a:pPr algn="ctr" fontAlgn="b">
+                        <a:buNone/>
+                      </a:pPr>
+                      <a:r>
+                        <a:rPr lang="en-IN" sz="1400" u="none" strike="noStrike" dirty="0">
+                          <a:effectLst/>
+                        </a:rPr>
+                        <a:t>yes</a:t>
+                      </a:r>
+                      <a:endParaRPr lang="en-IN" sz="1400" b="0" i="0" u="none" strike="noStrike" dirty="0">
+                        <a:solidFill>
+                          <a:srgbClr val="000000"/>
+                        </a:solidFill>
+                        <a:effectLst/>
+                        <a:latin typeface="Calibri" panose="020F0502020204030204" pitchFamily="34" charset="0"/>
+                      </a:endParaRPr>
+                    </a:p>
+                  </a:txBody>
+                  <a:tcPr marL="6350" marR="6350" marT="6350" marB="0" anchor="ctr">
+                    <a:lnR w="12700" cap="flat" cmpd="sng" algn="ctr">
+                      <a:solidFill>
+                        <a:schemeClr val="tx1"/>
+                      </a:solidFill>
+                      <a:prstDash val="solid"/>
+                      <a:round/>
+                      <a:headEnd type="none" w="med" len="med"/>
+                      <a:tailEnd type="none" w="med" len="med"/>
+                    </a:lnR>
+                  </a:tcPr>
+                </a:tc>
+                <a:tc>
+                  <a:txBody>
+                    <a:bodyPr/>
+                    <a:lstStyle/>
+                    <a:p>
+                      <a:pPr algn="ctr" fontAlgn="b">
+                        <a:buNone/>
+                      </a:pPr>
+                      <a:r>
+                        <a:rPr lang="en-IN" sz="1400" u="none" strike="noStrike" dirty="0">
+                          <a:effectLst/>
+                        </a:rPr>
+                        <a:t>no</a:t>
+                      </a:r>
+                      <a:endParaRPr lang="en-IN" sz="1400" b="0" i="0" u="none" strike="noStrike" dirty="0">
+                        <a:solidFill>
+                          <a:srgbClr val="000000"/>
+                        </a:solidFill>
+                        <a:effectLst/>
+                        <a:latin typeface="Calibri" panose="020F0502020204030204" pitchFamily="34" charset="0"/>
+                      </a:endParaRPr>
+                    </a:p>
+                  </a:txBody>
+                  <a:tcPr marL="6350" marR="6350" marT="6350" marB="0" anchor="ctr">
+                    <a:lnL w="12700" cap="flat" cmpd="sng" algn="ctr">
+                      <a:solidFill>
+                        <a:schemeClr val="tx1"/>
+                      </a:solidFill>
+                      <a:prstDash val="solid"/>
+                      <a:round/>
+                      <a:headEnd type="none" w="med" len="med"/>
+                      <a:tailEnd type="none" w="med" len="med"/>
+                    </a:lnL>
+                    <a:lnR w="12700" cap="flat" cmpd="sng" algn="ctr">
+                      <a:solidFill>
+                        <a:schemeClr val="tx1"/>
+                      </a:solidFill>
+                      <a:prstDash val="solid"/>
+                      <a:round/>
+                      <a:headEnd type="none" w="med" len="med"/>
+                      <a:tailEnd type="none" w="med" len="med"/>
+                    </a:lnR>
+                  </a:tcPr>
+                </a:tc>
+                <a:tc>
+                  <a:txBody>
+                    <a:bodyPr/>
+                    <a:lstStyle/>
+                    <a:p>
+                      <a:pPr algn="ctr" fontAlgn="b">
+                        <a:buNone/>
+                      </a:pPr>
+                      <a:r>
+                        <a:rPr lang="en-IN" sz="1400" u="none" strike="noStrike" dirty="0">
+                          <a:effectLst/>
+                        </a:rPr>
+                        <a:t>no</a:t>
+                      </a:r>
+                      <a:endParaRPr lang="en-IN" sz="1400" b="0" i="0" u="none" strike="noStrike" dirty="0">
+                        <a:solidFill>
+                          <a:srgbClr val="000000"/>
+                        </a:solidFill>
+                        <a:effectLst/>
+                        <a:latin typeface="Calibri" panose="020F0502020204030204" pitchFamily="34" charset="0"/>
+                      </a:endParaRPr>
+                    </a:p>
+                  </a:txBody>
+                  <a:tcPr marL="6350" marR="6350" marT="6350" marB="0" anchor="ctr">
+                    <a:lnL w="12700" cap="flat" cmpd="sng" algn="ctr">
+                      <a:solidFill>
+                        <a:schemeClr val="tx1"/>
+                      </a:solidFill>
+                      <a:prstDash val="solid"/>
+                      <a:round/>
+                      <a:headEnd type="none" w="med" len="med"/>
+                      <a:tailEnd type="none" w="med" len="med"/>
+                    </a:lnL>
+                  </a:tcPr>
+                </a:tc>
+                <a:tc>
+                  <a:txBody>
+                    <a:bodyPr/>
+                    <a:lstStyle/>
+                    <a:p>
+                      <a:pPr algn="ctr" fontAlgn="b">
+                        <a:buNone/>
+                      </a:pPr>
+                      <a:r>
+                        <a:rPr lang="en-IN" sz="1400" u="none" strike="noStrike" dirty="0">
+                          <a:effectLst/>
+                        </a:rPr>
+                        <a:t>yes</a:t>
+                      </a:r>
+                      <a:endParaRPr lang="en-IN" sz="1400" b="0" i="0" u="none" strike="noStrike" dirty="0">
+                        <a:solidFill>
+                          <a:srgbClr val="000000"/>
+                        </a:solidFill>
+                        <a:effectLst/>
+                        <a:latin typeface="Calibri" panose="020F0502020204030204" pitchFamily="34" charset="0"/>
+                      </a:endParaRPr>
+                    </a:p>
+                  </a:txBody>
+                  <a:tcPr marL="6350" marR="6350" marT="6350" marB="0" anchor="ctr"/>
+                </a:tc>
+                <a:tc>
+                  <a:txBody>
+                    <a:bodyPr/>
+                    <a:lstStyle/>
+                    <a:p>
+                      <a:pPr algn="ctr" fontAlgn="b">
+                        <a:buNone/>
+                      </a:pPr>
+                      <a:r>
+                        <a:rPr lang="en-IN" sz="1400" u="none" strike="noStrike">
+                          <a:effectLst/>
+                        </a:rPr>
+                        <a:t>-</a:t>
+                      </a:r>
+                      <a:endParaRPr lang="en-IN" sz="1400" b="0" i="0" u="none" strike="noStrike">
+                        <a:solidFill>
+                          <a:srgbClr val="000000"/>
+                        </a:solidFill>
+                        <a:effectLst/>
+                        <a:latin typeface="Calibri" panose="020F0502020204030204" pitchFamily="34" charset="0"/>
+                      </a:endParaRPr>
+                    </a:p>
+                  </a:txBody>
+                  <a:tcPr marL="6350" marR="6350" marT="6350" marB="0" anchor="ctr"/>
+                </a:tc>
+                <a:extLst>
+                  <a:ext uri="{0D108BD9-81ED-4DB2-BD59-A6C34878D82A}">
+                    <a16:rowId xmlns:a16="http://schemas.microsoft.com/office/drawing/2014/main" val="2187886464"/>
+                  </a:ext>
+                </a:extLst>
+              </a:tr>
+              <a:tr h="344691">
+                <a:tc>
+                  <a:txBody>
+                    <a:bodyPr/>
+                    <a:lstStyle/>
+                    <a:p>
+                      <a:pPr algn="ctr" fontAlgn="b">
+                        <a:buNone/>
+                      </a:pPr>
+                      <a:r>
+                        <a:rPr lang="en-IN" sz="1400" b="1" u="none" strike="noStrike" dirty="0">
+                          <a:effectLst/>
+                        </a:rPr>
+                        <a:t>B</a:t>
+                      </a:r>
+                      <a:endParaRPr lang="en-IN" sz="1400" b="1" i="0" u="none" strike="noStrike" dirty="0">
+                        <a:solidFill>
+                          <a:srgbClr val="000000"/>
+                        </a:solidFill>
+                        <a:effectLst/>
+                        <a:latin typeface="Calibri" panose="020F0502020204030204" pitchFamily="34" charset="0"/>
+                      </a:endParaRPr>
+                    </a:p>
+                  </a:txBody>
+                  <a:tcPr marL="6350" marR="6350" marT="6350" marB="0" anchor="ctr">
+                    <a:lnR w="12700" cap="flat" cmpd="sng" algn="ctr">
+                      <a:solidFill>
+                        <a:schemeClr val="tx1"/>
+                      </a:solidFill>
+                      <a:prstDash val="solid"/>
+                      <a:round/>
+                      <a:headEnd type="none" w="med" len="med"/>
+                      <a:tailEnd type="none" w="med" len="med"/>
+                    </a:lnR>
+                  </a:tcPr>
+                </a:tc>
+                <a:tc>
+                  <a:txBody>
+                    <a:bodyPr/>
+                    <a:lstStyle/>
+                    <a:p>
+                      <a:pPr algn="ctr" fontAlgn="b">
+                        <a:buNone/>
+                      </a:pPr>
+                      <a:r>
+                        <a:rPr lang="en-IN" sz="1400" u="none" strike="noStrike">
+                          <a:effectLst/>
+                        </a:rPr>
+                        <a:t>yes</a:t>
+                      </a:r>
+                      <a:endParaRPr lang="en-IN" sz="1400" b="0" i="0" u="none" strike="noStrike">
+                        <a:solidFill>
+                          <a:srgbClr val="000000"/>
+                        </a:solidFill>
+                        <a:effectLst/>
+                        <a:latin typeface="Calibri" panose="020F0502020204030204" pitchFamily="34" charset="0"/>
+                      </a:endParaRPr>
+                    </a:p>
+                  </a:txBody>
+                  <a:tcPr marL="6350" marR="6350" marT="6350" marB="0" anchor="ctr">
+                    <a:lnL w="12700" cap="flat" cmpd="sng" algn="ctr">
+                      <a:solidFill>
+                        <a:schemeClr val="tx1"/>
+                      </a:solidFill>
+                      <a:prstDash val="solid"/>
+                      <a:round/>
+                      <a:headEnd type="none" w="med" len="med"/>
+                      <a:tailEnd type="none" w="med" len="med"/>
+                    </a:lnL>
+                  </a:tcPr>
+                </a:tc>
+                <a:tc>
+                  <a:txBody>
+                    <a:bodyPr/>
+                    <a:lstStyle/>
+                    <a:p>
+                      <a:pPr algn="ctr" fontAlgn="b">
+                        <a:buNone/>
+                      </a:pPr>
+                      <a:r>
+                        <a:rPr lang="en-IN" sz="1400" u="none" strike="noStrike">
+                          <a:effectLst/>
+                        </a:rPr>
+                        <a:t>yes</a:t>
+                      </a:r>
+                      <a:endParaRPr lang="en-IN" sz="1400" b="0" i="0" u="none" strike="noStrike">
+                        <a:solidFill>
+                          <a:srgbClr val="000000"/>
+                        </a:solidFill>
+                        <a:effectLst/>
+                        <a:latin typeface="Calibri" panose="020F0502020204030204" pitchFamily="34" charset="0"/>
+                      </a:endParaRPr>
+                    </a:p>
+                  </a:txBody>
+                  <a:tcPr marL="6350" marR="6350" marT="6350" marB="0" anchor="ctr">
+                    <a:lnR w="12700" cap="flat" cmpd="sng" algn="ctr">
+                      <a:solidFill>
+                        <a:schemeClr val="tx1"/>
+                      </a:solidFill>
+                      <a:prstDash val="solid"/>
+                      <a:round/>
+                      <a:headEnd type="none" w="med" len="med"/>
+                      <a:tailEnd type="none" w="med" len="med"/>
+                    </a:lnR>
+                  </a:tcPr>
+                </a:tc>
+                <a:tc>
+                  <a:txBody>
+                    <a:bodyPr/>
+                    <a:lstStyle/>
+                    <a:p>
+                      <a:pPr algn="ctr" fontAlgn="b">
+                        <a:buNone/>
+                      </a:pPr>
+                      <a:r>
+                        <a:rPr lang="en-IN" sz="1400" u="none" strike="noStrike" dirty="0">
+                          <a:effectLst/>
+                        </a:rPr>
+                        <a:t>no</a:t>
+                      </a:r>
+                      <a:endParaRPr lang="en-IN" sz="1400" b="0" i="0" u="none" strike="noStrike" dirty="0">
+                        <a:solidFill>
+                          <a:srgbClr val="000000"/>
+                        </a:solidFill>
+                        <a:effectLst/>
+                        <a:latin typeface="Calibri" panose="020F0502020204030204" pitchFamily="34" charset="0"/>
+                      </a:endParaRPr>
+                    </a:p>
+                  </a:txBody>
+                  <a:tcPr marL="6350" marR="6350" marT="6350" marB="0" anchor="ctr">
+                    <a:lnL w="12700" cap="flat" cmpd="sng" algn="ctr">
+                      <a:solidFill>
+                        <a:schemeClr val="tx1"/>
+                      </a:solidFill>
+                      <a:prstDash val="solid"/>
+                      <a:round/>
+                      <a:headEnd type="none" w="med" len="med"/>
+                      <a:tailEnd type="none" w="med" len="med"/>
+                    </a:lnL>
+                    <a:lnR w="12700" cap="flat" cmpd="sng" algn="ctr">
+                      <a:solidFill>
+                        <a:schemeClr val="tx1"/>
+                      </a:solidFill>
+                      <a:prstDash val="solid"/>
+                      <a:round/>
+                      <a:headEnd type="none" w="med" len="med"/>
+                      <a:tailEnd type="none" w="med" len="med"/>
+                    </a:lnR>
+                  </a:tcPr>
+                </a:tc>
+                <a:tc>
+                  <a:txBody>
+                    <a:bodyPr/>
+                    <a:lstStyle/>
+                    <a:p>
+                      <a:pPr algn="ctr" fontAlgn="b">
+                        <a:buNone/>
+                      </a:pPr>
+                      <a:r>
+                        <a:rPr lang="en-IN" sz="1400" u="none" strike="noStrike">
+                          <a:effectLst/>
+                        </a:rPr>
+                        <a:t>yes</a:t>
+                      </a:r>
+                      <a:endParaRPr lang="en-IN" sz="1400" b="0" i="0" u="none" strike="noStrike">
+                        <a:solidFill>
+                          <a:srgbClr val="000000"/>
+                        </a:solidFill>
+                        <a:effectLst/>
+                        <a:latin typeface="Calibri" panose="020F0502020204030204" pitchFamily="34" charset="0"/>
+                      </a:endParaRPr>
+                    </a:p>
+                  </a:txBody>
+                  <a:tcPr marL="6350" marR="6350" marT="6350" marB="0" anchor="ctr">
+                    <a:lnL w="12700" cap="flat" cmpd="sng" algn="ctr">
+                      <a:solidFill>
+                        <a:schemeClr val="tx1"/>
+                      </a:solidFill>
+                      <a:prstDash val="solid"/>
+                      <a:round/>
+                      <a:headEnd type="none" w="med" len="med"/>
+                      <a:tailEnd type="none" w="med" len="med"/>
+                    </a:lnL>
+                  </a:tcPr>
+                </a:tc>
+                <a:tc>
+                  <a:txBody>
+                    <a:bodyPr/>
+                    <a:lstStyle/>
+                    <a:p>
+                      <a:pPr algn="ctr" fontAlgn="b">
+                        <a:buNone/>
+                      </a:pPr>
+                      <a:r>
+                        <a:rPr lang="en-IN" sz="1400" u="none" strike="noStrike" dirty="0">
+                          <a:effectLst/>
+                        </a:rPr>
+                        <a:t>-</a:t>
+                      </a:r>
+                      <a:endParaRPr lang="en-IN" sz="1400" b="0" i="0" u="none" strike="noStrike" dirty="0">
+                        <a:solidFill>
+                          <a:srgbClr val="000000"/>
+                        </a:solidFill>
+                        <a:effectLst/>
+                        <a:latin typeface="Calibri" panose="020F0502020204030204" pitchFamily="34" charset="0"/>
+                      </a:endParaRPr>
+                    </a:p>
+                  </a:txBody>
+                  <a:tcPr marL="6350" marR="6350" marT="6350" marB="0" anchor="ctr"/>
+                </a:tc>
+                <a:tc>
+                  <a:txBody>
+                    <a:bodyPr/>
+                    <a:lstStyle/>
+                    <a:p>
+                      <a:pPr algn="ctr" fontAlgn="b">
+                        <a:buNone/>
+                      </a:pPr>
+                      <a:r>
+                        <a:rPr lang="en-IN" sz="1400" u="none" strike="noStrike">
+                          <a:effectLst/>
+                        </a:rPr>
+                        <a:t>-</a:t>
+                      </a:r>
+                      <a:endParaRPr lang="en-IN" sz="1400" b="0" i="0" u="none" strike="noStrike">
+                        <a:solidFill>
+                          <a:srgbClr val="000000"/>
+                        </a:solidFill>
+                        <a:effectLst/>
+                        <a:latin typeface="Calibri" panose="020F0502020204030204" pitchFamily="34" charset="0"/>
+                      </a:endParaRPr>
+                    </a:p>
+                  </a:txBody>
+                  <a:tcPr marL="6350" marR="6350" marT="6350" marB="0" anchor="ctr"/>
+                </a:tc>
+                <a:extLst>
+                  <a:ext uri="{0D108BD9-81ED-4DB2-BD59-A6C34878D82A}">
+                    <a16:rowId xmlns:a16="http://schemas.microsoft.com/office/drawing/2014/main" val="1321790243"/>
+                  </a:ext>
+                </a:extLst>
+              </a:tr>
+              <a:tr h="344691">
+                <a:tc>
+                  <a:txBody>
+                    <a:bodyPr/>
+                    <a:lstStyle/>
+                    <a:p>
+                      <a:pPr algn="ctr" fontAlgn="b">
+                        <a:buNone/>
+                      </a:pPr>
+                      <a:r>
+                        <a:rPr lang="en-IN" sz="1400" b="1" u="none" strike="noStrike" dirty="0">
+                          <a:effectLst/>
+                        </a:rPr>
+                        <a:t>U</a:t>
+                      </a:r>
+                      <a:endParaRPr lang="en-IN" sz="1400" b="1" i="0" u="none" strike="noStrike" dirty="0">
+                        <a:solidFill>
+                          <a:srgbClr val="000000"/>
+                        </a:solidFill>
+                        <a:effectLst/>
+                        <a:latin typeface="Calibri" panose="020F0502020204030204" pitchFamily="34" charset="0"/>
+                      </a:endParaRPr>
+                    </a:p>
+                  </a:txBody>
+                  <a:tcPr marL="6350" marR="6350" marT="6350" marB="0" anchor="ctr">
+                    <a:lnR w="12700" cap="flat" cmpd="sng" algn="ctr">
+                      <a:solidFill>
+                        <a:schemeClr val="tx1"/>
+                      </a:solidFill>
+                      <a:prstDash val="solid"/>
+                      <a:round/>
+                      <a:headEnd type="none" w="med" len="med"/>
+                      <a:tailEnd type="none" w="med" len="med"/>
+                    </a:lnR>
+                  </a:tcPr>
+                </a:tc>
+                <a:tc>
+                  <a:txBody>
+                    <a:bodyPr/>
+                    <a:lstStyle/>
+                    <a:p>
+                      <a:pPr algn="ctr" fontAlgn="b">
+                        <a:buNone/>
+                      </a:pPr>
+                      <a:r>
+                        <a:rPr lang="en-IN" sz="1400" u="none" strike="noStrike">
+                          <a:effectLst/>
+                        </a:rPr>
+                        <a:t>no</a:t>
+                      </a:r>
+                      <a:endParaRPr lang="en-IN" sz="1400" b="0" i="0" u="none" strike="noStrike">
+                        <a:solidFill>
+                          <a:srgbClr val="000000"/>
+                        </a:solidFill>
+                        <a:effectLst/>
+                        <a:latin typeface="Calibri" panose="020F0502020204030204" pitchFamily="34" charset="0"/>
+                      </a:endParaRPr>
+                    </a:p>
+                  </a:txBody>
+                  <a:tcPr marL="6350" marR="6350" marT="6350" marB="0" anchor="ctr">
+                    <a:lnL w="12700" cap="flat" cmpd="sng" algn="ctr">
+                      <a:solidFill>
+                        <a:schemeClr val="tx1"/>
+                      </a:solidFill>
+                      <a:prstDash val="solid"/>
+                      <a:round/>
+                      <a:headEnd type="none" w="med" len="med"/>
+                      <a:tailEnd type="none" w="med" len="med"/>
+                    </a:lnL>
+                  </a:tcPr>
+                </a:tc>
+                <a:tc>
+                  <a:txBody>
+                    <a:bodyPr/>
+                    <a:lstStyle/>
+                    <a:p>
+                      <a:pPr algn="ctr" fontAlgn="b">
+                        <a:buNone/>
+                      </a:pPr>
+                      <a:r>
+                        <a:rPr lang="en-IN" sz="1400" u="none" strike="noStrike">
+                          <a:effectLst/>
+                        </a:rPr>
+                        <a:t>no</a:t>
+                      </a:r>
+                      <a:endParaRPr lang="en-IN" sz="1400" b="0" i="0" u="none" strike="noStrike">
+                        <a:solidFill>
+                          <a:srgbClr val="000000"/>
+                        </a:solidFill>
+                        <a:effectLst/>
+                        <a:latin typeface="Calibri" panose="020F0502020204030204" pitchFamily="34" charset="0"/>
+                      </a:endParaRPr>
+                    </a:p>
+                  </a:txBody>
+                  <a:tcPr marL="6350" marR="6350" marT="6350" marB="0" anchor="ctr">
+                    <a:lnR w="12700" cap="flat" cmpd="sng" algn="ctr">
+                      <a:solidFill>
+                        <a:schemeClr val="tx1"/>
+                      </a:solidFill>
+                      <a:prstDash val="solid"/>
+                      <a:round/>
+                      <a:headEnd type="none" w="med" len="med"/>
+                      <a:tailEnd type="none" w="med" len="med"/>
+                    </a:lnR>
+                  </a:tcPr>
+                </a:tc>
+                <a:tc>
+                  <a:txBody>
+                    <a:bodyPr/>
+                    <a:lstStyle/>
+                    <a:p>
+                      <a:pPr algn="ctr" fontAlgn="b">
+                        <a:buNone/>
+                      </a:pPr>
+                      <a:r>
+                        <a:rPr lang="en-IN" sz="1400" u="none" strike="noStrike" dirty="0">
+                          <a:effectLst/>
+                        </a:rPr>
+                        <a:t>yes</a:t>
+                      </a:r>
+                      <a:endParaRPr lang="en-IN" sz="1400" b="0" i="0" u="none" strike="noStrike" dirty="0">
+                        <a:solidFill>
+                          <a:srgbClr val="000000"/>
+                        </a:solidFill>
+                        <a:effectLst/>
+                        <a:latin typeface="Calibri" panose="020F0502020204030204" pitchFamily="34" charset="0"/>
+                      </a:endParaRPr>
+                    </a:p>
+                  </a:txBody>
+                  <a:tcPr marL="6350" marR="6350" marT="6350" marB="0" anchor="ctr">
+                    <a:lnL w="12700" cap="flat" cmpd="sng" algn="ctr">
+                      <a:solidFill>
+                        <a:schemeClr val="tx1"/>
+                      </a:solidFill>
+                      <a:prstDash val="solid"/>
+                      <a:round/>
+                      <a:headEnd type="none" w="med" len="med"/>
+                      <a:tailEnd type="none" w="med" len="med"/>
+                    </a:lnL>
+                    <a:lnR w="12700" cap="flat" cmpd="sng" algn="ctr">
+                      <a:solidFill>
+                        <a:schemeClr val="tx1"/>
+                      </a:solidFill>
+                      <a:prstDash val="solid"/>
+                      <a:round/>
+                      <a:headEnd type="none" w="med" len="med"/>
+                      <a:tailEnd type="none" w="med" len="med"/>
+                    </a:lnR>
+                  </a:tcPr>
+                </a:tc>
+                <a:tc>
+                  <a:txBody>
+                    <a:bodyPr/>
+                    <a:lstStyle/>
+                    <a:p>
+                      <a:pPr algn="ctr" fontAlgn="b">
+                        <a:buNone/>
+                      </a:pPr>
+                      <a:r>
+                        <a:rPr lang="en-IN" sz="1400" u="none" strike="noStrike">
+                          <a:effectLst/>
+                        </a:rPr>
+                        <a:t>yes</a:t>
+                      </a:r>
+                      <a:endParaRPr lang="en-IN" sz="1400" b="0" i="0" u="none" strike="noStrike">
+                        <a:solidFill>
+                          <a:srgbClr val="000000"/>
+                        </a:solidFill>
+                        <a:effectLst/>
+                        <a:latin typeface="Calibri" panose="020F0502020204030204" pitchFamily="34" charset="0"/>
+                      </a:endParaRPr>
+                    </a:p>
+                  </a:txBody>
+                  <a:tcPr marL="6350" marR="6350" marT="6350" marB="0" anchor="ctr">
+                    <a:lnL w="12700" cap="flat" cmpd="sng" algn="ctr">
+                      <a:solidFill>
+                        <a:schemeClr val="tx1"/>
+                      </a:solidFill>
+                      <a:prstDash val="solid"/>
+                      <a:round/>
+                      <a:headEnd type="none" w="med" len="med"/>
+                      <a:tailEnd type="none" w="med" len="med"/>
+                    </a:lnL>
+                  </a:tcPr>
+                </a:tc>
+                <a:tc>
+                  <a:txBody>
+                    <a:bodyPr/>
+                    <a:lstStyle/>
+                    <a:p>
+                      <a:pPr algn="ctr" fontAlgn="b">
+                        <a:buNone/>
+                      </a:pPr>
+                      <a:r>
+                        <a:rPr lang="en-IN" sz="1400" u="none" strike="noStrike" dirty="0">
+                          <a:effectLst/>
+                        </a:rPr>
+                        <a:t>-</a:t>
+                      </a:r>
+                      <a:endParaRPr lang="en-IN" sz="1400" b="0" i="0" u="none" strike="noStrike" dirty="0">
+                        <a:solidFill>
+                          <a:srgbClr val="000000"/>
+                        </a:solidFill>
+                        <a:effectLst/>
+                        <a:latin typeface="Calibri" panose="020F0502020204030204" pitchFamily="34" charset="0"/>
+                      </a:endParaRPr>
+                    </a:p>
+                  </a:txBody>
+                  <a:tcPr marL="6350" marR="6350" marT="6350" marB="0" anchor="ctr"/>
+                </a:tc>
+                <a:tc>
+                  <a:txBody>
+                    <a:bodyPr/>
+                    <a:lstStyle/>
+                    <a:p>
+                      <a:pPr algn="ctr" fontAlgn="b">
+                        <a:buNone/>
+                      </a:pPr>
+                      <a:r>
+                        <a:rPr lang="en-IN" sz="1400" u="none" strike="noStrike" dirty="0">
+                          <a:effectLst/>
+                        </a:rPr>
+                        <a:t>-</a:t>
+                      </a:r>
+                      <a:endParaRPr lang="en-IN" sz="1400" b="0" i="0" u="none" strike="noStrike" dirty="0">
+                        <a:solidFill>
+                          <a:srgbClr val="000000"/>
+                        </a:solidFill>
+                        <a:effectLst/>
+                        <a:latin typeface="Calibri" panose="020F0502020204030204" pitchFamily="34" charset="0"/>
+                      </a:endParaRPr>
+                    </a:p>
+                  </a:txBody>
+                  <a:tcPr marL="6350" marR="6350" marT="6350" marB="0" anchor="ctr"/>
+                </a:tc>
+                <a:extLst>
+                  <a:ext uri="{0D108BD9-81ED-4DB2-BD59-A6C34878D82A}">
+                    <a16:rowId xmlns:a16="http://schemas.microsoft.com/office/drawing/2014/main" val="4276450651"/>
+                  </a:ext>
+                </a:extLst>
+              </a:tr>
+              <a:tr h="344691">
+                <a:tc>
+                  <a:txBody>
+                    <a:bodyPr/>
+                    <a:lstStyle/>
+                    <a:p>
+                      <a:pPr algn="ctr" fontAlgn="b">
+                        <a:buNone/>
+                      </a:pPr>
+                      <a:r>
+                        <a:rPr lang="en-IN" sz="1400" b="1" u="none" strike="noStrike" dirty="0">
+                          <a:effectLst/>
+                        </a:rPr>
+                        <a:t>J</a:t>
+                      </a:r>
+                      <a:endParaRPr lang="en-IN" sz="1400" b="1" i="0" u="none" strike="noStrike" dirty="0">
+                        <a:solidFill>
+                          <a:srgbClr val="000000"/>
+                        </a:solidFill>
+                        <a:effectLst/>
+                        <a:latin typeface="Calibri" panose="020F0502020204030204" pitchFamily="34" charset="0"/>
+                      </a:endParaRPr>
+                    </a:p>
+                  </a:txBody>
+                  <a:tcPr marL="6350" marR="6350" marT="6350" marB="0" anchor="ctr">
+                    <a:lnR w="12700" cap="flat" cmpd="sng" algn="ctr">
+                      <a:solidFill>
+                        <a:schemeClr val="tx1"/>
+                      </a:solidFill>
+                      <a:prstDash val="solid"/>
+                      <a:round/>
+                      <a:headEnd type="none" w="med" len="med"/>
+                      <a:tailEnd type="none" w="med" len="med"/>
+                    </a:lnR>
+                  </a:tcPr>
+                </a:tc>
+                <a:tc>
+                  <a:txBody>
+                    <a:bodyPr/>
+                    <a:lstStyle/>
+                    <a:p>
+                      <a:pPr algn="ctr" fontAlgn="b">
+                        <a:buNone/>
+                      </a:pPr>
+                      <a:r>
+                        <a:rPr lang="en-IN" sz="1400" u="none" strike="noStrike">
+                          <a:effectLst/>
+                        </a:rPr>
+                        <a:t>no</a:t>
+                      </a:r>
+                      <a:endParaRPr lang="en-IN" sz="1400" b="0" i="0" u="none" strike="noStrike">
+                        <a:solidFill>
+                          <a:srgbClr val="000000"/>
+                        </a:solidFill>
+                        <a:effectLst/>
+                        <a:latin typeface="Calibri" panose="020F0502020204030204" pitchFamily="34" charset="0"/>
+                      </a:endParaRPr>
+                    </a:p>
+                  </a:txBody>
+                  <a:tcPr marL="6350" marR="6350" marT="6350" marB="0" anchor="ctr">
+                    <a:lnL w="12700" cap="flat" cmpd="sng" algn="ctr">
+                      <a:solidFill>
+                        <a:schemeClr val="tx1"/>
+                      </a:solidFill>
+                      <a:prstDash val="solid"/>
+                      <a:round/>
+                      <a:headEnd type="none" w="med" len="med"/>
+                      <a:tailEnd type="none" w="med" len="med"/>
+                    </a:lnL>
+                  </a:tcPr>
+                </a:tc>
+                <a:tc>
+                  <a:txBody>
+                    <a:bodyPr/>
+                    <a:lstStyle/>
+                    <a:p>
+                      <a:pPr algn="ctr" fontAlgn="b">
+                        <a:buNone/>
+                      </a:pPr>
+                      <a:r>
+                        <a:rPr lang="en-IN" sz="1400" u="none" strike="noStrike">
+                          <a:effectLst/>
+                        </a:rPr>
+                        <a:t>no</a:t>
+                      </a:r>
+                      <a:endParaRPr lang="en-IN" sz="1400" b="0" i="0" u="none" strike="noStrike">
+                        <a:solidFill>
+                          <a:srgbClr val="000000"/>
+                        </a:solidFill>
+                        <a:effectLst/>
+                        <a:latin typeface="Calibri" panose="020F0502020204030204" pitchFamily="34" charset="0"/>
+                      </a:endParaRPr>
+                    </a:p>
+                  </a:txBody>
+                  <a:tcPr marL="6350" marR="6350" marT="6350" marB="0" anchor="ctr">
+                    <a:lnR w="12700" cap="flat" cmpd="sng" algn="ctr">
+                      <a:solidFill>
+                        <a:schemeClr val="tx1"/>
+                      </a:solidFill>
+                      <a:prstDash val="solid"/>
+                      <a:round/>
+                      <a:headEnd type="none" w="med" len="med"/>
+                      <a:tailEnd type="none" w="med" len="med"/>
+                    </a:lnR>
+                  </a:tcPr>
+                </a:tc>
+                <a:tc>
+                  <a:txBody>
+                    <a:bodyPr/>
+                    <a:lstStyle/>
+                    <a:p>
+                      <a:pPr algn="ctr" fontAlgn="b">
+                        <a:buNone/>
+                      </a:pPr>
+                      <a:r>
+                        <a:rPr lang="en-IN" sz="1400" u="none" strike="noStrike" dirty="0">
+                          <a:effectLst/>
+                        </a:rPr>
+                        <a:t>yes</a:t>
+                      </a:r>
+                      <a:endParaRPr lang="en-IN" sz="1400" b="0" i="0" u="none" strike="noStrike" dirty="0">
+                        <a:solidFill>
+                          <a:srgbClr val="000000"/>
+                        </a:solidFill>
+                        <a:effectLst/>
+                        <a:latin typeface="Calibri" panose="020F0502020204030204" pitchFamily="34" charset="0"/>
+                      </a:endParaRPr>
+                    </a:p>
+                  </a:txBody>
+                  <a:tcPr marL="6350" marR="6350" marT="6350" marB="0" anchor="ctr">
+                    <a:lnL w="12700" cap="flat" cmpd="sng" algn="ctr">
+                      <a:solidFill>
+                        <a:schemeClr val="tx1"/>
+                      </a:solidFill>
+                      <a:prstDash val="solid"/>
+                      <a:round/>
+                      <a:headEnd type="none" w="med" len="med"/>
+                      <a:tailEnd type="none" w="med" len="med"/>
+                    </a:lnL>
+                    <a:lnR w="12700" cap="flat" cmpd="sng" algn="ctr">
+                      <a:solidFill>
+                        <a:schemeClr val="tx1"/>
+                      </a:solidFill>
+                      <a:prstDash val="solid"/>
+                      <a:round/>
+                      <a:headEnd type="none" w="med" len="med"/>
+                      <a:tailEnd type="none" w="med" len="med"/>
+                    </a:lnR>
+                  </a:tcPr>
+                </a:tc>
+                <a:tc>
+                  <a:txBody>
+                    <a:bodyPr/>
+                    <a:lstStyle/>
+                    <a:p>
+                      <a:pPr algn="ctr" fontAlgn="b">
+                        <a:buNone/>
+                      </a:pPr>
+                      <a:r>
+                        <a:rPr lang="en-IN" sz="1400" u="none" strike="noStrike">
+                          <a:effectLst/>
+                        </a:rPr>
+                        <a:t>yes</a:t>
+                      </a:r>
+                      <a:endParaRPr lang="en-IN" sz="1400" b="0" i="0" u="none" strike="noStrike">
+                        <a:solidFill>
+                          <a:srgbClr val="000000"/>
+                        </a:solidFill>
+                        <a:effectLst/>
+                        <a:latin typeface="Calibri" panose="020F0502020204030204" pitchFamily="34" charset="0"/>
+                      </a:endParaRPr>
+                    </a:p>
+                  </a:txBody>
+                  <a:tcPr marL="6350" marR="6350" marT="6350" marB="0" anchor="ctr">
+                    <a:lnL w="12700" cap="flat" cmpd="sng" algn="ctr">
+                      <a:solidFill>
+                        <a:schemeClr val="tx1"/>
+                      </a:solidFill>
+                      <a:prstDash val="solid"/>
+                      <a:round/>
+                      <a:headEnd type="none" w="med" len="med"/>
+                      <a:tailEnd type="none" w="med" len="med"/>
+                    </a:lnL>
+                  </a:tcPr>
+                </a:tc>
+                <a:tc>
+                  <a:txBody>
+                    <a:bodyPr/>
+                    <a:lstStyle/>
+                    <a:p>
+                      <a:pPr algn="ctr" fontAlgn="b">
+                        <a:buNone/>
+                      </a:pPr>
+                      <a:r>
+                        <a:rPr lang="en-IN" sz="1400" u="none" strike="noStrike">
+                          <a:effectLst/>
+                        </a:rPr>
+                        <a:t>-</a:t>
+                      </a:r>
+                      <a:endParaRPr lang="en-IN" sz="1400" b="0" i="0" u="none" strike="noStrike">
+                        <a:solidFill>
+                          <a:srgbClr val="000000"/>
+                        </a:solidFill>
+                        <a:effectLst/>
+                        <a:latin typeface="Calibri" panose="020F0502020204030204" pitchFamily="34" charset="0"/>
+                      </a:endParaRPr>
+                    </a:p>
+                  </a:txBody>
+                  <a:tcPr marL="6350" marR="6350" marT="6350" marB="0" anchor="ctr"/>
+                </a:tc>
+                <a:tc>
+                  <a:txBody>
+                    <a:bodyPr/>
+                    <a:lstStyle/>
+                    <a:p>
+                      <a:pPr algn="ctr" fontAlgn="b">
+                        <a:buNone/>
+                      </a:pPr>
+                      <a:r>
+                        <a:rPr lang="en-IN" sz="1400" u="none" strike="noStrike" dirty="0">
+                          <a:effectLst/>
+                        </a:rPr>
+                        <a:t>-</a:t>
+                      </a:r>
+                      <a:endParaRPr lang="en-IN" sz="1400" b="0" i="0" u="none" strike="noStrike" dirty="0">
+                        <a:solidFill>
+                          <a:srgbClr val="000000"/>
+                        </a:solidFill>
+                        <a:effectLst/>
+                        <a:latin typeface="Calibri" panose="020F0502020204030204" pitchFamily="34" charset="0"/>
+                      </a:endParaRPr>
+                    </a:p>
+                  </a:txBody>
+                  <a:tcPr marL="6350" marR="6350" marT="6350" marB="0" anchor="ctr"/>
+                </a:tc>
+                <a:extLst>
+                  <a:ext uri="{0D108BD9-81ED-4DB2-BD59-A6C34878D82A}">
+                    <a16:rowId xmlns:a16="http://schemas.microsoft.com/office/drawing/2014/main" val="1267328008"/>
+                  </a:ext>
+                </a:extLst>
+              </a:tr>
+            </a:tbl>
+          </a:graphicData>
+        </a:graphic>
+      </p:graphicFrame>
+    </p:spTree>
+    <p:extLst>
+      <p:ext uri="{BB962C8B-B14F-4D97-AF65-F5344CB8AC3E}">
+        <p14:creationId xmlns:p14="http://schemas.microsoft.com/office/powerpoint/2010/main" val="1202657133"/>
+      </p:ext>
+    </p:extLst>
+  </p:cSld>
+  <p:clrMapOvr>
+    <a:masterClrMapping/>
+  </p:clrMapOvr>
+</p:sld>
+</file>
+
+<file path=ppt/slides/slide9.xml><?xml version="1.0" encoding="utf-8"?>
+<p:sld xmlns:a="http://schemas.openxmlformats.org/drawingml/2006/main" xmlns:r="http://schemas.openxmlformats.org/officeDocument/2006/relationships" xmlns:p="http://schemas.openxmlformats.org/presentationml/2006/main">
+  <p:cSld>
+    <p:spTree>
+      <p:nvGrpSpPr>
+        <p:cNvPr id="1" name=""/>
+        <p:cNvGrpSpPr/>
+        <p:nvPr/>
+      </p:nvGrpSpPr>
+      <p:grpSpPr>
+        <a:xfrm>
+          <a:off x="0" y="0"/>
+          <a:ext cx="0" cy="0"/>
+          <a:chOff x="0" y="0"/>
+          <a:chExt cx="0" cy="0"/>
+        </a:xfrm>
+      </p:grpSpPr>
+      <p:sp>
+        <p:nvSpPr>
+          <p:cNvPr id="2" name="Title 1">
+            <a:extLst>
+              <a:ext uri="{FF2B5EF4-FFF2-40B4-BE49-F238E27FC236}">
+                <a16:creationId xmlns:a16="http://schemas.microsoft.com/office/drawing/2014/main" id="{F101F18A-163F-9584-BE91-C99B6C7D5A36}"/>
+              </a:ext>
+            </a:extLst>
+          </p:cNvPr>
+          <p:cNvSpPr>
+            <a:spLocks noGrp="1"/>
+          </p:cNvSpPr>
+          <p:nvPr>
+            <p:ph type="title"/>
+          </p:nvPr>
+        </p:nvSpPr>
+        <p:spPr/>
+        <p:txBody>
+          <a:bodyPr/>
+          <a:lstStyle/>
+          <a:p>
+            <a:r>
+              <a:rPr lang="en-US" dirty="0"/>
+              <a:t>Hazards / Stalls</a:t>
+            </a:r>
+            <a:endParaRPr lang="en-IN" dirty="0"/>
+          </a:p>
+        </p:txBody>
+      </p:sp>
+      <p:sp>
+        <p:nvSpPr>
+          <p:cNvPr id="3" name="Content Placeholder 2">
+            <a:extLst>
+              <a:ext uri="{FF2B5EF4-FFF2-40B4-BE49-F238E27FC236}">
+                <a16:creationId xmlns:a16="http://schemas.microsoft.com/office/drawing/2014/main" id="{948BA2FE-505D-C974-A64C-441CB0213840}"/>
+              </a:ext>
+            </a:extLst>
+          </p:cNvPr>
+          <p:cNvSpPr>
+            <a:spLocks noGrp="1"/>
+          </p:cNvSpPr>
+          <p:nvPr>
+            <p:ph idx="1"/>
+          </p:nvPr>
+        </p:nvSpPr>
+        <p:spPr/>
+        <p:txBody>
+          <a:bodyPr/>
+          <a:lstStyle/>
+          <a:p>
+            <a:pPr marL="342900" indent="-342900">
+              <a:buFont typeface="+mj-lt"/>
+              <a:buAutoNum type="arabicPeriod"/>
+            </a:pPr>
+            <a:r>
+              <a:rPr lang="en-US" dirty="0"/>
+              <a:t>Structural Hazard : only one instruction can access data memory at once. </a:t>
+            </a:r>
+          </a:p>
+          <a:p>
+            <a:pPr marL="342900" indent="-342900">
+              <a:buFont typeface="+mj-lt"/>
+              <a:buAutoNum type="arabicPeriod"/>
+            </a:pPr>
+            <a:r>
+              <a:rPr lang="en-US" dirty="0"/>
+              <a:t>Data Hazards : any instructions that produce an (</a:t>
+            </a:r>
+            <a:r>
+              <a:rPr lang="en-US" dirty="0" err="1"/>
+              <a:t>rd</a:t>
+            </a:r>
+            <a:r>
+              <a:rPr lang="en-US" dirty="0"/>
+              <a:t>) that conflicts with (rs1 or rs2) of another instruction</a:t>
+            </a:r>
+          </a:p>
+          <a:p>
+            <a:pPr marL="342900" indent="-342900">
+              <a:buFont typeface="+mj-lt"/>
+              <a:buAutoNum type="arabicPeriod"/>
+            </a:pPr>
+            <a:r>
+              <a:rPr lang="en-US" dirty="0"/>
+              <a:t>Control Hazards : none (branch and jump instructions complete as soon as they are fetched)</a:t>
+            </a:r>
+            <a:endParaRPr lang="en-IN" dirty="0"/>
+          </a:p>
+        </p:txBody>
+      </p:sp>
+    </p:spTree>
+    <p:extLst>
+      <p:ext uri="{BB962C8B-B14F-4D97-AF65-F5344CB8AC3E}">
+        <p14:creationId xmlns:p14="http://schemas.microsoft.com/office/powerpoint/2010/main" val="3870776936"/>
+      </p:ext>
+    </p:extLst>
+  </p:cSld>
+  <p:clrMapOvr>
+    <a:masterClrMapping/>
+  </p:clrMapOvr>
+</p:sld>
+</file>
+
 <file path=ppt/theme/theme1.xml><?xml version="1.0" encoding="utf-8"?>
 <a:theme xmlns:a="http://schemas.openxmlformats.org/drawingml/2006/main" name="Atlas">
   <a:themeElements>

</xml_diff>

<commit_message>
still implementing stall4mem_pip, updated documentation accordingly
</commit_message>
<xml_diff>
--- a/rtl/core/multi_cycle/stall_for_mem_core.pptx
+++ b/rtl/core/multi_cycle/stall_for_mem_core.pptx
@@ -4,6 +4,9 @@
   <p:sldMasterIdLst>
     <p:sldMasterId id="2147483672" r:id="rId1"/>
   </p:sldMasterIdLst>
+  <p:notesMasterIdLst>
+    <p:notesMasterId r:id="rId14"/>
+  </p:notesMasterIdLst>
   <p:sldIdLst>
     <p:sldId id="256" r:id="rId2"/>
     <p:sldId id="257" r:id="rId3"/>
@@ -15,8 +18,8 @@
     <p:sldId id="263" r:id="rId9"/>
     <p:sldId id="264" r:id="rId10"/>
     <p:sldId id="265" r:id="rId11"/>
-    <p:sldId id="266" r:id="rId12"/>
-    <p:sldId id="267" r:id="rId13"/>
+    <p:sldId id="267" r:id="rId12"/>
+    <p:sldId id="266" r:id="rId13"/>
   </p:sldIdLst>
   <p:sldSz cx="12192000" cy="6858000"/>
   <p:notesSz cx="6858000" cy="9144000"/>
@@ -128,7 +131,7 @@
   <pc:docChgLst>
     <pc:chgData name="Mrinav Saxena" userId="1ae1cb636c956b49" providerId="LiveId" clId="{3D40DB4B-8E00-40BA-9204-277439F83DB8}"/>
     <pc:docChg chg="undo redo custSel addSld delSld modSld sldOrd">
-      <pc:chgData name="Mrinav Saxena" userId="1ae1cb636c956b49" providerId="LiveId" clId="{3D40DB4B-8E00-40BA-9204-277439F83DB8}" dt="2025-09-15T16:27:46.686" v="10374" actId="20577"/>
+      <pc:chgData name="Mrinav Saxena" userId="1ae1cb636c956b49" providerId="LiveId" clId="{3D40DB4B-8E00-40BA-9204-277439F83DB8}" dt="2025-09-17T13:06:04.062" v="11922" actId="20577"/>
       <pc:docMkLst>
         <pc:docMk/>
       </pc:docMkLst>
@@ -336,14 +339,22 @@
           </ac:spMkLst>
         </pc:spChg>
       </pc:sldChg>
-      <pc:sldChg chg="modSp new">
-        <pc:chgData name="Mrinav Saxena" userId="1ae1cb636c956b49" providerId="LiveId" clId="{3D40DB4B-8E00-40BA-9204-277439F83DB8}" dt="2025-09-13T19:13:25.663" v="9983"/>
+      <pc:sldChg chg="modSp new mod ord modNotesTx">
+        <pc:chgData name="Mrinav Saxena" userId="1ae1cb636c956b49" providerId="LiveId" clId="{3D40DB4B-8E00-40BA-9204-277439F83DB8}" dt="2025-09-17T13:06:04.062" v="11922" actId="20577"/>
         <pc:sldMkLst>
           <pc:docMk/>
           <pc:sldMk cId="221806829" sldId="267"/>
         </pc:sldMkLst>
         <pc:spChg chg="mod">
-          <ac:chgData name="Mrinav Saxena" userId="1ae1cb636c956b49" providerId="LiveId" clId="{3D40DB4B-8E00-40BA-9204-277439F83DB8}" dt="2025-09-13T19:13:25.663" v="9983"/>
+          <ac:chgData name="Mrinav Saxena" userId="1ae1cb636c956b49" providerId="LiveId" clId="{3D40DB4B-8E00-40BA-9204-277439F83DB8}" dt="2025-09-17T12:11:33.099" v="10390" actId="20577"/>
+          <ac:spMkLst>
+            <pc:docMk/>
+            <pc:sldMk cId="221806829" sldId="267"/>
+            <ac:spMk id="2" creationId="{7055E22B-F86E-D7A5-57C2-8179F1C5EDE2}"/>
+          </ac:spMkLst>
+        </pc:spChg>
+        <pc:spChg chg="mod">
+          <ac:chgData name="Mrinav Saxena" userId="1ae1cb636c956b49" providerId="LiveId" clId="{3D40DB4B-8E00-40BA-9204-277439F83DB8}" dt="2025-09-17T12:56:11.693" v="10940" actId="20577"/>
           <ac:spMkLst>
             <pc:docMk/>
             <pc:sldMk cId="221806829" sldId="267"/>
@@ -364,42 +375,514 @@
           <pc:docMk/>
           <pc:sldMk cId="650440513" sldId="268"/>
         </pc:sldMkLst>
-        <pc:spChg chg="del">
-          <ac:chgData name="Mrinav Saxena" userId="1ae1cb636c956b49" providerId="LiveId" clId="{3D40DB4B-8E00-40BA-9204-277439F83DB8}" dt="2025-09-14T08:22:44.235" v="10177" actId="700"/>
-          <ac:spMkLst>
-            <pc:docMk/>
-            <pc:sldMk cId="650440513" sldId="268"/>
-            <ac:spMk id="2" creationId="{D9550701-6FC7-1A67-4F0C-00C8F60F78BC}"/>
-          </ac:spMkLst>
-        </pc:spChg>
-        <pc:spChg chg="del">
-          <ac:chgData name="Mrinav Saxena" userId="1ae1cb636c956b49" providerId="LiveId" clId="{3D40DB4B-8E00-40BA-9204-277439F83DB8}" dt="2025-09-14T08:22:44.235" v="10177" actId="700"/>
-          <ac:spMkLst>
-            <pc:docMk/>
-            <pc:sldMk cId="650440513" sldId="268"/>
-            <ac:spMk id="3" creationId="{30322008-A52E-4E81-60F6-89425DC9748F}"/>
-          </ac:spMkLst>
-        </pc:spChg>
-        <pc:spChg chg="add mod">
-          <ac:chgData name="Mrinav Saxena" userId="1ae1cb636c956b49" providerId="LiveId" clId="{3D40DB4B-8E00-40BA-9204-277439F83DB8}" dt="2025-09-14T08:22:53.863" v="10178" actId="700"/>
-          <ac:spMkLst>
-            <pc:docMk/>
-            <pc:sldMk cId="650440513" sldId="268"/>
-            <ac:spMk id="4" creationId="{23B6481B-6EA6-0006-B5F8-B4F4D0D7986F}"/>
-          </ac:spMkLst>
-        </pc:spChg>
-        <pc:spChg chg="add mod">
-          <ac:chgData name="Mrinav Saxena" userId="1ae1cb636c956b49" providerId="LiveId" clId="{3D40DB4B-8E00-40BA-9204-277439F83DB8}" dt="2025-09-14T08:22:53.863" v="10178" actId="700"/>
-          <ac:spMkLst>
-            <pc:docMk/>
-            <pc:sldMk cId="650440513" sldId="268"/>
-            <ac:spMk id="5" creationId="{8A9B76C4-A773-F5AA-B3B0-628065EA5784}"/>
-          </ac:spMkLst>
-        </pc:spChg>
       </pc:sldChg>
     </pc:docChg>
   </pc:docChgLst>
 </pc:chgInfo>
+</file>
+
+<file path=ppt/notesMasters/notesMaster1.xml><?xml version="1.0" encoding="utf-8"?>
+<p:notesMaster xmlns:a="http://schemas.openxmlformats.org/drawingml/2006/main" xmlns:r="http://schemas.openxmlformats.org/officeDocument/2006/relationships" xmlns:p="http://schemas.openxmlformats.org/presentationml/2006/main">
+  <p:cSld>
+    <p:bg>
+      <p:bgRef idx="1001">
+        <a:schemeClr val="bg1"/>
+      </p:bgRef>
+    </p:bg>
+    <p:spTree>
+      <p:nvGrpSpPr>
+        <p:cNvPr id="1" name=""/>
+        <p:cNvGrpSpPr/>
+        <p:nvPr/>
+      </p:nvGrpSpPr>
+      <p:grpSpPr>
+        <a:xfrm>
+          <a:off x="0" y="0"/>
+          <a:ext cx="0" cy="0"/>
+          <a:chOff x="0" y="0"/>
+          <a:chExt cx="0" cy="0"/>
+        </a:xfrm>
+      </p:grpSpPr>
+      <p:sp>
+        <p:nvSpPr>
+          <p:cNvPr id="2" name="Header Placeholder 1"/>
+          <p:cNvSpPr>
+            <a:spLocks noGrp="1"/>
+          </p:cNvSpPr>
+          <p:nvPr>
+            <p:ph type="hdr" sz="quarter"/>
+          </p:nvPr>
+        </p:nvSpPr>
+        <p:spPr>
+          <a:xfrm>
+            <a:off x="0" y="0"/>
+            <a:ext cx="2971800" cy="458788"/>
+          </a:xfrm>
+          <a:prstGeom prst="rect">
+            <a:avLst/>
+          </a:prstGeom>
+        </p:spPr>
+        <p:txBody>
+          <a:bodyPr vert="horz" lIns="91440" tIns="45720" rIns="91440" bIns="45720" rtlCol="0"/>
+          <a:lstStyle>
+            <a:lvl1pPr algn="l">
+              <a:defRPr sz="1200"/>
+            </a:lvl1pPr>
+          </a:lstStyle>
+          <a:p>
+            <a:endParaRPr lang="en-IN"/>
+          </a:p>
+        </p:txBody>
+      </p:sp>
+      <p:sp>
+        <p:nvSpPr>
+          <p:cNvPr id="3" name="Date Placeholder 2"/>
+          <p:cNvSpPr>
+            <a:spLocks noGrp="1"/>
+          </p:cNvSpPr>
+          <p:nvPr>
+            <p:ph type="dt" idx="1"/>
+          </p:nvPr>
+        </p:nvSpPr>
+        <p:spPr>
+          <a:xfrm>
+            <a:off x="3884613" y="0"/>
+            <a:ext cx="2971800" cy="458788"/>
+          </a:xfrm>
+          <a:prstGeom prst="rect">
+            <a:avLst/>
+          </a:prstGeom>
+        </p:spPr>
+        <p:txBody>
+          <a:bodyPr vert="horz" lIns="91440" tIns="45720" rIns="91440" bIns="45720" rtlCol="0"/>
+          <a:lstStyle>
+            <a:lvl1pPr algn="r">
+              <a:defRPr sz="1200"/>
+            </a:lvl1pPr>
+          </a:lstStyle>
+          <a:p>
+            <a:fld id="{500EB78D-BB55-4B05-91A4-47B016A9092A}" type="datetimeFigureOut">
+              <a:rPr lang="en-IN" smtClean="0"/>
+              <a:t>17-09-2025</a:t>
+            </a:fld>
+            <a:endParaRPr lang="en-IN"/>
+          </a:p>
+        </p:txBody>
+      </p:sp>
+      <p:sp>
+        <p:nvSpPr>
+          <p:cNvPr id="4" name="Slide Image Placeholder 3"/>
+          <p:cNvSpPr>
+            <a:spLocks noGrp="1" noRot="1" noChangeAspect="1"/>
+          </p:cNvSpPr>
+          <p:nvPr>
+            <p:ph type="sldImg" idx="2"/>
+          </p:nvPr>
+        </p:nvSpPr>
+        <p:spPr>
+          <a:xfrm>
+            <a:off x="685800" y="1143000"/>
+            <a:ext cx="5486400" cy="3086100"/>
+          </a:xfrm>
+          <a:prstGeom prst="rect">
+            <a:avLst/>
+          </a:prstGeom>
+          <a:noFill/>
+          <a:ln w="12700">
+            <a:solidFill>
+              <a:prstClr val="black"/>
+            </a:solidFill>
+          </a:ln>
+        </p:spPr>
+        <p:txBody>
+          <a:bodyPr vert="horz" lIns="91440" tIns="45720" rIns="91440" bIns="45720" rtlCol="0" anchor="ctr"/>
+          <a:lstStyle/>
+          <a:p>
+            <a:endParaRPr lang="en-IN"/>
+          </a:p>
+        </p:txBody>
+      </p:sp>
+      <p:sp>
+        <p:nvSpPr>
+          <p:cNvPr id="5" name="Notes Placeholder 4"/>
+          <p:cNvSpPr>
+            <a:spLocks noGrp="1"/>
+          </p:cNvSpPr>
+          <p:nvPr>
+            <p:ph type="body" sz="quarter" idx="3"/>
+          </p:nvPr>
+        </p:nvSpPr>
+        <p:spPr>
+          <a:xfrm>
+            <a:off x="685800" y="4400550"/>
+            <a:ext cx="5486400" cy="3600450"/>
+          </a:xfrm>
+          <a:prstGeom prst="rect">
+            <a:avLst/>
+          </a:prstGeom>
+        </p:spPr>
+        <p:txBody>
+          <a:bodyPr vert="horz" lIns="91440" tIns="45720" rIns="91440" bIns="45720" rtlCol="0"/>
+          <a:lstStyle/>
+          <a:p>
+            <a:pPr lvl="0"/>
+            <a:r>
+              <a:rPr lang="en-US"/>
+              <a:t>Click to edit Master text styles</a:t>
+            </a:r>
+          </a:p>
+          <a:p>
+            <a:pPr lvl="1"/>
+            <a:r>
+              <a:rPr lang="en-US"/>
+              <a:t>Second level</a:t>
+            </a:r>
+          </a:p>
+          <a:p>
+            <a:pPr lvl="2"/>
+            <a:r>
+              <a:rPr lang="en-US"/>
+              <a:t>Third level</a:t>
+            </a:r>
+          </a:p>
+          <a:p>
+            <a:pPr lvl="3"/>
+            <a:r>
+              <a:rPr lang="en-US"/>
+              <a:t>Fourth level</a:t>
+            </a:r>
+          </a:p>
+          <a:p>
+            <a:pPr lvl="4"/>
+            <a:r>
+              <a:rPr lang="en-US"/>
+              <a:t>Fifth level</a:t>
+            </a:r>
+            <a:endParaRPr lang="en-IN"/>
+          </a:p>
+        </p:txBody>
+      </p:sp>
+      <p:sp>
+        <p:nvSpPr>
+          <p:cNvPr id="6" name="Footer Placeholder 5"/>
+          <p:cNvSpPr>
+            <a:spLocks noGrp="1"/>
+          </p:cNvSpPr>
+          <p:nvPr>
+            <p:ph type="ftr" sz="quarter" idx="4"/>
+          </p:nvPr>
+        </p:nvSpPr>
+        <p:spPr>
+          <a:xfrm>
+            <a:off x="0" y="8685213"/>
+            <a:ext cx="2971800" cy="458787"/>
+          </a:xfrm>
+          <a:prstGeom prst="rect">
+            <a:avLst/>
+          </a:prstGeom>
+        </p:spPr>
+        <p:txBody>
+          <a:bodyPr vert="horz" lIns="91440" tIns="45720" rIns="91440" bIns="45720" rtlCol="0" anchor="b"/>
+          <a:lstStyle>
+            <a:lvl1pPr algn="l">
+              <a:defRPr sz="1200"/>
+            </a:lvl1pPr>
+          </a:lstStyle>
+          <a:p>
+            <a:endParaRPr lang="en-IN"/>
+          </a:p>
+        </p:txBody>
+      </p:sp>
+      <p:sp>
+        <p:nvSpPr>
+          <p:cNvPr id="7" name="Slide Number Placeholder 6"/>
+          <p:cNvSpPr>
+            <a:spLocks noGrp="1"/>
+          </p:cNvSpPr>
+          <p:nvPr>
+            <p:ph type="sldNum" sz="quarter" idx="5"/>
+          </p:nvPr>
+        </p:nvSpPr>
+        <p:spPr>
+          <a:xfrm>
+            <a:off x="3884613" y="8685213"/>
+            <a:ext cx="2971800" cy="458787"/>
+          </a:xfrm>
+          <a:prstGeom prst="rect">
+            <a:avLst/>
+          </a:prstGeom>
+        </p:spPr>
+        <p:txBody>
+          <a:bodyPr vert="horz" lIns="91440" tIns="45720" rIns="91440" bIns="45720" rtlCol="0" anchor="b"/>
+          <a:lstStyle>
+            <a:lvl1pPr algn="r">
+              <a:defRPr sz="1200"/>
+            </a:lvl1pPr>
+          </a:lstStyle>
+          <a:p>
+            <a:fld id="{31E98FFB-FDE1-46F1-A6EF-6ED24DB31D88}" type="slidenum">
+              <a:rPr lang="en-IN" smtClean="0"/>
+              <a:t>‹#›</a:t>
+            </a:fld>
+            <a:endParaRPr lang="en-IN"/>
+          </a:p>
+        </p:txBody>
+      </p:sp>
+    </p:spTree>
+    <p:extLst>
+      <p:ext uri="{BB962C8B-B14F-4D97-AF65-F5344CB8AC3E}">
+        <p14:creationId xmlns:p14="http://schemas.microsoft.com/office/powerpoint/2010/main" val="4274372074"/>
+      </p:ext>
+    </p:extLst>
+  </p:cSld>
+  <p:clrMap bg1="lt1" tx1="dk1" bg2="lt2" tx2="dk2" accent1="accent1" accent2="accent2" accent3="accent3" accent4="accent4" accent5="accent5" accent6="accent6" hlink="hlink" folHlink="folHlink"/>
+  <p:notesStyle>
+    <a:lvl1pPr marL="0" algn="l" defTabSz="914400" rtl="0" eaLnBrk="1" latinLnBrk="0" hangingPunct="1">
+      <a:defRPr sz="1200" kern="1200">
+        <a:solidFill>
+          <a:schemeClr val="tx1"/>
+        </a:solidFill>
+        <a:latin typeface="+mn-lt"/>
+        <a:ea typeface="+mn-ea"/>
+        <a:cs typeface="+mn-cs"/>
+      </a:defRPr>
+    </a:lvl1pPr>
+    <a:lvl2pPr marL="457200" algn="l" defTabSz="914400" rtl="0" eaLnBrk="1" latinLnBrk="0" hangingPunct="1">
+      <a:defRPr sz="1200" kern="1200">
+        <a:solidFill>
+          <a:schemeClr val="tx1"/>
+        </a:solidFill>
+        <a:latin typeface="+mn-lt"/>
+        <a:ea typeface="+mn-ea"/>
+        <a:cs typeface="+mn-cs"/>
+      </a:defRPr>
+    </a:lvl2pPr>
+    <a:lvl3pPr marL="914400" algn="l" defTabSz="914400" rtl="0" eaLnBrk="1" latinLnBrk="0" hangingPunct="1">
+      <a:defRPr sz="1200" kern="1200">
+        <a:solidFill>
+          <a:schemeClr val="tx1"/>
+        </a:solidFill>
+        <a:latin typeface="+mn-lt"/>
+        <a:ea typeface="+mn-ea"/>
+        <a:cs typeface="+mn-cs"/>
+      </a:defRPr>
+    </a:lvl3pPr>
+    <a:lvl4pPr marL="1371600" algn="l" defTabSz="914400" rtl="0" eaLnBrk="1" latinLnBrk="0" hangingPunct="1">
+      <a:defRPr sz="1200" kern="1200">
+        <a:solidFill>
+          <a:schemeClr val="tx1"/>
+        </a:solidFill>
+        <a:latin typeface="+mn-lt"/>
+        <a:ea typeface="+mn-ea"/>
+        <a:cs typeface="+mn-cs"/>
+      </a:defRPr>
+    </a:lvl4pPr>
+    <a:lvl5pPr marL="1828800" algn="l" defTabSz="914400" rtl="0" eaLnBrk="1" latinLnBrk="0" hangingPunct="1">
+      <a:defRPr sz="1200" kern="1200">
+        <a:solidFill>
+          <a:schemeClr val="tx1"/>
+        </a:solidFill>
+        <a:latin typeface="+mn-lt"/>
+        <a:ea typeface="+mn-ea"/>
+        <a:cs typeface="+mn-cs"/>
+      </a:defRPr>
+    </a:lvl5pPr>
+    <a:lvl6pPr marL="2286000" algn="l" defTabSz="914400" rtl="0" eaLnBrk="1" latinLnBrk="0" hangingPunct="1">
+      <a:defRPr sz="1200" kern="1200">
+        <a:solidFill>
+          <a:schemeClr val="tx1"/>
+        </a:solidFill>
+        <a:latin typeface="+mn-lt"/>
+        <a:ea typeface="+mn-ea"/>
+        <a:cs typeface="+mn-cs"/>
+      </a:defRPr>
+    </a:lvl6pPr>
+    <a:lvl7pPr marL="2743200" algn="l" defTabSz="914400" rtl="0" eaLnBrk="1" latinLnBrk="0" hangingPunct="1">
+      <a:defRPr sz="1200" kern="1200">
+        <a:solidFill>
+          <a:schemeClr val="tx1"/>
+        </a:solidFill>
+        <a:latin typeface="+mn-lt"/>
+        <a:ea typeface="+mn-ea"/>
+        <a:cs typeface="+mn-cs"/>
+      </a:defRPr>
+    </a:lvl7pPr>
+    <a:lvl8pPr marL="3200400" algn="l" defTabSz="914400" rtl="0" eaLnBrk="1" latinLnBrk="0" hangingPunct="1">
+      <a:defRPr sz="1200" kern="1200">
+        <a:solidFill>
+          <a:schemeClr val="tx1"/>
+        </a:solidFill>
+        <a:latin typeface="+mn-lt"/>
+        <a:ea typeface="+mn-ea"/>
+        <a:cs typeface="+mn-cs"/>
+      </a:defRPr>
+    </a:lvl8pPr>
+    <a:lvl9pPr marL="3657600" algn="l" defTabSz="914400" rtl="0" eaLnBrk="1" latinLnBrk="0" hangingPunct="1">
+      <a:defRPr sz="1200" kern="1200">
+        <a:solidFill>
+          <a:schemeClr val="tx1"/>
+        </a:solidFill>
+        <a:latin typeface="+mn-lt"/>
+        <a:ea typeface="+mn-ea"/>
+        <a:cs typeface="+mn-cs"/>
+      </a:defRPr>
+    </a:lvl9pPr>
+  </p:notesStyle>
+</p:notesMaster>
+</file>
+
+<file path=ppt/notesSlides/notesSlide1.xml><?xml version="1.0" encoding="utf-8"?>
+<p:notes xmlns:a="http://schemas.openxmlformats.org/drawingml/2006/main" xmlns:r="http://schemas.openxmlformats.org/officeDocument/2006/relationships" xmlns:p="http://schemas.openxmlformats.org/presentationml/2006/main">
+  <p:cSld>
+    <p:spTree>
+      <p:nvGrpSpPr>
+        <p:cNvPr id="1" name=""/>
+        <p:cNvGrpSpPr/>
+        <p:nvPr/>
+      </p:nvGrpSpPr>
+      <p:grpSpPr>
+        <a:xfrm>
+          <a:off x="0" y="0"/>
+          <a:ext cx="0" cy="0"/>
+          <a:chOff x="0" y="0"/>
+          <a:chExt cx="0" cy="0"/>
+        </a:xfrm>
+      </p:grpSpPr>
+      <p:sp>
+        <p:nvSpPr>
+          <p:cNvPr id="2" name="Slide Image Placeholder 1"/>
+          <p:cNvSpPr>
+            <a:spLocks noGrp="1" noRot="1" noChangeAspect="1"/>
+          </p:cNvSpPr>
+          <p:nvPr>
+            <p:ph type="sldImg"/>
+          </p:nvPr>
+        </p:nvSpPr>
+        <p:spPr/>
+      </p:sp>
+      <p:sp>
+        <p:nvSpPr>
+          <p:cNvPr id="3" name="Notes Placeholder 2"/>
+          <p:cNvSpPr>
+            <a:spLocks noGrp="1"/>
+          </p:cNvSpPr>
+          <p:nvPr>
+            <p:ph type="body" idx="1"/>
+          </p:nvPr>
+        </p:nvSpPr>
+        <p:spPr/>
+        <p:txBody>
+          <a:bodyPr/>
+          <a:lstStyle/>
+          <a:p>
+            <a:pPr marL="171450" indent="-171450">
+              <a:buFontTx/>
+              <a:buChar char="-"/>
+            </a:pPr>
+            <a:r>
+              <a:rPr lang="en-US" dirty="0"/>
+              <a:t>instructions [1-3], do not cause any subsequent instructions to stall by themselves</a:t>
+            </a:r>
+            <a:r>
+              <a:rPr lang="en-IN" dirty="0"/>
+              <a:t>.</a:t>
+            </a:r>
+          </a:p>
+          <a:p>
+            <a:pPr marL="171450" indent="-171450">
+              <a:buFontTx/>
+              <a:buChar char="-"/>
+            </a:pPr>
+            <a:r>
+              <a:rPr lang="en-US" dirty="0"/>
+              <a:t>[1] should be stalled if it has a preceding [4] that writes to the same </a:t>
+            </a:r>
+            <a:r>
+              <a:rPr lang="en-US" dirty="0" err="1"/>
+              <a:t>rd</a:t>
+            </a:r>
+            <a:r>
+              <a:rPr lang="en-US" dirty="0"/>
+              <a:t> (in order commit, although technically, the </a:t>
+            </a:r>
+            <a:r>
+              <a:rPr lang="en-US" dirty="0" err="1"/>
+              <a:t>rd</a:t>
+            </a:r>
+            <a:r>
+              <a:rPr lang="en-US" dirty="0"/>
+              <a:t> value would be overwritten)</a:t>
+            </a:r>
+          </a:p>
+          <a:p>
+            <a:pPr marL="171450" indent="-171450">
+              <a:buFontTx/>
+              <a:buChar char="-"/>
+            </a:pPr>
+            <a:r>
+              <a:rPr lang="en-US" dirty="0"/>
+              <a:t>[3] should be stalled similarly ; and there’s a RAW dependency for [2, 3] instructions followed by [4] (if the operands match </a:t>
+            </a:r>
+            <a:r>
+              <a:rPr lang="en-US" dirty="0" err="1"/>
+              <a:t>rd</a:t>
+            </a:r>
+            <a:r>
+              <a:rPr lang="en-US" dirty="0"/>
+              <a:t>)</a:t>
+            </a:r>
+          </a:p>
+          <a:p>
+            <a:pPr marL="171450" indent="-171450">
+              <a:buFontTx/>
+              <a:buChar char="-"/>
+            </a:pPr>
+            <a:r>
+              <a:rPr lang="en-US" dirty="0"/>
+              <a:t>[4, 5] need to be stalled if memory is busy (i.e. if they’ve been preceded by a [4, 5] instruction that has possibly been fetched </a:t>
+            </a:r>
+            <a:r>
+              <a:rPr lang="en-US"/>
+              <a:t>really soon)</a:t>
+            </a:r>
+            <a:endParaRPr lang="en-US" dirty="0"/>
+          </a:p>
+        </p:txBody>
+      </p:sp>
+      <p:sp>
+        <p:nvSpPr>
+          <p:cNvPr id="4" name="Slide Number Placeholder 3"/>
+          <p:cNvSpPr>
+            <a:spLocks noGrp="1"/>
+          </p:cNvSpPr>
+          <p:nvPr>
+            <p:ph type="sldNum" sz="quarter" idx="5"/>
+          </p:nvPr>
+        </p:nvSpPr>
+        <p:spPr/>
+        <p:txBody>
+          <a:bodyPr/>
+          <a:lstStyle/>
+          <a:p>
+            <a:fld id="{31E98FFB-FDE1-46F1-A6EF-6ED24DB31D88}" type="slidenum">
+              <a:rPr lang="en-IN" smtClean="0"/>
+              <a:t>11</a:t>
+            </a:fld>
+            <a:endParaRPr lang="en-IN"/>
+          </a:p>
+        </p:txBody>
+      </p:sp>
+    </p:spTree>
+    <p:extLst>
+      <p:ext uri="{BB962C8B-B14F-4D97-AF65-F5344CB8AC3E}">
+        <p14:creationId xmlns:p14="http://schemas.microsoft.com/office/powerpoint/2010/main" val="3926264667"/>
+      </p:ext>
+    </p:extLst>
+  </p:cSld>
+  <p:clrMapOvr>
+    <a:masterClrMapping/>
+  </p:clrMapOvr>
+</p:notes>
 </file>
 
 <file path=ppt/slideLayouts/slideLayout1.xml><?xml version="1.0" encoding="utf-8"?>
@@ -16446,7 +16929,7 @@
           <p:cNvPr id="2" name="Title 1">
             <a:extLst>
               <a:ext uri="{FF2B5EF4-FFF2-40B4-BE49-F238E27FC236}">
-                <a16:creationId xmlns:a16="http://schemas.microsoft.com/office/drawing/2014/main" id="{5986698F-5C2B-B7D7-40C5-4BFD082AC691}"/>
+                <a16:creationId xmlns:a16="http://schemas.microsoft.com/office/drawing/2014/main" id="{7055E22B-F86E-D7A5-57C2-8179F1C5EDE2}"/>
               </a:ext>
             </a:extLst>
           </p:cNvPr>
@@ -16459,14 +16942,12 @@
         </p:nvSpPr>
         <p:spPr/>
         <p:txBody>
-          <a:bodyPr>
-            <a:normAutofit/>
-          </a:bodyPr>
+          <a:bodyPr/>
           <a:lstStyle/>
           <a:p>
             <a:r>
               <a:rPr lang="en-US" dirty="0"/>
-              <a:t>New Signals, Stalls, Forwarding</a:t>
+              <a:t>Potential Stalls</a:t>
             </a:r>
             <a:endParaRPr lang="en-IN" dirty="0"/>
           </a:p>
@@ -16477,7 +16958,7 @@
           <p:cNvPr id="3" name="Content Placeholder 2">
             <a:extLst>
               <a:ext uri="{FF2B5EF4-FFF2-40B4-BE49-F238E27FC236}">
-                <a16:creationId xmlns:a16="http://schemas.microsoft.com/office/drawing/2014/main" id="{BE940334-2A49-2575-F161-24B6E4BA88C9}"/>
+                <a16:creationId xmlns:a16="http://schemas.microsoft.com/office/drawing/2014/main" id="{A13FC385-37E1-5EB9-9C2D-33315FB2B3DC}"/>
               </a:ext>
             </a:extLst>
           </p:cNvPr>
@@ -16490,7 +16971,9 @@
         </p:nvSpPr>
         <p:spPr/>
         <p:txBody>
-          <a:bodyPr/>
+          <a:bodyPr>
+            <a:normAutofit/>
+          </a:bodyPr>
           <a:lstStyle/>
           <a:p>
             <a:pPr marL="342900" indent="-342900">
@@ -16499,7 +16982,49 @@
             </a:pPr>
             <a:r>
               <a:rPr lang="en-US" dirty="0"/>
-              <a:t>Pipeline Stages –</a:t>
+              <a:t>[1] followed by [1-5] </a:t>
+            </a:r>
+            <a:r>
+              <a:rPr lang="en-US" dirty="0">
+                <a:sym typeface="Wingdings" panose="05000000000000000000" pitchFamily="2" charset="2"/>
+              </a:rPr>
+              <a:t> no stalls.</a:t>
+            </a:r>
+          </a:p>
+          <a:p>
+            <a:pPr marL="342900" indent="-342900">
+              <a:buFont typeface="+mj-lt"/>
+              <a:buAutoNum type="arabicPeriod"/>
+            </a:pPr>
+            <a:r>
+              <a:rPr lang="en-US" dirty="0">
+                <a:sym typeface="Wingdings" panose="05000000000000000000" pitchFamily="2" charset="2"/>
+              </a:rPr>
+              <a:t>[2] followed by [1-5]  no stalls.</a:t>
+            </a:r>
+          </a:p>
+          <a:p>
+            <a:pPr marL="342900" indent="-342900">
+              <a:buFont typeface="+mj-lt"/>
+              <a:buAutoNum type="arabicPeriod"/>
+            </a:pPr>
+            <a:r>
+              <a:rPr lang="en-US" dirty="0">
+                <a:sym typeface="Wingdings" panose="05000000000000000000" pitchFamily="2" charset="2"/>
+              </a:rPr>
+              <a:t>[3] followed by [1-5]  no stalls.</a:t>
+            </a:r>
+          </a:p>
+          <a:p>
+            <a:pPr marL="342900" indent="-342900">
+              <a:buFont typeface="+mj-lt"/>
+              <a:buAutoNum type="arabicPeriod"/>
+            </a:pPr>
+            <a:r>
+              <a:rPr lang="en-US" dirty="0">
+                <a:sym typeface="Wingdings" panose="05000000000000000000" pitchFamily="2" charset="2"/>
+              </a:rPr>
+              <a:t>[4] followed by –</a:t>
             </a:r>
           </a:p>
           <a:p>
@@ -16508,8 +17033,10 @@
               <a:buAutoNum type="arabicPeriod"/>
             </a:pPr>
             <a:r>
-              <a:rPr lang="en-US" dirty="0"/>
-              <a:t>IFIDEX stage</a:t>
+              <a:rPr lang="en-US" dirty="0">
+                <a:sym typeface="Wingdings" panose="05000000000000000000" pitchFamily="2" charset="2"/>
+              </a:rPr>
+              <a:t>[1] : no operand dependency, but stall if same rd.</a:t>
             </a:r>
           </a:p>
           <a:p>
@@ -16519,7 +17046,15 @@
             </a:pPr>
             <a:r>
               <a:rPr lang="en-US" dirty="0"/>
-              <a:t>MEM stage</a:t>
+              <a:t>[2] : stall if operands are same as </a:t>
+            </a:r>
+            <a:r>
+              <a:rPr lang="en-US" dirty="0" err="1"/>
+              <a:t>rd</a:t>
+            </a:r>
+            <a:r>
+              <a:rPr lang="en-US" dirty="0"/>
+              <a:t> of [4].</a:t>
             </a:r>
           </a:p>
           <a:p>
@@ -16529,7 +17064,25 @@
             </a:pPr>
             <a:r>
               <a:rPr lang="en-US" dirty="0"/>
-              <a:t>(combinational) WB logic</a:t>
+              <a:t>[3] : stall if operands are same as </a:t>
+            </a:r>
+            <a:r>
+              <a:rPr lang="en-US" dirty="0" err="1"/>
+              <a:t>rd</a:t>
+            </a:r>
+            <a:r>
+              <a:rPr lang="en-US" dirty="0"/>
+              <a:t>, or if same rd.</a:t>
+            </a:r>
+          </a:p>
+          <a:p>
+            <a:pPr marL="800100" lvl="1" indent="-342900">
+              <a:buFont typeface="+mj-lt"/>
+              <a:buAutoNum type="arabicPeriod"/>
+            </a:pPr>
+            <a:r>
+              <a:rPr lang="en-US" dirty="0"/>
+              <a:t>[4, 5] : stall if memory is busy</a:t>
             </a:r>
           </a:p>
           <a:p>
@@ -16539,7 +17092,7 @@
             </a:pPr>
             <a:r>
               <a:rPr lang="en-US" dirty="0"/>
-              <a:t>Modules within core (except stages) –</a:t>
+              <a:t>[5] followed by –</a:t>
             </a:r>
           </a:p>
           <a:p>
@@ -16548,12 +17101,24 @@
               <a:buAutoNum type="arabicPeriod"/>
             </a:pPr>
             <a:r>
-              <a:rPr lang="en-US" dirty="0" err="1"/>
-              <a:t>RegFile</a:t>
-            </a:r>
-            <a:r>
               <a:rPr lang="en-US" dirty="0"/>
-              <a:t>	</a:t>
+              <a:t>[1-3] </a:t>
+            </a:r>
+            <a:r>
+              <a:rPr lang="en-US" dirty="0">
+                <a:sym typeface="Wingdings" panose="05000000000000000000" pitchFamily="2" charset="2"/>
+              </a:rPr>
+              <a:t> no stalls</a:t>
+            </a:r>
+          </a:p>
+          <a:p>
+            <a:pPr marL="800100" lvl="1" indent="-342900">
+              <a:buFont typeface="+mj-lt"/>
+              <a:buAutoNum type="arabicPeriod"/>
+            </a:pPr>
+            <a:r>
+              <a:rPr lang="en-IN" dirty="0"/>
+              <a:t>[4, 5] : stall if memory is busy</a:t>
             </a:r>
           </a:p>
         </p:txBody>
@@ -16561,7 +17126,7 @@
     </p:spTree>
     <p:extLst>
       <p:ext uri="{BB962C8B-B14F-4D97-AF65-F5344CB8AC3E}">
-        <p14:creationId xmlns:p14="http://schemas.microsoft.com/office/powerpoint/2010/main" val="2158434074"/>
+        <p14:creationId xmlns:p14="http://schemas.microsoft.com/office/powerpoint/2010/main" val="221806829"/>
       </p:ext>
     </p:extLst>
   </p:cSld>
@@ -16593,7 +17158,7 @@
           <p:cNvPr id="2" name="Title 1">
             <a:extLst>
               <a:ext uri="{FF2B5EF4-FFF2-40B4-BE49-F238E27FC236}">
-                <a16:creationId xmlns:a16="http://schemas.microsoft.com/office/drawing/2014/main" id="{7055E22B-F86E-D7A5-57C2-8179F1C5EDE2}"/>
+                <a16:creationId xmlns:a16="http://schemas.microsoft.com/office/drawing/2014/main" id="{5986698F-5C2B-B7D7-40C5-4BFD082AC691}"/>
               </a:ext>
             </a:extLst>
           </p:cNvPr>
@@ -16606,10 +17171,16 @@
         </p:nvSpPr>
         <p:spPr/>
         <p:txBody>
-          <a:bodyPr/>
+          <a:bodyPr>
+            <a:normAutofit/>
+          </a:bodyPr>
           <a:lstStyle/>
           <a:p>
-            <a:endParaRPr lang="en-IN"/>
+            <a:r>
+              <a:rPr lang="en-US" dirty="0"/>
+              <a:t>New Signals, Stalls, Forwarding</a:t>
+            </a:r>
+            <a:endParaRPr lang="en-IN" dirty="0"/>
           </a:p>
         </p:txBody>
       </p:sp>
@@ -16618,7 +17189,7 @@
           <p:cNvPr id="3" name="Content Placeholder 2">
             <a:extLst>
               <a:ext uri="{FF2B5EF4-FFF2-40B4-BE49-F238E27FC236}">
-                <a16:creationId xmlns:a16="http://schemas.microsoft.com/office/drawing/2014/main" id="{A13FC385-37E1-5EB9-9C2D-33315FB2B3DC}"/>
+                <a16:creationId xmlns:a16="http://schemas.microsoft.com/office/drawing/2014/main" id="{BE940334-2A49-2575-F161-24B6E4BA88C9}"/>
               </a:ext>
             </a:extLst>
           </p:cNvPr>
@@ -16640,7 +17211,7 @@
             </a:pPr>
             <a:r>
               <a:rPr lang="en-US" dirty="0"/>
-              <a:t>It’s possible that two instructions in the pipeline require the same signal. E.g. </a:t>
+              <a:t>Pipeline Stages –</a:t>
             </a:r>
           </a:p>
           <a:p>
@@ -16650,15 +17221,7 @@
             </a:pPr>
             <a:r>
               <a:rPr lang="en-US" dirty="0"/>
-              <a:t>I1 (load) is fetched, </a:t>
-            </a:r>
-            <a:r>
-              <a:rPr lang="en-US" dirty="0" err="1"/>
-              <a:t>dmem_read</a:t>
-            </a:r>
-            <a:r>
-              <a:rPr lang="en-US" dirty="0"/>
-              <a:t> is issues. Next –</a:t>
+              <a:t>IFIDEX stage</a:t>
             </a:r>
           </a:p>
           <a:p>
@@ -16668,77 +17231,49 @@
             </a:pPr>
             <a:r>
               <a:rPr lang="en-US" dirty="0"/>
-              <a:t>I2 (R, I, U, J) is requested, with the same </a:t>
-            </a:r>
-            <a:r>
-              <a:rPr lang="en-US" dirty="0" err="1"/>
-              <a:t>rd</a:t>
-            </a:r>
-            <a:r>
-              <a:rPr lang="en-US" dirty="0"/>
-              <a:t> as I1.</a:t>
+              <a:t>MEM stage</a:t>
             </a:r>
           </a:p>
           <a:p>
-            <a:pPr marL="457200" lvl="1" indent="0">
-              <a:buNone/>
+            <a:pPr marL="800100" lvl="1" indent="-342900">
+              <a:buFont typeface="+mj-lt"/>
+              <a:buAutoNum type="arabicPeriod"/>
             </a:pPr>
             <a:r>
               <a:rPr lang="en-US" dirty="0"/>
-              <a:t>* If </a:t>
-            </a:r>
-            <a:r>
-              <a:rPr lang="en-US" dirty="0" err="1"/>
-              <a:t>dmem_ready_i</a:t>
-            </a:r>
-            <a:r>
-              <a:rPr lang="en-US" dirty="0"/>
-              <a:t> comes before </a:t>
-            </a:r>
-            <a:r>
-              <a:rPr lang="en-US" dirty="0" err="1"/>
-              <a:t>instr_ready_i</a:t>
-            </a:r>
-            <a:r>
-              <a:rPr lang="en-US" dirty="0"/>
-              <a:t>, all is well.</a:t>
+              <a:t>(combinational) WB logic</a:t>
             </a:r>
           </a:p>
           <a:p>
-            <a:pPr marL="457200" lvl="1" indent="0">
-              <a:buNone/>
+            <a:pPr marL="342900" indent="-342900">
+              <a:buFont typeface="+mj-lt"/>
+              <a:buAutoNum type="arabicPeriod"/>
             </a:pPr>
             <a:r>
               <a:rPr lang="en-US" dirty="0"/>
-              <a:t>* If it comes in the same cycle, forwarding is needed.</a:t>
+              <a:t>Modules within core (except stages) –</a:t>
             </a:r>
           </a:p>
           <a:p>
-            <a:pPr marL="457200" lvl="1" indent="0">
-              <a:buNone/>
+            <a:pPr marL="800100" lvl="1" indent="-342900">
+              <a:buFont typeface="+mj-lt"/>
+              <a:buAutoNum type="arabicPeriod"/>
             </a:pPr>
             <a:r>
+              <a:rPr lang="en-US" dirty="0" err="1"/>
+              <a:t>RegFile</a:t>
+            </a:r>
+            <a:r>
               <a:rPr lang="en-US" dirty="0"/>
-              <a:t>* If it comes after, I2 needs to be stalled until </a:t>
-            </a:r>
-            <a:r>
-              <a:rPr lang="en-US" dirty="0" err="1"/>
-              <a:t>dmem</a:t>
-            </a:r>
-            <a:r>
-              <a:rPr lang="en-US" dirty="0"/>
-              <a:t> is ready.</a:t>
-            </a:r>
-          </a:p>
-          <a:p>
-            <a:endParaRPr lang="en-IN" dirty="0"/>
+              <a:t>	</a:t>
+            </a:r>
           </a:p>
         </p:txBody>
       </p:sp>
     </p:spTree>
     <p:extLst>
       <p:ext uri="{BB962C8B-B14F-4D97-AF65-F5344CB8AC3E}">
-        <p14:creationId xmlns:p14="http://schemas.microsoft.com/office/powerpoint/2010/main" val="221806829"/>
+        <p14:creationId xmlns:p14="http://schemas.microsoft.com/office/powerpoint/2010/main" val="2158434074"/>
       </p:ext>
     </p:extLst>
   </p:cSld>
@@ -20785,4 +21320,299 @@
     </a:ext>
   </a:extLst>
 </a:theme>
+</file>
+
+<file path=ppt/theme/theme2.xml><?xml version="1.0" encoding="utf-8"?>
+<a:theme xmlns:a="http://schemas.openxmlformats.org/drawingml/2006/main" name="Office Theme">
+  <a:themeElements>
+    <a:clrScheme name="Office">
+      <a:dk1>
+        <a:sysClr val="windowText" lastClr="000000"/>
+      </a:dk1>
+      <a:lt1>
+        <a:sysClr val="window" lastClr="FFFFFF"/>
+      </a:lt1>
+      <a:dk2>
+        <a:srgbClr val="44546A"/>
+      </a:dk2>
+      <a:lt2>
+        <a:srgbClr val="E7E6E6"/>
+      </a:lt2>
+      <a:accent1>
+        <a:srgbClr val="4472C4"/>
+      </a:accent1>
+      <a:accent2>
+        <a:srgbClr val="ED7D31"/>
+      </a:accent2>
+      <a:accent3>
+        <a:srgbClr val="A5A5A5"/>
+      </a:accent3>
+      <a:accent4>
+        <a:srgbClr val="FFC000"/>
+      </a:accent4>
+      <a:accent5>
+        <a:srgbClr val="5B9BD5"/>
+      </a:accent5>
+      <a:accent6>
+        <a:srgbClr val="70AD47"/>
+      </a:accent6>
+      <a:hlink>
+        <a:srgbClr val="0563C1"/>
+      </a:hlink>
+      <a:folHlink>
+        <a:srgbClr val="954F72"/>
+      </a:folHlink>
+    </a:clrScheme>
+    <a:fontScheme name="Office">
+      <a:majorFont>
+        <a:latin typeface="Calibri Light" panose="020F0302020204030204"/>
+        <a:ea typeface=""/>
+        <a:cs typeface=""/>
+        <a:font script="Jpan" typeface="游ゴシック Light"/>
+        <a:font script="Hang" typeface="맑은 고딕"/>
+        <a:font script="Hans" typeface="等线 Light"/>
+        <a:font script="Hant" typeface="新細明體"/>
+        <a:font script="Arab" typeface="Times New Roman"/>
+        <a:font script="Hebr" typeface="Times New Roman"/>
+        <a:font script="Thai" typeface="Angsana New"/>
+        <a:font script="Ethi" typeface="Nyala"/>
+        <a:font script="Beng" typeface="Vrinda"/>
+        <a:font script="Gujr" typeface="Shruti"/>
+        <a:font script="Khmr" typeface="MoolBoran"/>
+        <a:font script="Knda" typeface="Tunga"/>
+        <a:font script="Guru" typeface="Raavi"/>
+        <a:font script="Cans" typeface="Euphemia"/>
+        <a:font script="Cher" typeface="Plantagenet Cherokee"/>
+        <a:font script="Yiii" typeface="Microsoft Yi Baiti"/>
+        <a:font script="Tibt" typeface="Microsoft Himalaya"/>
+        <a:font script="Thaa" typeface="MV Boli"/>
+        <a:font script="Deva" typeface="Mangal"/>
+        <a:font script="Telu" typeface="Gautami"/>
+        <a:font script="Taml" typeface="Latha"/>
+        <a:font script="Syrc" typeface="Estrangelo Edessa"/>
+        <a:font script="Orya" typeface="Kalinga"/>
+        <a:font script="Mlym" typeface="Kartika"/>
+        <a:font script="Laoo" typeface="DokChampa"/>
+        <a:font script="Sinh" typeface="Iskoola Pota"/>
+        <a:font script="Mong" typeface="Mongolian Baiti"/>
+        <a:font script="Viet" typeface="Times New Roman"/>
+        <a:font script="Uigh" typeface="Microsoft Uighur"/>
+        <a:font script="Geor" typeface="Sylfaen"/>
+        <a:font script="Armn" typeface="Arial"/>
+        <a:font script="Bugi" typeface="Leelawadee UI"/>
+        <a:font script="Bopo" typeface="Microsoft JhengHei"/>
+        <a:font script="Java" typeface="Javanese Text"/>
+        <a:font script="Lisu" typeface="Segoe UI"/>
+        <a:font script="Mymr" typeface="Myanmar Text"/>
+        <a:font script="Nkoo" typeface="Ebrima"/>
+        <a:font script="Olck" typeface="Nirmala UI"/>
+        <a:font script="Osma" typeface="Ebrima"/>
+        <a:font script="Phag" typeface="Phagspa"/>
+        <a:font script="Syrn" typeface="Estrangelo Edessa"/>
+        <a:font script="Syrj" typeface="Estrangelo Edessa"/>
+        <a:font script="Syre" typeface="Estrangelo Edessa"/>
+        <a:font script="Sora" typeface="Nirmala UI"/>
+        <a:font script="Tale" typeface="Microsoft Tai Le"/>
+        <a:font script="Talu" typeface="Microsoft New Tai Lue"/>
+        <a:font script="Tfng" typeface="Ebrima"/>
+      </a:majorFont>
+      <a:minorFont>
+        <a:latin typeface="Calibri" panose="020F0502020204030204"/>
+        <a:ea typeface=""/>
+        <a:cs typeface=""/>
+        <a:font script="Jpan" typeface="游ゴシック"/>
+        <a:font script="Hang" typeface="맑은 고딕"/>
+        <a:font script="Hans" typeface="等线"/>
+        <a:font script="Hant" typeface="新細明體"/>
+        <a:font script="Arab" typeface="Arial"/>
+        <a:font script="Hebr" typeface="Arial"/>
+        <a:font script="Thai" typeface="Cordia New"/>
+        <a:font script="Ethi" typeface="Nyala"/>
+        <a:font script="Beng" typeface="Vrinda"/>
+        <a:font script="Gujr" typeface="Shruti"/>
+        <a:font script="Khmr" typeface="DaunPenh"/>
+        <a:font script="Knda" typeface="Tunga"/>
+        <a:font script="Guru" typeface="Raavi"/>
+        <a:font script="Cans" typeface="Euphemia"/>
+        <a:font script="Cher" typeface="Plantagenet Cherokee"/>
+        <a:font script="Yiii" typeface="Microsoft Yi Baiti"/>
+        <a:font script="Tibt" typeface="Microsoft Himalaya"/>
+        <a:font script="Thaa" typeface="MV Boli"/>
+        <a:font script="Deva" typeface="Mangal"/>
+        <a:font script="Telu" typeface="Gautami"/>
+        <a:font script="Taml" typeface="Latha"/>
+        <a:font script="Syrc" typeface="Estrangelo Edessa"/>
+        <a:font script="Orya" typeface="Kalinga"/>
+        <a:font script="Mlym" typeface="Kartika"/>
+        <a:font script="Laoo" typeface="DokChampa"/>
+        <a:font script="Sinh" typeface="Iskoola Pota"/>
+        <a:font script="Mong" typeface="Mongolian Baiti"/>
+        <a:font script="Viet" typeface="Arial"/>
+        <a:font script="Uigh" typeface="Microsoft Uighur"/>
+        <a:font script="Geor" typeface="Sylfaen"/>
+        <a:font script="Armn" typeface="Arial"/>
+        <a:font script="Bugi" typeface="Leelawadee UI"/>
+        <a:font script="Bopo" typeface="Microsoft JhengHei"/>
+        <a:font script="Java" typeface="Javanese Text"/>
+        <a:font script="Lisu" typeface="Segoe UI"/>
+        <a:font script="Mymr" typeface="Myanmar Text"/>
+        <a:font script="Nkoo" typeface="Ebrima"/>
+        <a:font script="Olck" typeface="Nirmala UI"/>
+        <a:font script="Osma" typeface="Ebrima"/>
+        <a:font script="Phag" typeface="Phagspa"/>
+        <a:font script="Syrn" typeface="Estrangelo Edessa"/>
+        <a:font script="Syrj" typeface="Estrangelo Edessa"/>
+        <a:font script="Syre" typeface="Estrangelo Edessa"/>
+        <a:font script="Sora" typeface="Nirmala UI"/>
+        <a:font script="Tale" typeface="Microsoft Tai Le"/>
+        <a:font script="Talu" typeface="Microsoft New Tai Lue"/>
+        <a:font script="Tfng" typeface="Ebrima"/>
+      </a:minorFont>
+    </a:fontScheme>
+    <a:fmtScheme name="Office">
+      <a:fillStyleLst>
+        <a:solidFill>
+          <a:schemeClr val="phClr"/>
+        </a:solidFill>
+        <a:gradFill rotWithShape="1">
+          <a:gsLst>
+            <a:gs pos="0">
+              <a:schemeClr val="phClr">
+                <a:lumMod val="110000"/>
+                <a:satMod val="105000"/>
+                <a:tint val="67000"/>
+              </a:schemeClr>
+            </a:gs>
+            <a:gs pos="50000">
+              <a:schemeClr val="phClr">
+                <a:lumMod val="105000"/>
+                <a:satMod val="103000"/>
+                <a:tint val="73000"/>
+              </a:schemeClr>
+            </a:gs>
+            <a:gs pos="100000">
+              <a:schemeClr val="phClr">
+                <a:lumMod val="105000"/>
+                <a:satMod val="109000"/>
+                <a:tint val="81000"/>
+              </a:schemeClr>
+            </a:gs>
+          </a:gsLst>
+          <a:lin ang="5400000" scaled="0"/>
+        </a:gradFill>
+        <a:gradFill rotWithShape="1">
+          <a:gsLst>
+            <a:gs pos="0">
+              <a:schemeClr val="phClr">
+                <a:satMod val="103000"/>
+                <a:lumMod val="102000"/>
+                <a:tint val="94000"/>
+              </a:schemeClr>
+            </a:gs>
+            <a:gs pos="50000">
+              <a:schemeClr val="phClr">
+                <a:satMod val="110000"/>
+                <a:lumMod val="100000"/>
+                <a:shade val="100000"/>
+              </a:schemeClr>
+            </a:gs>
+            <a:gs pos="100000">
+              <a:schemeClr val="phClr">
+                <a:lumMod val="99000"/>
+                <a:satMod val="120000"/>
+                <a:shade val="78000"/>
+              </a:schemeClr>
+            </a:gs>
+          </a:gsLst>
+          <a:lin ang="5400000" scaled="0"/>
+        </a:gradFill>
+      </a:fillStyleLst>
+      <a:lnStyleLst>
+        <a:ln w="6350" cap="flat" cmpd="sng" algn="ctr">
+          <a:solidFill>
+            <a:schemeClr val="phClr"/>
+          </a:solidFill>
+          <a:prstDash val="solid"/>
+          <a:miter lim="800000"/>
+        </a:ln>
+        <a:ln w="12700" cap="flat" cmpd="sng" algn="ctr">
+          <a:solidFill>
+            <a:schemeClr val="phClr"/>
+          </a:solidFill>
+          <a:prstDash val="solid"/>
+          <a:miter lim="800000"/>
+        </a:ln>
+        <a:ln w="19050" cap="flat" cmpd="sng" algn="ctr">
+          <a:solidFill>
+            <a:schemeClr val="phClr"/>
+          </a:solidFill>
+          <a:prstDash val="solid"/>
+          <a:miter lim="800000"/>
+        </a:ln>
+      </a:lnStyleLst>
+      <a:effectStyleLst>
+        <a:effectStyle>
+          <a:effectLst/>
+        </a:effectStyle>
+        <a:effectStyle>
+          <a:effectLst/>
+        </a:effectStyle>
+        <a:effectStyle>
+          <a:effectLst>
+            <a:outerShdw blurRad="57150" dist="19050" dir="5400000" algn="ctr" rotWithShape="0">
+              <a:srgbClr val="000000">
+                <a:alpha val="63000"/>
+              </a:srgbClr>
+            </a:outerShdw>
+          </a:effectLst>
+        </a:effectStyle>
+      </a:effectStyleLst>
+      <a:bgFillStyleLst>
+        <a:solidFill>
+          <a:schemeClr val="phClr"/>
+        </a:solidFill>
+        <a:solidFill>
+          <a:schemeClr val="phClr">
+            <a:tint val="95000"/>
+            <a:satMod val="170000"/>
+          </a:schemeClr>
+        </a:solidFill>
+        <a:gradFill rotWithShape="1">
+          <a:gsLst>
+            <a:gs pos="0">
+              <a:schemeClr val="phClr">
+                <a:tint val="93000"/>
+                <a:satMod val="150000"/>
+                <a:shade val="98000"/>
+                <a:lumMod val="102000"/>
+              </a:schemeClr>
+            </a:gs>
+            <a:gs pos="50000">
+              <a:schemeClr val="phClr">
+                <a:tint val="98000"/>
+                <a:satMod val="130000"/>
+                <a:shade val="90000"/>
+                <a:lumMod val="103000"/>
+              </a:schemeClr>
+            </a:gs>
+            <a:gs pos="100000">
+              <a:schemeClr val="phClr">
+                <a:shade val="63000"/>
+                <a:satMod val="120000"/>
+              </a:schemeClr>
+            </a:gs>
+          </a:gsLst>
+          <a:lin ang="5400000" scaled="0"/>
+        </a:gradFill>
+      </a:bgFillStyleLst>
+    </a:fmtScheme>
+  </a:themeElements>
+  <a:objectDefaults/>
+  <a:extraClrSchemeLst/>
+  <a:extLst>
+    <a:ext uri="{05A4C25C-085E-4340-85A3-A5531E510DB2}">
+      <thm15:themeFamily xmlns:thm15="http://schemas.microsoft.com/office/thememl/2012/main" name="Office Theme" id="{62F939B6-93AF-4DB8-9C6B-D6C7DFDC589F}" vid="{4A3C46E8-61CC-4603-A589-7422A47A8E4A}"/>
+    </a:ext>
+  </a:extLst>
+</a:theme>
 </file>
</xml_diff>

<commit_message>
refactoring stall4mem_pip for better organization, charting out stall4mem_pip_cached
</commit_message>
<xml_diff>
--- a/rtl/core/multi_cycle/stall_for_mem_core.pptx
+++ b/rtl/core/multi_cycle/stall_for_mem_core.pptx
@@ -5,7 +5,7 @@
     <p:sldMasterId id="2147483672" r:id="rId1"/>
   </p:sldMasterIdLst>
   <p:notesMasterIdLst>
-    <p:notesMasterId r:id="rId15"/>
+    <p:notesMasterId r:id="rId17"/>
   </p:notesMasterIdLst>
   <p:sldIdLst>
     <p:sldId id="256" r:id="rId2"/>
@@ -21,6 +21,8 @@
     <p:sldId id="267" r:id="rId12"/>
     <p:sldId id="266" r:id="rId13"/>
     <p:sldId id="268" r:id="rId14"/>
+    <p:sldId id="269" r:id="rId15"/>
+    <p:sldId id="270" r:id="rId16"/>
   </p:sldIdLst>
   <p:sldSz cx="12192000" cy="6858000"/>
   <p:notesSz cx="6858000" cy="9144000"/>
@@ -132,7 +134,7 @@
   <pc:docChgLst>
     <pc:chgData name="Mrinav Saxena" userId="1ae1cb636c956b49" providerId="LiveId" clId="{3D40DB4B-8E00-40BA-9204-277439F83DB8}"/>
     <pc:docChg chg="undo redo custSel addSld delSld modSld sldOrd">
-      <pc:chgData name="Mrinav Saxena" userId="1ae1cb636c956b49" providerId="LiveId" clId="{3D40DB4B-8E00-40BA-9204-277439F83DB8}" dt="2025-09-20T18:01:53.034" v="12969" actId="20577"/>
+      <pc:chgData name="Mrinav Saxena" userId="1ae1cb636c956b49" providerId="LiveId" clId="{3D40DB4B-8E00-40BA-9204-277439F83DB8}" dt="2025-09-21T15:48:05.685" v="13880" actId="20577"/>
       <pc:docMkLst>
         <pc:docMk/>
       </pc:docMkLst>
@@ -400,6 +402,36 @@
           </ac:spMkLst>
         </pc:spChg>
       </pc:sldChg>
+      <pc:sldChg chg="modSp add mod">
+        <pc:chgData name="Mrinav Saxena" userId="1ae1cb636c956b49" providerId="LiveId" clId="{3D40DB4B-8E00-40BA-9204-277439F83DB8}" dt="2025-09-21T15:33:45.120" v="12995" actId="20577"/>
+        <pc:sldMkLst>
+          <pc:docMk/>
+          <pc:sldMk cId="2797619357" sldId="269"/>
+        </pc:sldMkLst>
+        <pc:spChg chg="mod">
+          <ac:chgData name="Mrinav Saxena" userId="1ae1cb636c956b49" providerId="LiveId" clId="{3D40DB4B-8E00-40BA-9204-277439F83DB8}" dt="2025-09-21T15:33:45.120" v="12995" actId="20577"/>
+          <ac:spMkLst>
+            <pc:docMk/>
+            <pc:sldMk cId="2797619357" sldId="269"/>
+            <ac:spMk id="4" creationId="{9F98A03A-B65C-59F7-E5A7-B980A8A6201D}"/>
+          </ac:spMkLst>
+        </pc:spChg>
+      </pc:sldChg>
+      <pc:sldChg chg="modSp add mod">
+        <pc:chgData name="Mrinav Saxena" userId="1ae1cb636c956b49" providerId="LiveId" clId="{3D40DB4B-8E00-40BA-9204-277439F83DB8}" dt="2025-09-21T15:48:05.685" v="13880" actId="20577"/>
+        <pc:sldMkLst>
+          <pc:docMk/>
+          <pc:sldMk cId="755115689" sldId="270"/>
+        </pc:sldMkLst>
+        <pc:spChg chg="mod">
+          <ac:chgData name="Mrinav Saxena" userId="1ae1cb636c956b49" providerId="LiveId" clId="{3D40DB4B-8E00-40BA-9204-277439F83DB8}" dt="2025-09-21T15:48:05.685" v="13880" actId="20577"/>
+          <ac:spMkLst>
+            <pc:docMk/>
+            <pc:sldMk cId="755115689" sldId="270"/>
+            <ac:spMk id="5" creationId="{B5EFF1FB-4DBF-9535-831C-8A59B090B7EF}"/>
+          </ac:spMkLst>
+        </pc:spChg>
+      </pc:sldChg>
     </pc:docChg>
   </pc:docChgLst>
 </pc:chgInfo>
@@ -487,7 +519,7 @@
           <a:p>
             <a:fld id="{500EB78D-BB55-4B05-91A4-47B016A9092A}" type="datetimeFigureOut">
               <a:rPr lang="en-IN" smtClean="0"/>
-              <a:t>20-09-2025</a:t>
+              <a:t>21-09-2025</a:t>
             </a:fld>
             <a:endParaRPr lang="en-IN"/>
           </a:p>
@@ -2313,7 +2345,7 @@
           <a:p>
             <a:fld id="{5411EB86-952F-4D59-A107-BE7F3DE73819}" type="datetimeFigureOut">
               <a:rPr lang="en-IN" smtClean="0"/>
-              <a:t>20-09-2025</a:t>
+              <a:t>21-09-2025</a:t>
             </a:fld>
             <a:endParaRPr lang="en-IN"/>
           </a:p>
@@ -3772,7 +3804,7 @@
           <a:p>
             <a:fld id="{5411EB86-952F-4D59-A107-BE7F3DE73819}" type="datetimeFigureOut">
               <a:rPr lang="en-IN" smtClean="0"/>
-              <a:t>20-09-2025</a:t>
+              <a:t>21-09-2025</a:t>
             </a:fld>
             <a:endParaRPr lang="en-IN"/>
           </a:p>
@@ -5225,7 +5257,7 @@
           <a:p>
             <a:fld id="{5411EB86-952F-4D59-A107-BE7F3DE73819}" type="datetimeFigureOut">
               <a:rPr lang="en-IN" smtClean="0"/>
-              <a:t>20-09-2025</a:t>
+              <a:t>21-09-2025</a:t>
             </a:fld>
             <a:endParaRPr lang="en-IN"/>
           </a:p>
@@ -6680,7 +6712,7 @@
           <a:p>
             <a:fld id="{5411EB86-952F-4D59-A107-BE7F3DE73819}" type="datetimeFigureOut">
               <a:rPr lang="en-IN" smtClean="0"/>
-              <a:t>20-09-2025</a:t>
+              <a:t>21-09-2025</a:t>
             </a:fld>
             <a:endParaRPr lang="en-IN"/>
           </a:p>
@@ -8188,7 +8220,7 @@
           <a:p>
             <a:fld id="{5411EB86-952F-4D59-A107-BE7F3DE73819}" type="datetimeFigureOut">
               <a:rPr lang="en-IN" smtClean="0"/>
-              <a:t>20-09-2025</a:t>
+              <a:t>21-09-2025</a:t>
             </a:fld>
             <a:endParaRPr lang="en-IN"/>
           </a:p>
@@ -9709,7 +9741,7 @@
           <a:p>
             <a:fld id="{5411EB86-952F-4D59-A107-BE7F3DE73819}" type="datetimeFigureOut">
               <a:rPr lang="en-IN" smtClean="0"/>
-              <a:t>20-09-2025</a:t>
+              <a:t>21-09-2025</a:t>
             </a:fld>
             <a:endParaRPr lang="en-IN"/>
           </a:p>
@@ -11374,7 +11406,7 @@
           <a:p>
             <a:fld id="{5411EB86-952F-4D59-A107-BE7F3DE73819}" type="datetimeFigureOut">
               <a:rPr lang="en-IN" smtClean="0"/>
-              <a:t>20-09-2025</a:t>
+              <a:t>21-09-2025</a:t>
             </a:fld>
             <a:endParaRPr lang="en-IN"/>
           </a:p>
@@ -12772,7 +12804,7 @@
           <a:p>
             <a:fld id="{5411EB86-952F-4D59-A107-BE7F3DE73819}" type="datetimeFigureOut">
               <a:rPr lang="en-IN" smtClean="0"/>
-              <a:t>20-09-2025</a:t>
+              <a:t>21-09-2025</a:t>
             </a:fld>
             <a:endParaRPr lang="en-IN"/>
           </a:p>
@@ -12872,7 +12904,7 @@
           <a:p>
             <a:fld id="{5411EB86-952F-4D59-A107-BE7F3DE73819}" type="datetimeFigureOut">
               <a:rPr lang="en-IN" smtClean="0"/>
-              <a:t>20-09-2025</a:t>
+              <a:t>21-09-2025</a:t>
             </a:fld>
             <a:endParaRPr lang="en-IN"/>
           </a:p>
@@ -14398,7 +14430,7 @@
           <a:p>
             <a:fld id="{5411EB86-952F-4D59-A107-BE7F3DE73819}" type="datetimeFigureOut">
               <a:rPr lang="en-IN" smtClean="0"/>
-              <a:t>20-09-2025</a:t>
+              <a:t>21-09-2025</a:t>
             </a:fld>
             <a:endParaRPr lang="en-IN"/>
           </a:p>
@@ -15934,7 +15966,7 @@
           <a:p>
             <a:fld id="{5411EB86-952F-4D59-A107-BE7F3DE73819}" type="datetimeFigureOut">
               <a:rPr lang="en-IN" smtClean="0"/>
-              <a:t>20-09-2025</a:t>
+              <a:t>21-09-2025</a:t>
             </a:fld>
             <a:endParaRPr lang="en-IN"/>
           </a:p>
@@ -16157,7 +16189,7 @@
           <a:p>
             <a:fld id="{5411EB86-952F-4D59-A107-BE7F3DE73819}" type="datetimeFigureOut">
               <a:rPr lang="en-IN" smtClean="0"/>
-              <a:t>20-09-2025</a:t>
+              <a:t>21-09-2025</a:t>
             </a:fld>
             <a:endParaRPr lang="en-IN"/>
           </a:p>
@@ -17488,6 +17520,267 @@
     <p:extLst>
       <p:ext uri="{BB962C8B-B14F-4D97-AF65-F5344CB8AC3E}">
         <p14:creationId xmlns:p14="http://schemas.microsoft.com/office/powerpoint/2010/main" val="1526872486"/>
+      </p:ext>
+    </p:extLst>
+  </p:cSld>
+  <p:clrMapOvr>
+    <a:masterClrMapping/>
+  </p:clrMapOvr>
+</p:sld>
+</file>
+
+<file path=ppt/slides/slide14.xml><?xml version="1.0" encoding="utf-8"?>
+<p:sld xmlns:a="http://schemas.openxmlformats.org/drawingml/2006/main" xmlns:r="http://schemas.openxmlformats.org/officeDocument/2006/relationships" xmlns:p="http://schemas.openxmlformats.org/presentationml/2006/main">
+  <p:cSld>
+    <p:spTree>
+      <p:nvGrpSpPr>
+        <p:cNvPr id="1" name="">
+          <a:extLst>
+            <a:ext uri="{FF2B5EF4-FFF2-40B4-BE49-F238E27FC236}">
+              <a16:creationId xmlns:a16="http://schemas.microsoft.com/office/drawing/2014/main" id="{8848429E-C76F-6740-706A-561B92CCE480}"/>
+            </a:ext>
+          </a:extLst>
+        </p:cNvPr>
+        <p:cNvGrpSpPr/>
+        <p:nvPr/>
+      </p:nvGrpSpPr>
+      <p:grpSpPr>
+        <a:xfrm>
+          <a:off x="0" y="0"/>
+          <a:ext cx="0" cy="0"/>
+          <a:chOff x="0" y="0"/>
+          <a:chExt cx="0" cy="0"/>
+        </a:xfrm>
+      </p:grpSpPr>
+      <p:sp>
+        <p:nvSpPr>
+          <p:cNvPr id="4" name="Title 3">
+            <a:extLst>
+              <a:ext uri="{FF2B5EF4-FFF2-40B4-BE49-F238E27FC236}">
+                <a16:creationId xmlns:a16="http://schemas.microsoft.com/office/drawing/2014/main" id="{9F98A03A-B65C-59F7-E5A7-B980A8A6201D}"/>
+              </a:ext>
+            </a:extLst>
+          </p:cNvPr>
+          <p:cNvSpPr>
+            <a:spLocks noGrp="1"/>
+          </p:cNvSpPr>
+          <p:nvPr>
+            <p:ph type="title"/>
+          </p:nvPr>
+        </p:nvSpPr>
+        <p:spPr/>
+        <p:txBody>
+          <a:bodyPr/>
+          <a:lstStyle/>
+          <a:p>
+            <a:r>
+              <a:rPr lang="en-US" dirty="0"/>
+              <a:t>Stall For Mem</a:t>
+            </a:r>
+            <a:br>
+              <a:rPr lang="en-US" dirty="0"/>
+            </a:br>
+            <a:r>
+              <a:rPr lang="en-US" dirty="0"/>
+              <a:t>Pipelined + Split Cache</a:t>
+            </a:r>
+            <a:endParaRPr lang="en-IN" dirty="0"/>
+          </a:p>
+        </p:txBody>
+      </p:sp>
+      <p:sp>
+        <p:nvSpPr>
+          <p:cNvPr id="5" name="Text Placeholder 4">
+            <a:extLst>
+              <a:ext uri="{FF2B5EF4-FFF2-40B4-BE49-F238E27FC236}">
+                <a16:creationId xmlns:a16="http://schemas.microsoft.com/office/drawing/2014/main" id="{40D69E95-88C6-CDC5-592B-7699CA58AD86}"/>
+              </a:ext>
+            </a:extLst>
+          </p:cNvPr>
+          <p:cNvSpPr>
+            <a:spLocks noGrp="1"/>
+          </p:cNvSpPr>
+          <p:nvPr>
+            <p:ph type="body" idx="1"/>
+          </p:nvPr>
+        </p:nvSpPr>
+        <p:spPr/>
+        <p:txBody>
+          <a:bodyPr/>
+          <a:lstStyle/>
+          <a:p>
+            <a:endParaRPr lang="en-IN"/>
+          </a:p>
+        </p:txBody>
+      </p:sp>
+    </p:spTree>
+    <p:extLst>
+      <p:ext uri="{BB962C8B-B14F-4D97-AF65-F5344CB8AC3E}">
+        <p14:creationId xmlns:p14="http://schemas.microsoft.com/office/powerpoint/2010/main" val="2797619357"/>
+      </p:ext>
+    </p:extLst>
+  </p:cSld>
+  <p:clrMapOvr>
+    <a:masterClrMapping/>
+  </p:clrMapOvr>
+</p:sld>
+</file>
+
+<file path=ppt/slides/slide15.xml><?xml version="1.0" encoding="utf-8"?>
+<p:sld xmlns:a="http://schemas.openxmlformats.org/drawingml/2006/main" xmlns:r="http://schemas.openxmlformats.org/officeDocument/2006/relationships" xmlns:p="http://schemas.openxmlformats.org/presentationml/2006/main">
+  <p:cSld>
+    <p:spTree>
+      <p:nvGrpSpPr>
+        <p:cNvPr id="1" name="">
+          <a:extLst>
+            <a:ext uri="{FF2B5EF4-FFF2-40B4-BE49-F238E27FC236}">
+              <a16:creationId xmlns:a16="http://schemas.microsoft.com/office/drawing/2014/main" id="{FAAC3CF7-C7AA-EAC4-36D5-5A1DA7F649D7}"/>
+            </a:ext>
+          </a:extLst>
+        </p:cNvPr>
+        <p:cNvGrpSpPr/>
+        <p:nvPr/>
+      </p:nvGrpSpPr>
+      <p:grpSpPr>
+        <a:xfrm>
+          <a:off x="0" y="0"/>
+          <a:ext cx="0" cy="0"/>
+          <a:chOff x="0" y="0"/>
+          <a:chExt cx="0" cy="0"/>
+        </a:xfrm>
+      </p:grpSpPr>
+      <p:sp>
+        <p:nvSpPr>
+          <p:cNvPr id="4" name="Title 3">
+            <a:extLst>
+              <a:ext uri="{FF2B5EF4-FFF2-40B4-BE49-F238E27FC236}">
+                <a16:creationId xmlns:a16="http://schemas.microsoft.com/office/drawing/2014/main" id="{C9E9397A-AA49-192F-D9D3-D9EDED6B7856}"/>
+              </a:ext>
+            </a:extLst>
+          </p:cNvPr>
+          <p:cNvSpPr>
+            <a:spLocks noGrp="1"/>
+          </p:cNvSpPr>
+          <p:nvPr>
+            <p:ph type="title"/>
+          </p:nvPr>
+        </p:nvSpPr>
+        <p:spPr/>
+        <p:txBody>
+          <a:bodyPr/>
+          <a:lstStyle/>
+          <a:p>
+            <a:r>
+              <a:rPr lang="en-US" dirty="0"/>
+              <a:t>Notes</a:t>
+            </a:r>
+            <a:endParaRPr lang="en-IN" dirty="0"/>
+          </a:p>
+        </p:txBody>
+      </p:sp>
+      <p:sp>
+        <p:nvSpPr>
+          <p:cNvPr id="5" name="Content Placeholder 4">
+            <a:extLst>
+              <a:ext uri="{FF2B5EF4-FFF2-40B4-BE49-F238E27FC236}">
+                <a16:creationId xmlns:a16="http://schemas.microsoft.com/office/drawing/2014/main" id="{B5EFF1FB-4DBF-9535-831C-8A59B090B7EF}"/>
+              </a:ext>
+            </a:extLst>
+          </p:cNvPr>
+          <p:cNvSpPr>
+            <a:spLocks noGrp="1"/>
+          </p:cNvSpPr>
+          <p:nvPr>
+            <p:ph idx="1"/>
+          </p:nvPr>
+        </p:nvSpPr>
+        <p:spPr/>
+        <p:txBody>
+          <a:bodyPr>
+            <a:normAutofit lnSpcReduction="10000"/>
+          </a:bodyPr>
+          <a:lstStyle/>
+          <a:p>
+            <a:r>
+              <a:rPr lang="en-US" dirty="0">
+                <a:sym typeface="Wingdings" panose="05000000000000000000" pitchFamily="2" charset="2"/>
+              </a:rPr>
+              <a:t>Add an instruction cache and data cache to existing implementation. For the purpose of fair comparison, block size of the caches will be 1.</a:t>
+            </a:r>
+          </a:p>
+          <a:p>
+            <a:pPr lvl="1"/>
+            <a:r>
+              <a:rPr lang="en-US" dirty="0">
+                <a:sym typeface="Wingdings" panose="05000000000000000000" pitchFamily="2" charset="2"/>
+              </a:rPr>
+              <a:t>This is because it’s complicated to estimate the comparative latency of a memory module that otherwise fetches data / processes a write in $</a:t>
+            </a:r>
+            <a:r>
+              <a:rPr lang="en-US" dirty="0" err="1">
+                <a:sym typeface="Wingdings" panose="05000000000000000000" pitchFamily="2" charset="2"/>
+              </a:rPr>
+              <a:t>urandom_range</a:t>
+            </a:r>
+            <a:r>
+              <a:rPr lang="en-US" dirty="0">
+                <a:sym typeface="Wingdings" panose="05000000000000000000" pitchFamily="2" charset="2"/>
+              </a:rPr>
+              <a:t>(1,N) cycles.</a:t>
+            </a:r>
+          </a:p>
+          <a:p>
+            <a:r>
+              <a:rPr lang="en-US" dirty="0"/>
+              <a:t>Possible </a:t>
+            </a:r>
+            <a:r>
+              <a:rPr lang="en-US" dirty="0" err="1"/>
+              <a:t>DCache</a:t>
+            </a:r>
+            <a:r>
+              <a:rPr lang="en-US" dirty="0"/>
+              <a:t> implementations –</a:t>
+            </a:r>
+          </a:p>
+          <a:p>
+            <a:pPr marL="800100" lvl="1" indent="-342900">
+              <a:buFont typeface="+mj-lt"/>
+              <a:buAutoNum type="arabicPeriod"/>
+            </a:pPr>
+            <a:r>
+              <a:rPr lang="en-US" dirty="0"/>
+              <a:t>Direct Mapped, Set Associative or Fully Associative</a:t>
+            </a:r>
+          </a:p>
+          <a:p>
+            <a:pPr marL="800100" lvl="1" indent="-342900">
+              <a:buFont typeface="+mj-lt"/>
+              <a:buAutoNum type="arabicPeriod"/>
+            </a:pPr>
+            <a:r>
+              <a:rPr lang="en-US" dirty="0"/>
+              <a:t>Write Through + No Write Allocate or Write Back + Write Allocate</a:t>
+            </a:r>
+          </a:p>
+          <a:p>
+            <a:r>
+              <a:rPr lang="en-US" dirty="0"/>
+              <a:t>Modification needed – FSMs need to operate so they can fetch data/instructions every subsequent cycle.</a:t>
+            </a:r>
+          </a:p>
+          <a:p>
+            <a:r>
+              <a:rPr lang="en-US" dirty="0"/>
+              <a:t>More benchmark C tests are needed to compare all the implementations so far.</a:t>
+            </a:r>
+          </a:p>
+        </p:txBody>
+      </p:sp>
+    </p:spTree>
+    <p:extLst>
+      <p:ext uri="{BB962C8B-B14F-4D97-AF65-F5344CB8AC3E}">
+        <p14:creationId xmlns:p14="http://schemas.microsoft.com/office/powerpoint/2010/main" val="755115689"/>
       </p:ext>
     </p:extLst>
   </p:cSld>

</xml_diff>